<commit_message>
feat: add extra work
</commit_message>
<xml_diff>
--- a/Unidad_2/Presentación.pptx
+++ b/Unidad_2/Presentación.pptx
@@ -5,7 +5,7 @@
     <p:sldMasterId id="2147483648" r:id="rId4"/>
   </p:sldMasterIdLst>
   <p:notesMasterIdLst>
-    <p:notesMasterId r:id="rId25"/>
+    <p:notesMasterId r:id="rId26"/>
   </p:notesMasterIdLst>
   <p:sldIdLst>
     <p:sldId id="256" r:id="rId5"/>
@@ -28,6 +28,7 @@
     <p:sldId id="273" r:id="rId22"/>
     <p:sldId id="275" r:id="rId23"/>
     <p:sldId id="276" r:id="rId24"/>
+    <p:sldId id="279" r:id="rId25"/>
   </p:sldIdLst>
   <p:sldSz cx="12192000" cy="6858000"/>
   <p:notesSz cx="6858000" cy="9144000"/>
@@ -5290,6 +5291,133 @@
     <p:extLst>
       <p:ext uri="{BB962C8B-B14F-4D97-AF65-F5344CB8AC3E}">
         <p14:creationId xmlns:p14="http://schemas.microsoft.com/office/powerpoint/2010/main" val="3758536102"/>
+      </p:ext>
+    </p:extLst>
+  </p:cSld>
+  <p:clrMapOvr>
+    <a:masterClrMapping/>
+  </p:clrMapOvr>
+</p:sld>
+</file>
+
+<file path=ppt/slides/slide21.xml><?xml version="1.0" encoding="utf-8"?>
+<p:sld xmlns:a="http://schemas.openxmlformats.org/drawingml/2006/main" xmlns:r="http://schemas.openxmlformats.org/officeDocument/2006/relationships" xmlns:p="http://schemas.openxmlformats.org/presentationml/2006/main">
+  <p:cSld>
+    <p:spTree>
+      <p:nvGrpSpPr>
+        <p:cNvPr id="1" name=""/>
+        <p:cNvGrpSpPr/>
+        <p:nvPr/>
+      </p:nvGrpSpPr>
+      <p:grpSpPr>
+        <a:xfrm>
+          <a:off x="0" y="0"/>
+          <a:ext cx="0" cy="0"/>
+          <a:chOff x="0" y="0"/>
+          <a:chExt cx="0" cy="0"/>
+        </a:xfrm>
+      </p:grpSpPr>
+      <p:sp>
+        <p:nvSpPr>
+          <p:cNvPr id="2" name="Title 1">
+            <a:extLst>
+              <a:ext uri="{FF2B5EF4-FFF2-40B4-BE49-F238E27FC236}">
+                <a16:creationId xmlns:a16="http://schemas.microsoft.com/office/drawing/2014/main" id="{8E58BDD2-0D6D-63E4-54E3-0EF1FCA715E5}"/>
+              </a:ext>
+            </a:extLst>
+          </p:cNvPr>
+          <p:cNvSpPr>
+            <a:spLocks noGrp="1"/>
+          </p:cNvSpPr>
+          <p:nvPr>
+            <p:ph type="title"/>
+          </p:nvPr>
+        </p:nvSpPr>
+        <p:spPr/>
+        <p:txBody>
+          <a:bodyPr/>
+          <a:lstStyle/>
+          <a:p>
+            <a:r>
+              <a:rPr lang="en-US" dirty="0"/>
+              <a:t>Extras</a:t>
+            </a:r>
+            <a:endParaRPr lang="es-EC" dirty="0"/>
+          </a:p>
+        </p:txBody>
+      </p:sp>
+      <p:sp>
+        <p:nvSpPr>
+          <p:cNvPr id="3" name="Content Placeholder 2">
+            <a:extLst>
+              <a:ext uri="{FF2B5EF4-FFF2-40B4-BE49-F238E27FC236}">
+                <a16:creationId xmlns:a16="http://schemas.microsoft.com/office/drawing/2014/main" id="{1909D694-0BE8-EACC-A5EF-C5B8B45B8805}"/>
+              </a:ext>
+            </a:extLst>
+          </p:cNvPr>
+          <p:cNvSpPr>
+            <a:spLocks noGrp="1"/>
+          </p:cNvSpPr>
+          <p:nvPr>
+            <p:ph idx="1"/>
+          </p:nvPr>
+        </p:nvSpPr>
+        <p:spPr/>
+        <p:txBody>
+          <a:bodyPr/>
+          <a:lstStyle/>
+          <a:p>
+            <a:r>
+              <a:rPr lang="es-EC" dirty="0"/>
+              <a:t>Leer sobre “</a:t>
+            </a:r>
+            <a:r>
+              <a:rPr lang="es-EC" dirty="0" err="1"/>
+              <a:t>Routing</a:t>
+            </a:r>
+            <a:r>
+              <a:rPr lang="es-EC" dirty="0"/>
+              <a:t> Design </a:t>
+            </a:r>
+            <a:r>
+              <a:rPr lang="es-EC" dirty="0" err="1"/>
+              <a:t>Patterns</a:t>
+            </a:r>
+            <a:r>
+              <a:rPr lang="es-EC" dirty="0"/>
+              <a:t>” para aplicaciones web.</a:t>
+            </a:r>
+          </a:p>
+          <a:p>
+            <a:r>
+              <a:rPr lang="es-EC" dirty="0"/>
+              <a:t>Un inicio puede ser</a:t>
+            </a:r>
+          </a:p>
+          <a:p>
+            <a:endParaRPr lang="es-EC" dirty="0"/>
+          </a:p>
+          <a:p>
+            <a:pPr marL="0" indent="0">
+              <a:buNone/>
+            </a:pPr>
+            <a:r>
+              <a:rPr lang="es-EC" sz="2400" dirty="0">
+                <a:hlinkClick r:id="rId2"/>
+              </a:rPr>
+              <a:t>https://medium.com/@goldhand/routing-design-patterns-fed766ad35fa</a:t>
+            </a:r>
+            <a:endParaRPr lang="es-EC" sz="2400" dirty="0"/>
+          </a:p>
+          <a:p>
+            <a:endParaRPr lang="es-EC" dirty="0"/>
+          </a:p>
+        </p:txBody>
+      </p:sp>
+    </p:spTree>
+    <p:extLst>
+      <p:ext uri="{BB962C8B-B14F-4D97-AF65-F5344CB8AC3E}">
+        <p14:creationId xmlns:p14="http://schemas.microsoft.com/office/powerpoint/2010/main" val="1544763583"/>
       </p:ext>
     </p:extLst>
   </p:cSld>
@@ -6986,15 +7114,6 @@
 </file>
 
 <file path=customXml/item1.xml><?xml version="1.0" encoding="utf-8"?>
-<?mso-contentType ?>
-<FormTemplates xmlns="http://schemas.microsoft.com/sharepoint/v3/contenttype/forms">
-  <Display>DocumentLibraryForm</Display>
-  <Edit>DocumentLibraryForm</Edit>
-  <New>DocumentLibraryForm</New>
-</FormTemplates>
-</file>
-
-<file path=customXml/item2.xml><?xml version="1.0" encoding="utf-8"?>
 <ct:contentTypeSchema xmlns:ct="http://schemas.microsoft.com/office/2006/metadata/contentType" xmlns:ma="http://schemas.microsoft.com/office/2006/metadata/properties/metaAttributes" ct:_="" ma:_="" ma:contentTypeName="Documento" ma:contentTypeID="0x0101000ABC46EDA268834388609BD5B286F917" ma:contentTypeVersion="17" ma:contentTypeDescription="Crear nuevo documento." ma:contentTypeScope="" ma:versionID="b8ef759d716670bba47381dcbb7cab08">
   <xsd:schema xmlns:xsd="http://www.w3.org/2001/XMLSchema" xmlns:xs="http://www.w3.org/2001/XMLSchema" xmlns:p="http://schemas.microsoft.com/office/2006/metadata/properties" xmlns:ns3="98b3f1ad-107c-497c-bb15-64aaebc89f52" xmlns:ns4="a0690ee9-4047-4223-84b2-6b02f926f5d8" targetNamespace="http://schemas.microsoft.com/office/2006/metadata/properties" ma:root="true" ma:fieldsID="f0548e293e02a81e2d97140f47270d75" ns3:_="" ns4:_="">
     <xsd:import namespace="98b3f1ad-107c-497c-bb15-64aaebc89f52"/>
@@ -7241,6 +7360,15 @@
 </ct:contentTypeSchema>
 </file>
 
+<file path=customXml/item2.xml><?xml version="1.0" encoding="utf-8"?>
+<?mso-contentType ?>
+<FormTemplates xmlns="http://schemas.microsoft.com/sharepoint/v3/contenttype/forms">
+  <Display>DocumentLibraryForm</Display>
+  <Edit>DocumentLibraryForm</Edit>
+  <New>DocumentLibraryForm</New>
+</FormTemplates>
+</file>
+
 <file path=customXml/item3.xml><?xml version="1.0" encoding="utf-8"?>
 <p:properties xmlns:p="http://schemas.microsoft.com/office/2006/metadata/properties" xmlns:xsi="http://www.w3.org/2001/XMLSchema-instance" xmlns:pc="http://schemas.microsoft.com/office/infopath/2007/PartnerControls">
   <documentManagement>
@@ -7250,14 +7378,6 @@
 </file>
 
 <file path=customXml/itemProps1.xml><?xml version="1.0" encoding="utf-8"?>
-<ds:datastoreItem xmlns:ds="http://schemas.openxmlformats.org/officeDocument/2006/customXml" ds:itemID="{F5C501D5-0101-419A-AFBB-D8F04111C142}">
-  <ds:schemaRefs>
-    <ds:schemaRef ds:uri="http://schemas.microsoft.com/sharepoint/v3/contenttype/forms"/>
-  </ds:schemaRefs>
-</ds:datastoreItem>
-</file>
-
-<file path=customXml/itemProps2.xml><?xml version="1.0" encoding="utf-8"?>
 <ds:datastoreItem xmlns:ds="http://schemas.openxmlformats.org/officeDocument/2006/customXml" ds:itemID="{3FCEF456-3233-44D6-BC5A-12E8FD4D2764}">
   <ds:schemaRefs>
     <ds:schemaRef ds:uri="http://schemas.microsoft.com/office/2006/metadata/contentType"/>
@@ -7272,6 +7392,14 @@
     <ds:schemaRef ds:uri="http://purl.org/dc/elements/1.1/"/>
     <ds:schemaRef ds:uri="http://purl.org/dc/terms/"/>
     <ds:schemaRef ds:uri="http://schemas.microsoft.com/internal/obd"/>
+  </ds:schemaRefs>
+</ds:datastoreItem>
+</file>
+
+<file path=customXml/itemProps2.xml><?xml version="1.0" encoding="utf-8"?>
+<ds:datastoreItem xmlns:ds="http://schemas.openxmlformats.org/officeDocument/2006/customXml" ds:itemID="{F5C501D5-0101-419A-AFBB-D8F04111C142}">
+  <ds:schemaRefs>
+    <ds:schemaRef ds:uri="http://schemas.microsoft.com/sharepoint/v3/contenttype/forms"/>
   </ds:schemaRefs>
 </ds:datastoreItem>
 </file>

</xml_diff>

<commit_message>
feat: finish new module 3 react router
</commit_message>
<xml_diff>
--- a/Unidad_2/Presentación.pptx
+++ b/Unidad_2/Presentación.pptx
@@ -228,7 +228,7 @@
           <a:p>
             <a:fld id="{F29DC657-A5B9-41B4-AB57-79E3DB3481E8}" type="datetimeFigureOut">
               <a:rPr lang="en-US" smtClean="0"/>
-              <a:t>9/14/2024</a:t>
+              <a:t>9/17/2024</a:t>
             </a:fld>
             <a:endParaRPr lang="en-US"/>
           </a:p>
@@ -663,6 +663,218 @@
 </p:notes>
 </file>
 
+<file path=ppt/notesSlides/notesSlide3.xml><?xml version="1.0" encoding="utf-8"?>
+<p:notes xmlns:a="http://schemas.openxmlformats.org/drawingml/2006/main" xmlns:r="http://schemas.openxmlformats.org/officeDocument/2006/relationships" xmlns:p="http://schemas.openxmlformats.org/presentationml/2006/main">
+  <p:cSld>
+    <p:spTree>
+      <p:nvGrpSpPr>
+        <p:cNvPr id="1" name=""/>
+        <p:cNvGrpSpPr/>
+        <p:nvPr/>
+      </p:nvGrpSpPr>
+      <p:grpSpPr>
+        <a:xfrm>
+          <a:off x="0" y="0"/>
+          <a:ext cx="0" cy="0"/>
+          <a:chOff x="0" y="0"/>
+          <a:chExt cx="0" cy="0"/>
+        </a:xfrm>
+      </p:grpSpPr>
+      <p:sp>
+        <p:nvSpPr>
+          <p:cNvPr id="2" name="Slide Image Placeholder 1"/>
+          <p:cNvSpPr>
+            <a:spLocks noGrp="1" noRot="1" noChangeAspect="1"/>
+          </p:cNvSpPr>
+          <p:nvPr>
+            <p:ph type="sldImg"/>
+          </p:nvPr>
+        </p:nvSpPr>
+        <p:spPr/>
+      </p:sp>
+      <p:sp>
+        <p:nvSpPr>
+          <p:cNvPr id="3" name="Notes Placeholder 2"/>
+          <p:cNvSpPr>
+            <a:spLocks noGrp="1"/>
+          </p:cNvSpPr>
+          <p:nvPr>
+            <p:ph type="body" idx="1"/>
+          </p:nvPr>
+        </p:nvSpPr>
+        <p:spPr/>
+        <p:txBody>
+          <a:bodyPr/>
+          <a:lstStyle/>
+          <a:p>
+            <a:r>
+              <a:rPr lang="en-US" dirty="0" err="1"/>
+              <a:t>Ayudar</a:t>
+            </a:r>
+            <a:r>
+              <a:rPr lang="en-US"/>
+              <a:t> con </a:t>
+            </a:r>
+            <a:r>
+              <a:rPr lang="en-US" dirty="0" err="1"/>
+              <a:t>los</a:t>
+            </a:r>
+            <a:r>
+              <a:rPr lang="en-US" dirty="0"/>
+              <a:t> </a:t>
+            </a:r>
+            <a:r>
+              <a:rPr lang="en-US" dirty="0" err="1"/>
+              <a:t>estilos</a:t>
+            </a:r>
+            <a:r>
+              <a:rPr lang="en-US" dirty="0"/>
+              <a:t> del </a:t>
+            </a:r>
+            <a:r>
+              <a:rPr lang="en-US" dirty="0" err="1"/>
+              <a:t>texto</a:t>
+            </a:r>
+            <a:r>
+              <a:rPr lang="en-US" dirty="0"/>
+              <a:t> </a:t>
+            </a:r>
+            <a:r>
+              <a:rPr lang="en-US" dirty="0" err="1"/>
+              <a:t>en</a:t>
+            </a:r>
+            <a:r>
+              <a:rPr lang="en-US" dirty="0"/>
+              <a:t> </a:t>
+            </a:r>
+            <a:r>
+              <a:rPr lang="en-US" dirty="0" err="1"/>
+              <a:t>verde</a:t>
+            </a:r>
+            <a:r>
+              <a:rPr lang="en-US" dirty="0"/>
+              <a:t>, </a:t>
+            </a:r>
+            <a:r>
+              <a:rPr lang="en-US" dirty="0" err="1"/>
+              <a:t>centrado</a:t>
+            </a:r>
+            <a:r>
+              <a:rPr lang="en-US" dirty="0"/>
+              <a:t> y </a:t>
+            </a:r>
+            <a:r>
+              <a:rPr lang="en-US" dirty="0" err="1"/>
+              <a:t>el</a:t>
+            </a:r>
+            <a:r>
+              <a:rPr lang="en-US" dirty="0"/>
+              <a:t> </a:t>
+            </a:r>
+            <a:r>
+              <a:rPr lang="en-US" dirty="0" err="1"/>
+              <a:t>borde</a:t>
+            </a:r>
+            <a:r>
+              <a:rPr lang="en-US" dirty="0"/>
+              <a:t> del card. </a:t>
+            </a:r>
+            <a:r>
+              <a:rPr lang="en-US" dirty="0" err="1"/>
+              <a:t>Dejar</a:t>
+            </a:r>
+            <a:r>
+              <a:rPr lang="en-US" dirty="0"/>
+              <a:t> </a:t>
+            </a:r>
+            <a:r>
+              <a:rPr lang="en-US" dirty="0" err="1"/>
+              <a:t>el</a:t>
+            </a:r>
+            <a:r>
+              <a:rPr lang="en-US" dirty="0"/>
+              <a:t> resto de la sombra, </a:t>
+            </a:r>
+            <a:r>
+              <a:rPr lang="en-US" dirty="0" err="1"/>
+              <a:t>centrado</a:t>
+            </a:r>
+            <a:r>
+              <a:rPr lang="en-US" dirty="0"/>
+              <a:t> (</a:t>
+            </a:r>
+            <a:r>
+              <a:rPr lang="en-US" dirty="0" err="1"/>
+              <a:t>ver</a:t>
+            </a:r>
+            <a:r>
+              <a:rPr lang="en-US" dirty="0"/>
+              <a:t> y </a:t>
+            </a:r>
+            <a:r>
+              <a:rPr lang="en-US" dirty="0" err="1"/>
+              <a:t>hor</a:t>
+            </a:r>
+            <a:r>
+              <a:rPr lang="en-US" dirty="0"/>
+              <a:t>) a </a:t>
+            </a:r>
+            <a:r>
+              <a:rPr lang="en-US" dirty="0" err="1"/>
+              <a:t>los</a:t>
+            </a:r>
+            <a:r>
+              <a:rPr lang="en-US" dirty="0"/>
+              <a:t> </a:t>
+            </a:r>
+            <a:r>
+              <a:rPr lang="en-US" dirty="0" err="1"/>
+              <a:t>estudiantes</a:t>
+            </a:r>
+            <a:r>
+              <a:rPr lang="en-US" dirty="0"/>
+              <a:t>.</a:t>
+            </a:r>
+            <a:endParaRPr lang="es-EC" dirty="0"/>
+          </a:p>
+        </p:txBody>
+      </p:sp>
+      <p:sp>
+        <p:nvSpPr>
+          <p:cNvPr id="4" name="Slide Number Placeholder 3"/>
+          <p:cNvSpPr>
+            <a:spLocks noGrp="1"/>
+          </p:cNvSpPr>
+          <p:nvPr>
+            <p:ph type="sldNum" sz="quarter" idx="5"/>
+          </p:nvPr>
+        </p:nvSpPr>
+        <p:spPr/>
+        <p:txBody>
+          <a:bodyPr/>
+          <a:lstStyle/>
+          <a:p>
+            <a:fld id="{36CC9BE2-C275-426F-8D4D-ABF95C3D0034}" type="slidenum">
+              <a:rPr lang="en-US" smtClean="0"/>
+              <a:t>14</a:t>
+            </a:fld>
+            <a:endParaRPr lang="en-US"/>
+          </a:p>
+        </p:txBody>
+      </p:sp>
+    </p:spTree>
+    <p:extLst>
+      <p:ext uri="{BB962C8B-B14F-4D97-AF65-F5344CB8AC3E}">
+        <p14:creationId xmlns:p14="http://schemas.microsoft.com/office/powerpoint/2010/main" val="3882194119"/>
+      </p:ext>
+    </p:extLst>
+  </p:cSld>
+  <p:clrMapOvr>
+    <a:masterClrMapping/>
+  </p:clrMapOvr>
+</p:notes>
+</file>
+
 <file path=ppt/slideLayouts/slideLayout1.xml><?xml version="1.0" encoding="utf-8"?>
 <p:sldLayout xmlns:a="http://schemas.openxmlformats.org/drawingml/2006/main" xmlns:r="http://schemas.openxmlformats.org/officeDocument/2006/relationships" xmlns:p="http://schemas.openxmlformats.org/presentationml/2006/main" type="title" preserve="1">
   <p:cSld name="Title Slide">
@@ -810,7 +1022,7 @@
           <a:p>
             <a:fld id="{E0B89D21-97A6-4434-B3B1-BAF5738D61F3}" type="datetimeFigureOut">
               <a:rPr lang="en-US" smtClean="0"/>
-              <a:t>9/14/2024</a:t>
+              <a:t>9/17/2024</a:t>
             </a:fld>
             <a:endParaRPr lang="en-US"/>
           </a:p>
@@ -1008,7 +1220,7 @@
           <a:p>
             <a:fld id="{E0B89D21-97A6-4434-B3B1-BAF5738D61F3}" type="datetimeFigureOut">
               <a:rPr lang="en-US" smtClean="0"/>
-              <a:t>9/14/2024</a:t>
+              <a:t>9/17/2024</a:t>
             </a:fld>
             <a:endParaRPr lang="en-US"/>
           </a:p>
@@ -1216,7 +1428,7 @@
           <a:p>
             <a:fld id="{E0B89D21-97A6-4434-B3B1-BAF5738D61F3}" type="datetimeFigureOut">
               <a:rPr lang="en-US" smtClean="0"/>
-              <a:t>9/14/2024</a:t>
+              <a:t>9/17/2024</a:t>
             </a:fld>
             <a:endParaRPr lang="en-US"/>
           </a:p>
@@ -1483,7 +1695,7 @@
           <a:p>
             <a:fld id="{E0B89D21-97A6-4434-B3B1-BAF5738D61F3}" type="datetimeFigureOut">
               <a:rPr lang="en-US" smtClean="0"/>
-              <a:t>9/14/2024</a:t>
+              <a:t>9/17/2024</a:t>
             </a:fld>
             <a:endParaRPr lang="en-US"/>
           </a:p>
@@ -1758,7 +1970,7 @@
           <a:p>
             <a:fld id="{E0B89D21-97A6-4434-B3B1-BAF5738D61F3}" type="datetimeFigureOut">
               <a:rPr lang="en-US" smtClean="0"/>
-              <a:t>9/14/2024</a:t>
+              <a:t>9/17/2024</a:t>
             </a:fld>
             <a:endParaRPr lang="en-US"/>
           </a:p>
@@ -2023,7 +2235,7 @@
           <a:p>
             <a:fld id="{E0B89D21-97A6-4434-B3B1-BAF5738D61F3}" type="datetimeFigureOut">
               <a:rPr lang="en-US" smtClean="0"/>
-              <a:t>9/14/2024</a:t>
+              <a:t>9/17/2024</a:t>
             </a:fld>
             <a:endParaRPr lang="en-US"/>
           </a:p>
@@ -2435,7 +2647,7 @@
           <a:p>
             <a:fld id="{E0B89D21-97A6-4434-B3B1-BAF5738D61F3}" type="datetimeFigureOut">
               <a:rPr lang="en-US" smtClean="0"/>
-              <a:t>9/14/2024</a:t>
+              <a:t>9/17/2024</a:t>
             </a:fld>
             <a:endParaRPr lang="en-US"/>
           </a:p>
@@ -2576,7 +2788,7 @@
           <a:p>
             <a:fld id="{E0B89D21-97A6-4434-B3B1-BAF5738D61F3}" type="datetimeFigureOut">
               <a:rPr lang="en-US" smtClean="0"/>
-              <a:t>9/14/2024</a:t>
+              <a:t>9/17/2024</a:t>
             </a:fld>
             <a:endParaRPr lang="en-US"/>
           </a:p>
@@ -2689,7 +2901,7 @@
           <a:p>
             <a:fld id="{E0B89D21-97A6-4434-B3B1-BAF5738D61F3}" type="datetimeFigureOut">
               <a:rPr lang="en-US" smtClean="0"/>
-              <a:t>9/14/2024</a:t>
+              <a:t>9/17/2024</a:t>
             </a:fld>
             <a:endParaRPr lang="en-US"/>
           </a:p>
@@ -3000,7 +3212,7 @@
           <a:p>
             <a:fld id="{E0B89D21-97A6-4434-B3B1-BAF5738D61F3}" type="datetimeFigureOut">
               <a:rPr lang="en-US" smtClean="0"/>
-              <a:t>9/14/2024</a:t>
+              <a:t>9/17/2024</a:t>
             </a:fld>
             <a:endParaRPr lang="en-US"/>
           </a:p>
@@ -3288,7 +3500,7 @@
           <a:p>
             <a:fld id="{E0B89D21-97A6-4434-B3B1-BAF5738D61F3}" type="datetimeFigureOut">
               <a:rPr lang="en-US" smtClean="0"/>
-              <a:t>9/14/2024</a:t>
+              <a:t>9/17/2024</a:t>
             </a:fld>
             <a:endParaRPr lang="en-US"/>
           </a:p>
@@ -3529,7 +3741,7 @@
           <a:p>
             <a:fld id="{E0B89D21-97A6-4434-B3B1-BAF5738D61F3}" type="datetimeFigureOut">
               <a:rPr lang="en-US" smtClean="0"/>
-              <a:t>9/14/2024</a:t>
+              <a:t>9/17/2024</a:t>
             </a:fld>
             <a:endParaRPr lang="en-US"/>
           </a:p>
@@ -4638,7 +4850,7 @@
           <p:nvPr/>
         </p:nvPicPr>
         <p:blipFill>
-          <a:blip r:embed="rId2"/>
+          <a:blip r:embed="rId3"/>
           <a:stretch>
             <a:fillRect/>
           </a:stretch>
@@ -4687,7 +4899,7 @@
             </a:r>
             <a:r>
               <a:rPr lang="es-EC" sz="2800" dirty="0">
-                <a:hlinkClick r:id="rId3"/>
+                <a:hlinkClick r:id="rId4"/>
               </a:rPr>
               <a:t>https://tailwindcss.com/docs</a:t>
             </a:r>
@@ -7361,20 +7573,20 @@
 </file>
 
 <file path=customXml/item2.xml><?xml version="1.0" encoding="utf-8"?>
+<p:properties xmlns:p="http://schemas.microsoft.com/office/2006/metadata/properties" xmlns:xsi="http://www.w3.org/2001/XMLSchema-instance" xmlns:pc="http://schemas.microsoft.com/office/infopath/2007/PartnerControls">
+  <documentManagement>
+    <_activity xmlns="98b3f1ad-107c-497c-bb15-64aaebc89f52" xsi:nil="true"/>
+  </documentManagement>
+</p:properties>
+</file>
+
+<file path=customXml/item3.xml><?xml version="1.0" encoding="utf-8"?>
 <?mso-contentType ?>
 <FormTemplates xmlns="http://schemas.microsoft.com/sharepoint/v3/contenttype/forms">
   <Display>DocumentLibraryForm</Display>
   <Edit>DocumentLibraryForm</Edit>
   <New>DocumentLibraryForm</New>
 </FormTemplates>
-</file>
-
-<file path=customXml/item3.xml><?xml version="1.0" encoding="utf-8"?>
-<p:properties xmlns:p="http://schemas.microsoft.com/office/2006/metadata/properties" xmlns:xsi="http://www.w3.org/2001/XMLSchema-instance" xmlns:pc="http://schemas.microsoft.com/office/infopath/2007/PartnerControls">
-  <documentManagement>
-    <_activity xmlns="98b3f1ad-107c-497c-bb15-64aaebc89f52" xsi:nil="true"/>
-  </documentManagement>
-</p:properties>
 </file>
 
 <file path=customXml/itemProps1.xml><?xml version="1.0" encoding="utf-8"?>
@@ -7397,14 +7609,6 @@
 </file>
 
 <file path=customXml/itemProps2.xml><?xml version="1.0" encoding="utf-8"?>
-<ds:datastoreItem xmlns:ds="http://schemas.openxmlformats.org/officeDocument/2006/customXml" ds:itemID="{F5C501D5-0101-419A-AFBB-D8F04111C142}">
-  <ds:schemaRefs>
-    <ds:schemaRef ds:uri="http://schemas.microsoft.com/sharepoint/v3/contenttype/forms"/>
-  </ds:schemaRefs>
-</ds:datastoreItem>
-</file>
-
-<file path=customXml/itemProps3.xml><?xml version="1.0" encoding="utf-8"?>
 <ds:datastoreItem xmlns:ds="http://schemas.openxmlformats.org/officeDocument/2006/customXml" ds:itemID="{EEC6291A-1BB8-4D31-80EF-6AAECF11ECF7}">
   <ds:schemaRefs>
     <ds:schemaRef ds:uri="a0690ee9-4047-4223-84b2-6b02f926f5d8"/>
@@ -7419,4 +7623,12 @@
     <ds:schemaRef ds:uri="http://schemas.openxmlformats.org/package/2006/metadata/core-properties"/>
   </ds:schemaRefs>
 </ds:datastoreItem>
+</file>
+
+<file path=customXml/itemProps3.xml><?xml version="1.0" encoding="utf-8"?>
+<ds:datastoreItem xmlns:ds="http://schemas.openxmlformats.org/officeDocument/2006/customXml" ds:itemID="{F5C501D5-0101-419A-AFBB-D8F04111C142}">
+  <ds:schemaRefs>
+    <ds:schemaRef ds:uri="http://schemas.microsoft.com/sharepoint/v3/contenttype/forms"/>
+  </ds:schemaRefs>
+</ds:datastoreItem>
 </file>
</xml_diff>

<commit_message>
feat: add react-query example
</commit_message>
<xml_diff>
--- a/Unidad_2/Presentación.pptx
+++ b/Unidad_2/Presentación.pptx
@@ -5,30 +5,31 @@
     <p:sldMasterId id="2147483648" r:id="rId4"/>
   </p:sldMasterIdLst>
   <p:notesMasterIdLst>
-    <p:notesMasterId r:id="rId26"/>
+    <p:notesMasterId r:id="rId27"/>
   </p:notesMasterIdLst>
   <p:sldIdLst>
     <p:sldId id="256" r:id="rId5"/>
-    <p:sldId id="257" r:id="rId6"/>
-    <p:sldId id="258" r:id="rId7"/>
-    <p:sldId id="259" r:id="rId8"/>
-    <p:sldId id="260" r:id="rId9"/>
-    <p:sldId id="261" r:id="rId10"/>
-    <p:sldId id="262" r:id="rId11"/>
-    <p:sldId id="264" r:id="rId12"/>
-    <p:sldId id="263" r:id="rId13"/>
-    <p:sldId id="265" r:id="rId14"/>
-    <p:sldId id="271" r:id="rId15"/>
-    <p:sldId id="267" r:id="rId16"/>
-    <p:sldId id="268" r:id="rId17"/>
-    <p:sldId id="269" r:id="rId18"/>
-    <p:sldId id="278" r:id="rId19"/>
-    <p:sldId id="277" r:id="rId20"/>
-    <p:sldId id="274" r:id="rId21"/>
-    <p:sldId id="273" r:id="rId22"/>
-    <p:sldId id="275" r:id="rId23"/>
-    <p:sldId id="276" r:id="rId24"/>
-    <p:sldId id="279" r:id="rId25"/>
+    <p:sldId id="265" r:id="rId6"/>
+    <p:sldId id="271" r:id="rId7"/>
+    <p:sldId id="267" r:id="rId8"/>
+    <p:sldId id="268" r:id="rId9"/>
+    <p:sldId id="269" r:id="rId10"/>
+    <p:sldId id="278" r:id="rId11"/>
+    <p:sldId id="277" r:id="rId12"/>
+    <p:sldId id="274" r:id="rId13"/>
+    <p:sldId id="273" r:id="rId14"/>
+    <p:sldId id="275" r:id="rId15"/>
+    <p:sldId id="276" r:id="rId16"/>
+    <p:sldId id="279" r:id="rId17"/>
+    <p:sldId id="280" r:id="rId18"/>
+    <p:sldId id="257" r:id="rId19"/>
+    <p:sldId id="258" r:id="rId20"/>
+    <p:sldId id="259" r:id="rId21"/>
+    <p:sldId id="260" r:id="rId22"/>
+    <p:sldId id="261" r:id="rId23"/>
+    <p:sldId id="262" r:id="rId24"/>
+    <p:sldId id="264" r:id="rId25"/>
+    <p:sldId id="263" r:id="rId26"/>
   </p:sldIdLst>
   <p:sldSz cx="12192000" cy="6858000"/>
   <p:notesSz cx="6858000" cy="9144000"/>
@@ -228,7 +229,7 @@
           <a:p>
             <a:fld id="{F29DC657-A5B9-41B4-AB57-79E3DB3481E8}" type="datetimeFigureOut">
               <a:rPr lang="en-US" smtClean="0"/>
-              <a:t>9/17/2024</a:t>
+              <a:t>9/21/2024</a:t>
             </a:fld>
             <a:endParaRPr lang="en-US"/>
           </a:p>
@@ -623,6 +624,134 @@
           <a:bodyPr/>
           <a:lstStyle/>
           <a:p>
+            <a:r>
+              <a:rPr lang="en-US" dirty="0" err="1"/>
+              <a:t>Ayudar</a:t>
+            </a:r>
+            <a:r>
+              <a:rPr lang="en-US"/>
+              <a:t> con </a:t>
+            </a:r>
+            <a:r>
+              <a:rPr lang="en-US" dirty="0" err="1"/>
+              <a:t>los</a:t>
+            </a:r>
+            <a:r>
+              <a:rPr lang="en-US" dirty="0"/>
+              <a:t> </a:t>
+            </a:r>
+            <a:r>
+              <a:rPr lang="en-US" dirty="0" err="1"/>
+              <a:t>estilos</a:t>
+            </a:r>
+            <a:r>
+              <a:rPr lang="en-US" dirty="0"/>
+              <a:t> del </a:t>
+            </a:r>
+            <a:r>
+              <a:rPr lang="en-US" dirty="0" err="1"/>
+              <a:t>texto</a:t>
+            </a:r>
+            <a:r>
+              <a:rPr lang="en-US" dirty="0"/>
+              <a:t> </a:t>
+            </a:r>
+            <a:r>
+              <a:rPr lang="en-US" dirty="0" err="1"/>
+              <a:t>en</a:t>
+            </a:r>
+            <a:r>
+              <a:rPr lang="en-US" dirty="0"/>
+              <a:t> </a:t>
+            </a:r>
+            <a:r>
+              <a:rPr lang="en-US" dirty="0" err="1"/>
+              <a:t>verde</a:t>
+            </a:r>
+            <a:r>
+              <a:rPr lang="en-US" dirty="0"/>
+              <a:t>, </a:t>
+            </a:r>
+            <a:r>
+              <a:rPr lang="en-US" dirty="0" err="1"/>
+              <a:t>centrado</a:t>
+            </a:r>
+            <a:r>
+              <a:rPr lang="en-US" dirty="0"/>
+              <a:t> y </a:t>
+            </a:r>
+            <a:r>
+              <a:rPr lang="en-US" dirty="0" err="1"/>
+              <a:t>el</a:t>
+            </a:r>
+            <a:r>
+              <a:rPr lang="en-US" dirty="0"/>
+              <a:t> </a:t>
+            </a:r>
+            <a:r>
+              <a:rPr lang="en-US" dirty="0" err="1"/>
+              <a:t>borde</a:t>
+            </a:r>
+            <a:r>
+              <a:rPr lang="en-US" dirty="0"/>
+              <a:t> del card. </a:t>
+            </a:r>
+            <a:r>
+              <a:rPr lang="en-US" dirty="0" err="1"/>
+              <a:t>Dejar</a:t>
+            </a:r>
+            <a:r>
+              <a:rPr lang="en-US" dirty="0"/>
+              <a:t> </a:t>
+            </a:r>
+            <a:r>
+              <a:rPr lang="en-US" dirty="0" err="1"/>
+              <a:t>el</a:t>
+            </a:r>
+            <a:r>
+              <a:rPr lang="en-US" dirty="0"/>
+              <a:t> resto de la sombra, </a:t>
+            </a:r>
+            <a:r>
+              <a:rPr lang="en-US" dirty="0" err="1"/>
+              <a:t>centrado</a:t>
+            </a:r>
+            <a:r>
+              <a:rPr lang="en-US" dirty="0"/>
+              <a:t> (</a:t>
+            </a:r>
+            <a:r>
+              <a:rPr lang="en-US" dirty="0" err="1"/>
+              <a:t>ver</a:t>
+            </a:r>
+            <a:r>
+              <a:rPr lang="en-US" dirty="0"/>
+              <a:t> y </a:t>
+            </a:r>
+            <a:r>
+              <a:rPr lang="en-US" dirty="0" err="1"/>
+              <a:t>hor</a:t>
+            </a:r>
+            <a:r>
+              <a:rPr lang="en-US" dirty="0"/>
+              <a:t>) a </a:t>
+            </a:r>
+            <a:r>
+              <a:rPr lang="en-US" dirty="0" err="1"/>
+              <a:t>los</a:t>
+            </a:r>
+            <a:r>
+              <a:rPr lang="en-US" dirty="0"/>
+              <a:t> </a:t>
+            </a:r>
+            <a:r>
+              <a:rPr lang="en-US" dirty="0" err="1"/>
+              <a:t>estudiantes</a:t>
+            </a:r>
+            <a:r>
+              <a:rPr lang="en-US" dirty="0"/>
+              <a:t>.</a:t>
+            </a:r>
             <a:endParaRPr lang="es-EC" dirty="0"/>
           </a:p>
         </p:txBody>
@@ -644,7 +773,7 @@
           <a:p>
             <a:fld id="{36CC9BE2-C275-426F-8D4D-ABF95C3D0034}" type="slidenum">
               <a:rPr lang="en-US" smtClean="0"/>
-              <a:t>2</a:t>
+              <a:t>6</a:t>
             </a:fld>
             <a:endParaRPr lang="en-US"/>
           </a:p>
@@ -653,7 +782,7 @@
     </p:spTree>
     <p:extLst>
       <p:ext uri="{BB962C8B-B14F-4D97-AF65-F5344CB8AC3E}">
-        <p14:creationId xmlns:p14="http://schemas.microsoft.com/office/powerpoint/2010/main" val="1202091023"/>
+        <p14:creationId xmlns:p14="http://schemas.microsoft.com/office/powerpoint/2010/main" val="3882194119"/>
       </p:ext>
     </p:extLst>
   </p:cSld>
@@ -707,134 +836,6 @@
           <a:bodyPr/>
           <a:lstStyle/>
           <a:p>
-            <a:r>
-              <a:rPr lang="en-US" dirty="0" err="1"/>
-              <a:t>Ayudar</a:t>
-            </a:r>
-            <a:r>
-              <a:rPr lang="en-US"/>
-              <a:t> con </a:t>
-            </a:r>
-            <a:r>
-              <a:rPr lang="en-US" dirty="0" err="1"/>
-              <a:t>los</a:t>
-            </a:r>
-            <a:r>
-              <a:rPr lang="en-US" dirty="0"/>
-              <a:t> </a:t>
-            </a:r>
-            <a:r>
-              <a:rPr lang="en-US" dirty="0" err="1"/>
-              <a:t>estilos</a:t>
-            </a:r>
-            <a:r>
-              <a:rPr lang="en-US" dirty="0"/>
-              <a:t> del </a:t>
-            </a:r>
-            <a:r>
-              <a:rPr lang="en-US" dirty="0" err="1"/>
-              <a:t>texto</a:t>
-            </a:r>
-            <a:r>
-              <a:rPr lang="en-US" dirty="0"/>
-              <a:t> </a:t>
-            </a:r>
-            <a:r>
-              <a:rPr lang="en-US" dirty="0" err="1"/>
-              <a:t>en</a:t>
-            </a:r>
-            <a:r>
-              <a:rPr lang="en-US" dirty="0"/>
-              <a:t> </a:t>
-            </a:r>
-            <a:r>
-              <a:rPr lang="en-US" dirty="0" err="1"/>
-              <a:t>verde</a:t>
-            </a:r>
-            <a:r>
-              <a:rPr lang="en-US" dirty="0"/>
-              <a:t>, </a:t>
-            </a:r>
-            <a:r>
-              <a:rPr lang="en-US" dirty="0" err="1"/>
-              <a:t>centrado</a:t>
-            </a:r>
-            <a:r>
-              <a:rPr lang="en-US" dirty="0"/>
-              <a:t> y </a:t>
-            </a:r>
-            <a:r>
-              <a:rPr lang="en-US" dirty="0" err="1"/>
-              <a:t>el</a:t>
-            </a:r>
-            <a:r>
-              <a:rPr lang="en-US" dirty="0"/>
-              <a:t> </a:t>
-            </a:r>
-            <a:r>
-              <a:rPr lang="en-US" dirty="0" err="1"/>
-              <a:t>borde</a:t>
-            </a:r>
-            <a:r>
-              <a:rPr lang="en-US" dirty="0"/>
-              <a:t> del card. </a:t>
-            </a:r>
-            <a:r>
-              <a:rPr lang="en-US" dirty="0" err="1"/>
-              <a:t>Dejar</a:t>
-            </a:r>
-            <a:r>
-              <a:rPr lang="en-US" dirty="0"/>
-              <a:t> </a:t>
-            </a:r>
-            <a:r>
-              <a:rPr lang="en-US" dirty="0" err="1"/>
-              <a:t>el</a:t>
-            </a:r>
-            <a:r>
-              <a:rPr lang="en-US" dirty="0"/>
-              <a:t> resto de la sombra, </a:t>
-            </a:r>
-            <a:r>
-              <a:rPr lang="en-US" dirty="0" err="1"/>
-              <a:t>centrado</a:t>
-            </a:r>
-            <a:r>
-              <a:rPr lang="en-US" dirty="0"/>
-              <a:t> (</a:t>
-            </a:r>
-            <a:r>
-              <a:rPr lang="en-US" dirty="0" err="1"/>
-              <a:t>ver</a:t>
-            </a:r>
-            <a:r>
-              <a:rPr lang="en-US" dirty="0"/>
-              <a:t> y </a:t>
-            </a:r>
-            <a:r>
-              <a:rPr lang="en-US" dirty="0" err="1"/>
-              <a:t>hor</a:t>
-            </a:r>
-            <a:r>
-              <a:rPr lang="en-US" dirty="0"/>
-              <a:t>) a </a:t>
-            </a:r>
-            <a:r>
-              <a:rPr lang="en-US" dirty="0" err="1"/>
-              <a:t>los</a:t>
-            </a:r>
-            <a:r>
-              <a:rPr lang="en-US" dirty="0"/>
-              <a:t> </a:t>
-            </a:r>
-            <a:r>
-              <a:rPr lang="en-US" dirty="0" err="1"/>
-              <a:t>estudiantes</a:t>
-            </a:r>
-            <a:r>
-              <a:rPr lang="en-US" dirty="0"/>
-              <a:t>.</a:t>
-            </a:r>
             <a:endParaRPr lang="es-EC" dirty="0"/>
           </a:p>
         </p:txBody>
@@ -856,7 +857,7 @@
           <a:p>
             <a:fld id="{36CC9BE2-C275-426F-8D4D-ABF95C3D0034}" type="slidenum">
               <a:rPr lang="en-US" smtClean="0"/>
-              <a:t>14</a:t>
+              <a:t>15</a:t>
             </a:fld>
             <a:endParaRPr lang="en-US"/>
           </a:p>
@@ -865,7 +866,7 @@
     </p:spTree>
     <p:extLst>
       <p:ext uri="{BB962C8B-B14F-4D97-AF65-F5344CB8AC3E}">
-        <p14:creationId xmlns:p14="http://schemas.microsoft.com/office/powerpoint/2010/main" val="3882194119"/>
+        <p14:creationId xmlns:p14="http://schemas.microsoft.com/office/powerpoint/2010/main" val="1202091023"/>
       </p:ext>
     </p:extLst>
   </p:cSld>
@@ -1022,7 +1023,7 @@
           <a:p>
             <a:fld id="{E0B89D21-97A6-4434-B3B1-BAF5738D61F3}" type="datetimeFigureOut">
               <a:rPr lang="en-US" smtClean="0"/>
-              <a:t>9/17/2024</a:t>
+              <a:t>9/21/2024</a:t>
             </a:fld>
             <a:endParaRPr lang="en-US"/>
           </a:p>
@@ -1220,7 +1221,7 @@
           <a:p>
             <a:fld id="{E0B89D21-97A6-4434-B3B1-BAF5738D61F3}" type="datetimeFigureOut">
               <a:rPr lang="en-US" smtClean="0"/>
-              <a:t>9/17/2024</a:t>
+              <a:t>9/21/2024</a:t>
             </a:fld>
             <a:endParaRPr lang="en-US"/>
           </a:p>
@@ -1428,7 +1429,7 @@
           <a:p>
             <a:fld id="{E0B89D21-97A6-4434-B3B1-BAF5738D61F3}" type="datetimeFigureOut">
               <a:rPr lang="en-US" smtClean="0"/>
-              <a:t>9/17/2024</a:t>
+              <a:t>9/21/2024</a:t>
             </a:fld>
             <a:endParaRPr lang="en-US"/>
           </a:p>
@@ -1695,7 +1696,7 @@
           <a:p>
             <a:fld id="{E0B89D21-97A6-4434-B3B1-BAF5738D61F3}" type="datetimeFigureOut">
               <a:rPr lang="en-US" smtClean="0"/>
-              <a:t>9/17/2024</a:t>
+              <a:t>9/21/2024</a:t>
             </a:fld>
             <a:endParaRPr lang="en-US"/>
           </a:p>
@@ -1970,7 +1971,7 @@
           <a:p>
             <a:fld id="{E0B89D21-97A6-4434-B3B1-BAF5738D61F3}" type="datetimeFigureOut">
               <a:rPr lang="en-US" smtClean="0"/>
-              <a:t>9/17/2024</a:t>
+              <a:t>9/21/2024</a:t>
             </a:fld>
             <a:endParaRPr lang="en-US"/>
           </a:p>
@@ -2235,7 +2236,7 @@
           <a:p>
             <a:fld id="{E0B89D21-97A6-4434-B3B1-BAF5738D61F3}" type="datetimeFigureOut">
               <a:rPr lang="en-US" smtClean="0"/>
-              <a:t>9/17/2024</a:t>
+              <a:t>9/21/2024</a:t>
             </a:fld>
             <a:endParaRPr lang="en-US"/>
           </a:p>
@@ -2647,7 +2648,7 @@
           <a:p>
             <a:fld id="{E0B89D21-97A6-4434-B3B1-BAF5738D61F3}" type="datetimeFigureOut">
               <a:rPr lang="en-US" smtClean="0"/>
-              <a:t>9/17/2024</a:t>
+              <a:t>9/21/2024</a:t>
             </a:fld>
             <a:endParaRPr lang="en-US"/>
           </a:p>
@@ -2788,7 +2789,7 @@
           <a:p>
             <a:fld id="{E0B89D21-97A6-4434-B3B1-BAF5738D61F3}" type="datetimeFigureOut">
               <a:rPr lang="en-US" smtClean="0"/>
-              <a:t>9/17/2024</a:t>
+              <a:t>9/21/2024</a:t>
             </a:fld>
             <a:endParaRPr lang="en-US"/>
           </a:p>
@@ -2901,7 +2902,7 @@
           <a:p>
             <a:fld id="{E0B89D21-97A6-4434-B3B1-BAF5738D61F3}" type="datetimeFigureOut">
               <a:rPr lang="en-US" smtClean="0"/>
-              <a:t>9/17/2024</a:t>
+              <a:t>9/21/2024</a:t>
             </a:fld>
             <a:endParaRPr lang="en-US"/>
           </a:p>
@@ -3212,7 +3213,7 @@
           <a:p>
             <a:fld id="{E0B89D21-97A6-4434-B3B1-BAF5738D61F3}" type="datetimeFigureOut">
               <a:rPr lang="en-US" smtClean="0"/>
-              <a:t>9/17/2024</a:t>
+              <a:t>9/21/2024</a:t>
             </a:fld>
             <a:endParaRPr lang="en-US"/>
           </a:p>
@@ -3500,7 +3501,7 @@
           <a:p>
             <a:fld id="{E0B89D21-97A6-4434-B3B1-BAF5738D61F3}" type="datetimeFigureOut">
               <a:rPr lang="en-US" smtClean="0"/>
-              <a:t>9/17/2024</a:t>
+              <a:t>9/21/2024</a:t>
             </a:fld>
             <a:endParaRPr lang="en-US"/>
           </a:p>
@@ -3741,7 +3742,7 @@
           <a:p>
             <a:fld id="{E0B89D21-97A6-4434-B3B1-BAF5738D61F3}" type="datetimeFigureOut">
               <a:rPr lang="en-US" smtClean="0"/>
-              <a:t>9/17/2024</a:t>
+              <a:t>9/21/2024</a:t>
             </a:fld>
             <a:endParaRPr lang="en-US"/>
           </a:p>
@@ -4252,963 +4253,6 @@
           <a:chExt cx="0" cy="0"/>
         </a:xfrm>
       </p:grpSpPr>
-      <p:sp useBgFill="1">
-        <p:nvSpPr>
-          <p:cNvPr id="2057" name="Rectangle 2056">
-            <a:extLst>
-              <a:ext uri="{FF2B5EF4-FFF2-40B4-BE49-F238E27FC236}">
-                <a16:creationId xmlns:a16="http://schemas.microsoft.com/office/drawing/2014/main" id="{99ED5833-B85B-4103-8A3B-CAB0308E6C15}"/>
-              </a:ext>
-              <a:ext uri="{C183D7F6-B498-43B3-948B-1728B52AA6E4}">
-                <adec:decorative xmlns:adec="http://schemas.microsoft.com/office/drawing/2017/decorative" val="1"/>
-              </a:ext>
-            </a:extLst>
-          </p:cNvPr>
-          <p:cNvSpPr>
-            <a:spLocks noGrp="1" noRot="1" noChangeAspect="1" noMove="1" noResize="1" noEditPoints="1" noAdjustHandles="1" noChangeArrowheads="1" noChangeShapeType="1" noTextEdit="1"/>
-          </p:cNvSpPr>
-          <p:nvPr>
-            <p:extLst>
-              <p:ext uri="{386F3935-93C4-4BCD-93E2-E3B085C9AB24}">
-                <p16:designElem xmlns:p16="http://schemas.microsoft.com/office/powerpoint/2015/main" val="1"/>
-              </p:ext>
-            </p:extLst>
-          </p:nvPr>
-        </p:nvSpPr>
-        <p:spPr>
-          <a:xfrm>
-            <a:off x="-1" y="0"/>
-            <a:ext cx="12188952" cy="6858000"/>
-          </a:xfrm>
-          <a:prstGeom prst="rect">
-            <a:avLst/>
-          </a:prstGeom>
-          <a:ln>
-            <a:noFill/>
-          </a:ln>
-        </p:spPr>
-        <p:style>
-          <a:lnRef idx="2">
-            <a:schemeClr val="accent1">
-              <a:shade val="50000"/>
-            </a:schemeClr>
-          </a:lnRef>
-          <a:fillRef idx="1">
-            <a:schemeClr val="accent1"/>
-          </a:fillRef>
-          <a:effectRef idx="0">
-            <a:schemeClr val="accent1"/>
-          </a:effectRef>
-          <a:fontRef idx="minor">
-            <a:schemeClr val="lt1"/>
-          </a:fontRef>
-        </p:style>
-        <p:txBody>
-          <a:bodyPr rtlCol="0" anchor="ctr"/>
-          <a:lstStyle/>
-          <a:p>
-            <a:pPr algn="ctr"/>
-            <a:endParaRPr lang="en-US"/>
-          </a:p>
-        </p:txBody>
-      </p:sp>
-      <p:sp>
-        <p:nvSpPr>
-          <p:cNvPr id="2" name="Title 1">
-            <a:extLst>
-              <a:ext uri="{FF2B5EF4-FFF2-40B4-BE49-F238E27FC236}">
-                <a16:creationId xmlns:a16="http://schemas.microsoft.com/office/drawing/2014/main" id="{26F204F4-9C43-4EF1-1ADA-822ACDC32689}"/>
-              </a:ext>
-            </a:extLst>
-          </p:cNvPr>
-          <p:cNvSpPr>
-            <a:spLocks noGrp="1"/>
-          </p:cNvSpPr>
-          <p:nvPr>
-            <p:ph type="title"/>
-          </p:nvPr>
-        </p:nvSpPr>
-        <p:spPr>
-          <a:xfrm>
-            <a:off x="838200" y="365125"/>
-            <a:ext cx="10515600" cy="1860400"/>
-          </a:xfrm>
-        </p:spPr>
-        <p:txBody>
-          <a:bodyPr vert="horz" lIns="91440" tIns="45720" rIns="91440" bIns="45720" rtlCol="0" anchor="ctr">
-            <a:normAutofit/>
-          </a:bodyPr>
-          <a:lstStyle/>
-          <a:p>
-            <a:r>
-              <a:rPr lang="en-US" sz="5200" kern="1200">
-                <a:solidFill>
-                  <a:schemeClr val="tx1"/>
-                </a:solidFill>
-                <a:latin typeface="+mj-lt"/>
-                <a:ea typeface="+mj-ea"/>
-                <a:cs typeface="+mj-cs"/>
-              </a:rPr>
-              <a:t>Librerías para estilos</a:t>
-            </a:r>
-          </a:p>
-        </p:txBody>
-      </p:sp>
-      <p:pic>
-        <p:nvPicPr>
-          <p:cNvPr id="2052" name="Picture 4" descr="GitHub - styled-components/styled-components: Visual primitives for the  component age. Use the best bits of ES6 and CSS to style your apps without  stress 💅">
-            <a:extLst>
-              <a:ext uri="{FF2B5EF4-FFF2-40B4-BE49-F238E27FC236}">
-                <a16:creationId xmlns:a16="http://schemas.microsoft.com/office/drawing/2014/main" id="{EF87B2C7-6222-2D1C-9CCB-1958FA04ACC7}"/>
-              </a:ext>
-            </a:extLst>
-          </p:cNvPr>
-          <p:cNvPicPr>
-            <a:picLocks noChangeAspect="1" noChangeArrowheads="1"/>
-          </p:cNvPicPr>
-          <p:nvPr/>
-        </p:nvPicPr>
-        <p:blipFill>
-          <a:blip r:embed="rId2">
-            <a:extLst>
-              <a:ext uri="{28A0092B-C50C-407E-A947-70E740481C1C}">
-                <a14:useLocalDpi xmlns:a14="http://schemas.microsoft.com/office/drawing/2010/main" val="0"/>
-              </a:ext>
-            </a:extLst>
-          </a:blip>
-          <a:stretch>
-            <a:fillRect/>
-          </a:stretch>
-        </p:blipFill>
-        <p:spPr bwMode="auto">
-          <a:xfrm>
-            <a:off x="1125986" y="2365285"/>
-            <a:ext cx="3938756" cy="3938756"/>
-          </a:xfrm>
-          <a:prstGeom prst="rect">
-            <a:avLst/>
-          </a:prstGeom>
-          <a:noFill/>
-          <a:extLst>
-            <a:ext uri="{909E8E84-426E-40DD-AFC4-6F175D3DCCD1}">
-              <a14:hiddenFill xmlns:a14="http://schemas.microsoft.com/office/drawing/2010/main">
-                <a:solidFill>
-                  <a:srgbClr val="FFFFFF"/>
-                </a:solidFill>
-              </a14:hiddenFill>
-            </a:ext>
-          </a:extLst>
-        </p:spPr>
-      </p:pic>
-      <p:pic>
-        <p:nvPicPr>
-          <p:cNvPr id="2050" name="Picture 2" descr="The first alpha of Tailwind CSS v3 is now released - Laravel News">
-            <a:extLst>
-              <a:ext uri="{FF2B5EF4-FFF2-40B4-BE49-F238E27FC236}">
-                <a16:creationId xmlns:a16="http://schemas.microsoft.com/office/drawing/2014/main" id="{BAD1FCD7-6593-1FCB-E1D6-E3E24D5C38D1}"/>
-              </a:ext>
-            </a:extLst>
-          </p:cNvPr>
-          <p:cNvPicPr>
-            <a:picLocks noChangeAspect="1" noChangeArrowheads="1"/>
-          </p:cNvPicPr>
-          <p:nvPr/>
-        </p:nvPicPr>
-        <p:blipFill>
-          <a:blip r:embed="rId3">
-            <a:extLst>
-              <a:ext uri="{28A0092B-C50C-407E-A947-70E740481C1C}">
-                <a14:useLocalDpi xmlns:a14="http://schemas.microsoft.com/office/drawing/2010/main" val="0"/>
-              </a:ext>
-            </a:extLst>
-          </a:blip>
-          <a:stretch>
-            <a:fillRect/>
-          </a:stretch>
-        </p:blipFill>
-        <p:spPr bwMode="auto">
-          <a:xfrm>
-            <a:off x="5246828" y="2487833"/>
-            <a:ext cx="6760036" cy="3380017"/>
-          </a:xfrm>
-          <a:prstGeom prst="rect">
-            <a:avLst/>
-          </a:prstGeom>
-          <a:noFill/>
-          <a:extLst>
-            <a:ext uri="{909E8E84-426E-40DD-AFC4-6F175D3DCCD1}">
-              <a14:hiddenFill xmlns:a14="http://schemas.microsoft.com/office/drawing/2010/main">
-                <a:solidFill>
-                  <a:srgbClr val="FFFFFF"/>
-                </a:solidFill>
-              </a14:hiddenFill>
-            </a:ext>
-          </a:extLst>
-        </p:spPr>
-      </p:pic>
-    </p:spTree>
-    <p:extLst>
-      <p:ext uri="{BB962C8B-B14F-4D97-AF65-F5344CB8AC3E}">
-        <p14:creationId xmlns:p14="http://schemas.microsoft.com/office/powerpoint/2010/main" val="1495541469"/>
-      </p:ext>
-    </p:extLst>
-  </p:cSld>
-  <p:clrMapOvr>
-    <a:masterClrMapping/>
-  </p:clrMapOvr>
-</p:sld>
-</file>
-
-<file path=ppt/slides/slide11.xml><?xml version="1.0" encoding="utf-8"?>
-<p:sld xmlns:a="http://schemas.openxmlformats.org/drawingml/2006/main" xmlns:r="http://schemas.openxmlformats.org/officeDocument/2006/relationships" xmlns:p="http://schemas.openxmlformats.org/presentationml/2006/main">
-  <p:cSld>
-    <p:bg>
-      <p:bgPr>
-        <a:solidFill>
-          <a:schemeClr val="bg1"/>
-        </a:solidFill>
-        <a:effectLst/>
-      </p:bgPr>
-    </p:bg>
-    <p:spTree>
-      <p:nvGrpSpPr>
-        <p:cNvPr id="1" name=""/>
-        <p:cNvGrpSpPr/>
-        <p:nvPr/>
-      </p:nvGrpSpPr>
-      <p:grpSpPr>
-        <a:xfrm>
-          <a:off x="0" y="0"/>
-          <a:ext cx="0" cy="0"/>
-          <a:chOff x="0" y="0"/>
-          <a:chExt cx="0" cy="0"/>
-        </a:xfrm>
-      </p:grpSpPr>
-      <p:sp useBgFill="1">
-        <p:nvSpPr>
-          <p:cNvPr id="3079" name="Rectangle 3078">
-            <a:extLst>
-              <a:ext uri="{FF2B5EF4-FFF2-40B4-BE49-F238E27FC236}">
-                <a16:creationId xmlns:a16="http://schemas.microsoft.com/office/drawing/2014/main" id="{53F29798-D584-4792-9B62-3F5F5C36D619}"/>
-              </a:ext>
-              <a:ext uri="{C183D7F6-B498-43B3-948B-1728B52AA6E4}">
-                <adec:decorative xmlns:adec="http://schemas.microsoft.com/office/drawing/2017/decorative" val="1"/>
-              </a:ext>
-            </a:extLst>
-          </p:cNvPr>
-          <p:cNvSpPr>
-            <a:spLocks noGrp="1" noRot="1" noChangeAspect="1" noMove="1" noResize="1" noEditPoints="1" noAdjustHandles="1" noChangeArrowheads="1" noChangeShapeType="1" noTextEdit="1"/>
-          </p:cNvSpPr>
-          <p:nvPr>
-            <p:extLst>
-              <p:ext uri="{386F3935-93C4-4BCD-93E2-E3B085C9AB24}">
-                <p16:designElem xmlns:p16="http://schemas.microsoft.com/office/powerpoint/2015/main" val="1"/>
-              </p:ext>
-            </p:extLst>
-          </p:nvPr>
-        </p:nvSpPr>
-        <p:spPr>
-          <a:xfrm>
-            <a:off x="0" y="0"/>
-            <a:ext cx="12188952" cy="6858000"/>
-          </a:xfrm>
-          <a:prstGeom prst="rect">
-            <a:avLst/>
-          </a:prstGeom>
-          <a:ln>
-            <a:noFill/>
-          </a:ln>
-        </p:spPr>
-        <p:style>
-          <a:lnRef idx="2">
-            <a:schemeClr val="accent1">
-              <a:shade val="50000"/>
-            </a:schemeClr>
-          </a:lnRef>
-          <a:fillRef idx="1">
-            <a:schemeClr val="accent1"/>
-          </a:fillRef>
-          <a:effectRef idx="0">
-            <a:schemeClr val="accent1"/>
-          </a:effectRef>
-          <a:fontRef idx="minor">
-            <a:schemeClr val="lt1"/>
-          </a:fontRef>
-        </p:style>
-        <p:txBody>
-          <a:bodyPr rtlCol="0" anchor="ctr"/>
-          <a:lstStyle/>
-          <a:p>
-            <a:pPr algn="ctr"/>
-            <a:endParaRPr lang="en-US"/>
-          </a:p>
-        </p:txBody>
-      </p:sp>
-      <p:sp>
-        <p:nvSpPr>
-          <p:cNvPr id="2" name="Title 1">
-            <a:extLst>
-              <a:ext uri="{FF2B5EF4-FFF2-40B4-BE49-F238E27FC236}">
-                <a16:creationId xmlns:a16="http://schemas.microsoft.com/office/drawing/2014/main" id="{C86A6F26-DA81-878E-1E27-7D95B4E71107}"/>
-              </a:ext>
-            </a:extLst>
-          </p:cNvPr>
-          <p:cNvSpPr>
-            <a:spLocks noGrp="1"/>
-          </p:cNvSpPr>
-          <p:nvPr>
-            <p:ph type="ctrTitle"/>
-          </p:nvPr>
-        </p:nvSpPr>
-        <p:spPr>
-          <a:xfrm>
-            <a:off x="838200" y="184805"/>
-            <a:ext cx="10515600" cy="1505883"/>
-          </a:xfrm>
-        </p:spPr>
-        <p:txBody>
-          <a:bodyPr vert="horz" lIns="91440" tIns="45720" rIns="91440" bIns="45720" rtlCol="0" anchor="ctr">
-            <a:normAutofit/>
-          </a:bodyPr>
-          <a:lstStyle/>
-          <a:p>
-            <a:pPr algn="l"/>
-            <a:r>
-              <a:rPr lang="en-US" sz="5200" kern="1200">
-                <a:solidFill>
-                  <a:schemeClr val="tx1"/>
-                </a:solidFill>
-                <a:latin typeface="+mj-lt"/>
-                <a:ea typeface="+mj-ea"/>
-                <a:cs typeface="+mj-cs"/>
-              </a:rPr>
-              <a:t>https://flexboxfroggy.com</a:t>
-            </a:r>
-          </a:p>
-        </p:txBody>
-      </p:sp>
-      <p:pic>
-        <p:nvPicPr>
-          <p:cNvPr id="3074" name="Picture 2" descr="Flexbox Froggy">
-            <a:extLst>
-              <a:ext uri="{FF2B5EF4-FFF2-40B4-BE49-F238E27FC236}">
-                <a16:creationId xmlns:a16="http://schemas.microsoft.com/office/drawing/2014/main" id="{8A389D92-B60B-A27A-63AD-6E69F4C8660A}"/>
-              </a:ext>
-            </a:extLst>
-          </p:cNvPr>
-          <p:cNvPicPr>
-            <a:picLocks noChangeAspect="1" noChangeArrowheads="1"/>
-          </p:cNvPicPr>
-          <p:nvPr/>
-        </p:nvPicPr>
-        <p:blipFill>
-          <a:blip r:embed="rId2">
-            <a:extLst>
-              <a:ext uri="{28A0092B-C50C-407E-A947-70E740481C1C}">
-                <a14:useLocalDpi xmlns:a14="http://schemas.microsoft.com/office/drawing/2010/main" val="0"/>
-              </a:ext>
-            </a:extLst>
-          </a:blip>
-          <a:stretch>
-            <a:fillRect/>
-          </a:stretch>
-        </p:blipFill>
-        <p:spPr bwMode="auto">
-          <a:xfrm>
-            <a:off x="2138649" y="1845426"/>
-            <a:ext cx="7911649" cy="4450303"/>
-          </a:xfrm>
-          <a:prstGeom prst="rect">
-            <a:avLst/>
-          </a:prstGeom>
-          <a:noFill/>
-          <a:extLst>
-            <a:ext uri="{909E8E84-426E-40DD-AFC4-6F175D3DCCD1}">
-              <a14:hiddenFill xmlns:a14="http://schemas.microsoft.com/office/drawing/2010/main">
-                <a:solidFill>
-                  <a:srgbClr val="FFFFFF"/>
-                </a:solidFill>
-              </a14:hiddenFill>
-            </a:ext>
-          </a:extLst>
-        </p:spPr>
-      </p:pic>
-    </p:spTree>
-    <p:extLst>
-      <p:ext uri="{BB962C8B-B14F-4D97-AF65-F5344CB8AC3E}">
-        <p14:creationId xmlns:p14="http://schemas.microsoft.com/office/powerpoint/2010/main" val="4259059263"/>
-      </p:ext>
-    </p:extLst>
-  </p:cSld>
-  <p:clrMapOvr>
-    <a:masterClrMapping/>
-  </p:clrMapOvr>
-</p:sld>
-</file>
-
-<file path=ppt/slides/slide12.xml><?xml version="1.0" encoding="utf-8"?>
-<p:sld xmlns:a="http://schemas.openxmlformats.org/drawingml/2006/main" xmlns:r="http://schemas.openxmlformats.org/officeDocument/2006/relationships" xmlns:p="http://schemas.openxmlformats.org/presentationml/2006/main">
-  <p:cSld>
-    <p:spTree>
-      <p:nvGrpSpPr>
-        <p:cNvPr id="1" name=""/>
-        <p:cNvGrpSpPr/>
-        <p:nvPr/>
-      </p:nvGrpSpPr>
-      <p:grpSpPr>
-        <a:xfrm>
-          <a:off x="0" y="0"/>
-          <a:ext cx="0" cy="0"/>
-          <a:chOff x="0" y="0"/>
-          <a:chExt cx="0" cy="0"/>
-        </a:xfrm>
-      </p:grpSpPr>
-      <p:sp>
-        <p:nvSpPr>
-          <p:cNvPr id="2" name="Title 1">
-            <a:extLst>
-              <a:ext uri="{FF2B5EF4-FFF2-40B4-BE49-F238E27FC236}">
-                <a16:creationId xmlns:a16="http://schemas.microsoft.com/office/drawing/2014/main" id="{5D6A7798-64BC-E1E4-DC3A-060C6AE1AE9D}"/>
-              </a:ext>
-            </a:extLst>
-          </p:cNvPr>
-          <p:cNvSpPr>
-            <a:spLocks noGrp="1"/>
-          </p:cNvSpPr>
-          <p:nvPr>
-            <p:ph type="title"/>
-          </p:nvPr>
-        </p:nvSpPr>
-        <p:spPr/>
-        <p:txBody>
-          <a:bodyPr/>
-          <a:lstStyle/>
-          <a:p>
-            <a:r>
-              <a:rPr lang="es-EC"/>
-              <a:t>Tailwind en ReactJS (</a:t>
-            </a:r>
-            <a:r>
-              <a:rPr lang="es-EC" dirty="0" err="1"/>
-              <a:t>ViteJS</a:t>
-            </a:r>
-            <a:r>
-              <a:rPr lang="es-EC" dirty="0"/>
-              <a:t>)</a:t>
-            </a:r>
-          </a:p>
-        </p:txBody>
-      </p:sp>
-      <p:sp>
-        <p:nvSpPr>
-          <p:cNvPr id="3" name="Content Placeholder 2">
-            <a:extLst>
-              <a:ext uri="{FF2B5EF4-FFF2-40B4-BE49-F238E27FC236}">
-                <a16:creationId xmlns:a16="http://schemas.microsoft.com/office/drawing/2014/main" id="{219AB757-183B-BEC1-204F-D45B84CE4F3F}"/>
-              </a:ext>
-            </a:extLst>
-          </p:cNvPr>
-          <p:cNvSpPr>
-            <a:spLocks noGrp="1"/>
-          </p:cNvSpPr>
-          <p:nvPr>
-            <p:ph idx="1"/>
-          </p:nvPr>
-        </p:nvSpPr>
-        <p:spPr/>
-        <p:txBody>
-          <a:bodyPr/>
-          <a:lstStyle/>
-          <a:p>
-            <a:r>
-              <a:rPr lang="es-EC"/>
-              <a:t>Documentación </a:t>
-            </a:r>
-            <a:r>
-              <a:rPr lang="es-EC">
-                <a:hlinkClick r:id="rId2"/>
-              </a:rPr>
-              <a:t>https://tailwindcss.com/docs/guides/vite</a:t>
-            </a:r>
-            <a:endParaRPr lang="es-EC"/>
-          </a:p>
-          <a:p>
-            <a:endParaRPr lang="es-EC" dirty="0"/>
-          </a:p>
-        </p:txBody>
-      </p:sp>
-    </p:spTree>
-    <p:extLst>
-      <p:ext uri="{BB962C8B-B14F-4D97-AF65-F5344CB8AC3E}">
-        <p14:creationId xmlns:p14="http://schemas.microsoft.com/office/powerpoint/2010/main" val="3080613168"/>
-      </p:ext>
-    </p:extLst>
-  </p:cSld>
-  <p:clrMapOvr>
-    <a:masterClrMapping/>
-  </p:clrMapOvr>
-</p:sld>
-</file>
-
-<file path=ppt/slides/slide13.xml><?xml version="1.0" encoding="utf-8"?>
-<p:sld xmlns:a="http://schemas.openxmlformats.org/drawingml/2006/main" xmlns:r="http://schemas.openxmlformats.org/officeDocument/2006/relationships" xmlns:p="http://schemas.openxmlformats.org/presentationml/2006/main">
-  <p:cSld>
-    <p:bg>
-      <p:bgPr>
-        <a:solidFill>
-          <a:schemeClr val="bg1"/>
-        </a:solidFill>
-        <a:effectLst/>
-      </p:bgPr>
-    </p:bg>
-    <p:spTree>
-      <p:nvGrpSpPr>
-        <p:cNvPr id="1" name=""/>
-        <p:cNvGrpSpPr/>
-        <p:nvPr/>
-      </p:nvGrpSpPr>
-      <p:grpSpPr>
-        <a:xfrm>
-          <a:off x="0" y="0"/>
-          <a:ext cx="0" cy="0"/>
-          <a:chOff x="0" y="0"/>
-          <a:chExt cx="0" cy="0"/>
-        </a:xfrm>
-      </p:grpSpPr>
-      <p:pic>
-        <p:nvPicPr>
-          <p:cNvPr id="5" name="Picture 4" descr="A screenshot of a computer program&#10;&#10;Description automatically generated">
-            <a:extLst>
-              <a:ext uri="{FF2B5EF4-FFF2-40B4-BE49-F238E27FC236}">
-                <a16:creationId xmlns:a16="http://schemas.microsoft.com/office/drawing/2014/main" id="{643EC1A7-39C5-0CE2-BB02-1339A34F7B02}"/>
-              </a:ext>
-            </a:extLst>
-          </p:cNvPr>
-          <p:cNvPicPr>
-            <a:picLocks noChangeAspect="1"/>
-          </p:cNvPicPr>
-          <p:nvPr/>
-        </p:nvPicPr>
-        <p:blipFill>
-          <a:blip r:embed="rId2"/>
-          <a:stretch>
-            <a:fillRect/>
-          </a:stretch>
-        </p:blipFill>
-        <p:spPr>
-          <a:xfrm>
-            <a:off x="2739935" y="643466"/>
-            <a:ext cx="6712130" cy="5571067"/>
-          </a:xfrm>
-          <a:prstGeom prst="rect">
-            <a:avLst/>
-          </a:prstGeom>
-        </p:spPr>
-      </p:pic>
-    </p:spTree>
-    <p:extLst>
-      <p:ext uri="{BB962C8B-B14F-4D97-AF65-F5344CB8AC3E}">
-        <p14:creationId xmlns:p14="http://schemas.microsoft.com/office/powerpoint/2010/main" val="2468505468"/>
-      </p:ext>
-    </p:extLst>
-  </p:cSld>
-  <p:clrMapOvr>
-    <a:masterClrMapping/>
-  </p:clrMapOvr>
-</p:sld>
-</file>
-
-<file path=ppt/slides/slide14.xml><?xml version="1.0" encoding="utf-8"?>
-<p:sld xmlns:a="http://schemas.openxmlformats.org/drawingml/2006/main" xmlns:r="http://schemas.openxmlformats.org/officeDocument/2006/relationships" xmlns:p="http://schemas.openxmlformats.org/presentationml/2006/main">
-  <p:cSld>
-    <p:spTree>
-      <p:nvGrpSpPr>
-        <p:cNvPr id="1" name=""/>
-        <p:cNvGrpSpPr/>
-        <p:nvPr/>
-      </p:nvGrpSpPr>
-      <p:grpSpPr>
-        <a:xfrm>
-          <a:off x="0" y="0"/>
-          <a:ext cx="0" cy="0"/>
-          <a:chOff x="0" y="0"/>
-          <a:chExt cx="0" cy="0"/>
-        </a:xfrm>
-      </p:grpSpPr>
-      <p:pic>
-        <p:nvPicPr>
-          <p:cNvPr id="5" name="Picture 4">
-            <a:extLst>
-              <a:ext uri="{FF2B5EF4-FFF2-40B4-BE49-F238E27FC236}">
-                <a16:creationId xmlns:a16="http://schemas.microsoft.com/office/drawing/2014/main" id="{ED77698B-77AC-59B0-8E34-AD6947FB07CE}"/>
-              </a:ext>
-            </a:extLst>
-          </p:cNvPr>
-          <p:cNvPicPr>
-            <a:picLocks noChangeAspect="1"/>
-          </p:cNvPicPr>
-          <p:nvPr/>
-        </p:nvPicPr>
-        <p:blipFill>
-          <a:blip r:embed="rId3"/>
-          <a:stretch>
-            <a:fillRect/>
-          </a:stretch>
-        </p:blipFill>
-        <p:spPr>
-          <a:xfrm>
-            <a:off x="0" y="244161"/>
-            <a:ext cx="12192000" cy="6369678"/>
-          </a:xfrm>
-          <a:prstGeom prst="rect">
-            <a:avLst/>
-          </a:prstGeom>
-        </p:spPr>
-      </p:pic>
-      <p:sp>
-        <p:nvSpPr>
-          <p:cNvPr id="6" name="TextBox 5">
-            <a:extLst>
-              <a:ext uri="{FF2B5EF4-FFF2-40B4-BE49-F238E27FC236}">
-                <a16:creationId xmlns:a16="http://schemas.microsoft.com/office/drawing/2014/main" id="{8DF0DF28-BAF8-35BB-14EF-832E84DEF1B1}"/>
-              </a:ext>
-            </a:extLst>
-          </p:cNvPr>
-          <p:cNvSpPr txBox="1"/>
-          <p:nvPr/>
-        </p:nvSpPr>
-        <p:spPr>
-          <a:xfrm>
-            <a:off x="1498156" y="5552787"/>
-            <a:ext cx="9195688" cy="954107"/>
-          </a:xfrm>
-          <a:prstGeom prst="rect">
-            <a:avLst/>
-          </a:prstGeom>
-          <a:noFill/>
-        </p:spPr>
-        <p:txBody>
-          <a:bodyPr wrap="square" rtlCol="0">
-            <a:spAutoFit/>
-          </a:bodyPr>
-          <a:lstStyle/>
-          <a:p>
-            <a:r>
-              <a:rPr lang="es-EC" sz="2800" dirty="0"/>
-              <a:t>Documentación de Tailwind: </a:t>
-            </a:r>
-            <a:r>
-              <a:rPr lang="es-EC" sz="2800" dirty="0">
-                <a:hlinkClick r:id="rId4"/>
-              </a:rPr>
-              <a:t>https://tailwindcss.com/docs</a:t>
-            </a:r>
-            <a:endParaRPr lang="es-EC" sz="2800" dirty="0"/>
-          </a:p>
-          <a:p>
-            <a:endParaRPr lang="es-EC" sz="2800" dirty="0"/>
-          </a:p>
-        </p:txBody>
-      </p:sp>
-    </p:spTree>
-    <p:extLst>
-      <p:ext uri="{BB962C8B-B14F-4D97-AF65-F5344CB8AC3E}">
-        <p14:creationId xmlns:p14="http://schemas.microsoft.com/office/powerpoint/2010/main" val="126660915"/>
-      </p:ext>
-    </p:extLst>
-  </p:cSld>
-  <p:clrMapOvr>
-    <a:masterClrMapping/>
-  </p:clrMapOvr>
-</p:sld>
-</file>
-
-<file path=ppt/slides/slide15.xml><?xml version="1.0" encoding="utf-8"?>
-<p:sld xmlns:a="http://schemas.openxmlformats.org/drawingml/2006/main" xmlns:r="http://schemas.openxmlformats.org/officeDocument/2006/relationships" xmlns:p="http://schemas.openxmlformats.org/presentationml/2006/main">
-  <p:cSld>
-    <p:bg>
-      <p:bgPr>
-        <a:solidFill>
-          <a:schemeClr val="bg1"/>
-        </a:solidFill>
-        <a:effectLst/>
-      </p:bgPr>
-    </p:bg>
-    <p:spTree>
-      <p:nvGrpSpPr>
-        <p:cNvPr id="1" name=""/>
-        <p:cNvGrpSpPr/>
-        <p:nvPr/>
-      </p:nvGrpSpPr>
-      <p:grpSpPr>
-        <a:xfrm>
-          <a:off x="0" y="0"/>
-          <a:ext cx="0" cy="0"/>
-          <a:chOff x="0" y="0"/>
-          <a:chExt cx="0" cy="0"/>
-        </a:xfrm>
-      </p:grpSpPr>
-      <p:pic>
-        <p:nvPicPr>
-          <p:cNvPr id="3" name="Picture 2">
-            <a:extLst>
-              <a:ext uri="{FF2B5EF4-FFF2-40B4-BE49-F238E27FC236}">
-                <a16:creationId xmlns:a16="http://schemas.microsoft.com/office/drawing/2014/main" id="{FD2D010F-DDED-38C5-9648-51BA665ED29D}"/>
-              </a:ext>
-            </a:extLst>
-          </p:cNvPr>
-          <p:cNvPicPr>
-            <a:picLocks noChangeAspect="1"/>
-          </p:cNvPicPr>
-          <p:nvPr/>
-        </p:nvPicPr>
-        <p:blipFill>
-          <a:blip r:embed="rId2"/>
-          <a:stretch>
-            <a:fillRect/>
-          </a:stretch>
-        </p:blipFill>
-        <p:spPr>
-          <a:xfrm>
-            <a:off x="1414430" y="643466"/>
-            <a:ext cx="9363140" cy="5571067"/>
-          </a:xfrm>
-          <a:prstGeom prst="rect">
-            <a:avLst/>
-          </a:prstGeom>
-        </p:spPr>
-      </p:pic>
-    </p:spTree>
-    <p:extLst>
-      <p:ext uri="{BB962C8B-B14F-4D97-AF65-F5344CB8AC3E}">
-        <p14:creationId xmlns:p14="http://schemas.microsoft.com/office/powerpoint/2010/main" val="3112593157"/>
-      </p:ext>
-    </p:extLst>
-  </p:cSld>
-  <p:clrMapOvr>
-    <a:masterClrMapping/>
-  </p:clrMapOvr>
-</p:sld>
-</file>
-
-<file path=ppt/slides/slide16.xml><?xml version="1.0" encoding="utf-8"?>
-<p:sld xmlns:a="http://schemas.openxmlformats.org/drawingml/2006/main" xmlns:r="http://schemas.openxmlformats.org/officeDocument/2006/relationships" xmlns:p="http://schemas.openxmlformats.org/presentationml/2006/main">
-  <p:cSld>
-    <p:bg>
-      <p:bgPr>
-        <a:solidFill>
-          <a:schemeClr val="bg1"/>
-        </a:solidFill>
-        <a:effectLst/>
-      </p:bgPr>
-    </p:bg>
-    <p:spTree>
-      <p:nvGrpSpPr>
-        <p:cNvPr id="1" name=""/>
-        <p:cNvGrpSpPr/>
-        <p:nvPr/>
-      </p:nvGrpSpPr>
-      <p:grpSpPr>
-        <a:xfrm>
-          <a:off x="0" y="0"/>
-          <a:ext cx="0" cy="0"/>
-          <a:chOff x="0" y="0"/>
-          <a:chExt cx="0" cy="0"/>
-        </a:xfrm>
-      </p:grpSpPr>
-      <p:pic>
-        <p:nvPicPr>
-          <p:cNvPr id="3" name="Picture 2">
-            <a:extLst>
-              <a:ext uri="{FF2B5EF4-FFF2-40B4-BE49-F238E27FC236}">
-                <a16:creationId xmlns:a16="http://schemas.microsoft.com/office/drawing/2014/main" id="{95DC5071-E04A-E396-03D8-29EE30499AD8}"/>
-              </a:ext>
-            </a:extLst>
-          </p:cNvPr>
-          <p:cNvPicPr>
-            <a:picLocks noChangeAspect="1"/>
-          </p:cNvPicPr>
-          <p:nvPr/>
-        </p:nvPicPr>
-        <p:blipFill>
-          <a:blip r:embed="rId2"/>
-          <a:stretch>
-            <a:fillRect/>
-          </a:stretch>
-        </p:blipFill>
-        <p:spPr>
-          <a:xfrm>
-            <a:off x="643467" y="934466"/>
-            <a:ext cx="10905066" cy="4989066"/>
-          </a:xfrm>
-          <a:prstGeom prst="rect">
-            <a:avLst/>
-          </a:prstGeom>
-        </p:spPr>
-      </p:pic>
-    </p:spTree>
-    <p:extLst>
-      <p:ext uri="{BB962C8B-B14F-4D97-AF65-F5344CB8AC3E}">
-        <p14:creationId xmlns:p14="http://schemas.microsoft.com/office/powerpoint/2010/main" val="3948008719"/>
-      </p:ext>
-    </p:extLst>
-  </p:cSld>
-  <p:clrMapOvr>
-    <a:masterClrMapping/>
-  </p:clrMapOvr>
-</p:sld>
-</file>
-
-<file path=ppt/slides/slide17.xml><?xml version="1.0" encoding="utf-8"?>
-<p:sld xmlns:a="http://schemas.openxmlformats.org/drawingml/2006/main" xmlns:r="http://schemas.openxmlformats.org/officeDocument/2006/relationships" xmlns:p="http://schemas.openxmlformats.org/presentationml/2006/main">
-  <p:cSld>
-    <p:spTree>
-      <p:nvGrpSpPr>
-        <p:cNvPr id="1" name=""/>
-        <p:cNvGrpSpPr/>
-        <p:nvPr/>
-      </p:nvGrpSpPr>
-      <p:grpSpPr>
-        <a:xfrm>
-          <a:off x="0" y="0"/>
-          <a:ext cx="0" cy="0"/>
-          <a:chOff x="0" y="0"/>
-          <a:chExt cx="0" cy="0"/>
-        </a:xfrm>
-      </p:grpSpPr>
-      <p:sp>
-        <p:nvSpPr>
-          <p:cNvPr id="2" name="Title 1">
-            <a:extLst>
-              <a:ext uri="{FF2B5EF4-FFF2-40B4-BE49-F238E27FC236}">
-                <a16:creationId xmlns:a16="http://schemas.microsoft.com/office/drawing/2014/main" id="{9F6BC8C1-5490-4CA9-C80E-BC3F06C4BF8B}"/>
-              </a:ext>
-            </a:extLst>
-          </p:cNvPr>
-          <p:cNvSpPr>
-            <a:spLocks noGrp="1"/>
-          </p:cNvSpPr>
-          <p:nvPr>
-            <p:ph type="title"/>
-          </p:nvPr>
-        </p:nvSpPr>
-        <p:spPr/>
-        <p:txBody>
-          <a:bodyPr/>
-          <a:lstStyle/>
-          <a:p>
-            <a:r>
-              <a:rPr lang="en-US" dirty="0"/>
-              <a:t>Event handlers</a:t>
-            </a:r>
-            <a:endParaRPr lang="es-EC" dirty="0"/>
-          </a:p>
-        </p:txBody>
-      </p:sp>
-      <p:sp>
-        <p:nvSpPr>
-          <p:cNvPr id="3" name="Content Placeholder 2">
-            <a:extLst>
-              <a:ext uri="{FF2B5EF4-FFF2-40B4-BE49-F238E27FC236}">
-                <a16:creationId xmlns:a16="http://schemas.microsoft.com/office/drawing/2014/main" id="{2EEFC181-92D3-DEB3-7CFA-67387CFB7AF1}"/>
-              </a:ext>
-            </a:extLst>
-          </p:cNvPr>
-          <p:cNvSpPr>
-            <a:spLocks noGrp="1"/>
-          </p:cNvSpPr>
-          <p:nvPr>
-            <p:ph idx="1"/>
-          </p:nvPr>
-        </p:nvSpPr>
-        <p:spPr/>
-        <p:txBody>
-          <a:bodyPr/>
-          <a:lstStyle/>
-          <a:p>
-            <a:r>
-              <a:rPr lang="es-EC" dirty="0"/>
-              <a:t>Para cambiar el estado o comportamiento de nuestra aplicación, React permite el uso de </a:t>
-            </a:r>
-            <a:r>
-              <a:rPr lang="es-EC" dirty="0" err="1"/>
-              <a:t>event</a:t>
-            </a:r>
-            <a:r>
-              <a:rPr lang="es-EC" dirty="0"/>
-              <a:t> </a:t>
-            </a:r>
-            <a:r>
-              <a:rPr lang="es-EC" dirty="0" err="1"/>
-              <a:t>handlers</a:t>
-            </a:r>
-            <a:r>
-              <a:rPr lang="es-EC" dirty="0"/>
-              <a:t>.</a:t>
-            </a:r>
-          </a:p>
-          <a:p>
-            <a:r>
-              <a:rPr lang="es-EC" dirty="0"/>
-              <a:t>Estos </a:t>
-            </a:r>
-            <a:r>
-              <a:rPr lang="es-EC" dirty="0" err="1"/>
-              <a:t>event</a:t>
-            </a:r>
-            <a:r>
-              <a:rPr lang="es-EC" dirty="0"/>
-              <a:t> </a:t>
-            </a:r>
-            <a:r>
-              <a:rPr lang="es-EC" dirty="0" err="1"/>
-              <a:t>handlers</a:t>
-            </a:r>
-            <a:r>
-              <a:rPr lang="es-EC" dirty="0"/>
-              <a:t>  son funciones que se “disparan” en respuesta de alguna interacción del usuario con la UI. Puede ser desde un clic, escribir en un input, mover el mouse, etc.</a:t>
-            </a:r>
-          </a:p>
-        </p:txBody>
-      </p:sp>
-    </p:spTree>
-    <p:extLst>
-      <p:ext uri="{BB962C8B-B14F-4D97-AF65-F5344CB8AC3E}">
-        <p14:creationId xmlns:p14="http://schemas.microsoft.com/office/powerpoint/2010/main" val="2436362334"/>
-      </p:ext>
-    </p:extLst>
-  </p:cSld>
-  <p:clrMapOvr>
-    <a:masterClrMapping/>
-  </p:clrMapOvr>
-</p:sld>
-</file>
-
-<file path=ppt/slides/slide18.xml><?xml version="1.0" encoding="utf-8"?>
-<p:sld xmlns:a="http://schemas.openxmlformats.org/drawingml/2006/main" xmlns:r="http://schemas.openxmlformats.org/officeDocument/2006/relationships" xmlns:p="http://schemas.openxmlformats.org/presentationml/2006/main">
-  <p:cSld>
-    <p:bg>
-      <p:bgPr>
-        <a:solidFill>
-          <a:schemeClr val="bg1"/>
-        </a:solidFill>
-        <a:effectLst/>
-      </p:bgPr>
-    </p:bg>
-    <p:spTree>
-      <p:nvGrpSpPr>
-        <p:cNvPr id="1" name=""/>
-        <p:cNvGrpSpPr/>
-        <p:nvPr/>
-      </p:nvGrpSpPr>
-      <p:grpSpPr>
-        <a:xfrm>
-          <a:off x="0" y="0"/>
-          <a:ext cx="0" cy="0"/>
-          <a:chOff x="0" y="0"/>
-          <a:chExt cx="0" cy="0"/>
-        </a:xfrm>
-      </p:grpSpPr>
       <p:pic>
         <p:nvPicPr>
           <p:cNvPr id="3" name="Picture 2">
@@ -5252,7 +4296,7 @@
 </p:sld>
 </file>
 
-<file path=ppt/slides/slide19.xml><?xml version="1.0" encoding="utf-8"?>
+<file path=ppt/slides/slide11.xml><?xml version="1.0" encoding="utf-8"?>
 <p:sld xmlns:a="http://schemas.openxmlformats.org/drawingml/2006/main" xmlns:r="http://schemas.openxmlformats.org/officeDocument/2006/relationships" xmlns:p="http://schemas.openxmlformats.org/presentationml/2006/main">
   <p:cSld>
     <p:spTree>
@@ -5357,102 +4401,7 @@
 </p:sld>
 </file>
 
-<file path=ppt/slides/slide2.xml><?xml version="1.0" encoding="utf-8"?>
-<p:sld xmlns:a="http://schemas.openxmlformats.org/drawingml/2006/main" xmlns:r="http://schemas.openxmlformats.org/officeDocument/2006/relationships" xmlns:p="http://schemas.openxmlformats.org/presentationml/2006/main">
-  <p:cSld>
-    <p:spTree>
-      <p:nvGrpSpPr>
-        <p:cNvPr id="1" name=""/>
-        <p:cNvGrpSpPr/>
-        <p:nvPr/>
-      </p:nvGrpSpPr>
-      <p:grpSpPr>
-        <a:xfrm>
-          <a:off x="0" y="0"/>
-          <a:ext cx="0" cy="0"/>
-          <a:chOff x="0" y="0"/>
-          <a:chExt cx="0" cy="0"/>
-        </a:xfrm>
-      </p:grpSpPr>
-      <p:sp>
-        <p:nvSpPr>
-          <p:cNvPr id="2" name="Title 1">
-            <a:extLst>
-              <a:ext uri="{FF2B5EF4-FFF2-40B4-BE49-F238E27FC236}">
-                <a16:creationId xmlns:a16="http://schemas.microsoft.com/office/drawing/2014/main" id="{E11580D9-0299-FCB7-5E55-2FF0B06D897C}"/>
-              </a:ext>
-            </a:extLst>
-          </p:cNvPr>
-          <p:cNvSpPr>
-            <a:spLocks noGrp="1"/>
-          </p:cNvSpPr>
-          <p:nvPr>
-            <p:ph type="title"/>
-          </p:nvPr>
-        </p:nvSpPr>
-        <p:spPr/>
-        <p:txBody>
-          <a:bodyPr/>
-          <a:lstStyle/>
-          <a:p>
-            <a:pPr algn="ctr"/>
-            <a:r>
-              <a:rPr lang="es-EC" dirty="0"/>
-              <a:t>¿Qué es CSS?</a:t>
-            </a:r>
-          </a:p>
-        </p:txBody>
-      </p:sp>
-      <p:sp>
-        <p:nvSpPr>
-          <p:cNvPr id="3" name="Text Placeholder 2">
-            <a:extLst>
-              <a:ext uri="{FF2B5EF4-FFF2-40B4-BE49-F238E27FC236}">
-                <a16:creationId xmlns:a16="http://schemas.microsoft.com/office/drawing/2014/main" id="{0454F8E8-380C-201F-431D-72FDF059208A}"/>
-              </a:ext>
-            </a:extLst>
-          </p:cNvPr>
-          <p:cNvSpPr>
-            <a:spLocks noGrp="1"/>
-          </p:cNvSpPr>
-          <p:nvPr>
-            <p:ph type="body" idx="1"/>
-          </p:nvPr>
-        </p:nvSpPr>
-        <p:spPr/>
-        <p:txBody>
-          <a:bodyPr/>
-          <a:lstStyle/>
-          <a:p>
-            <a:r>
-              <a:rPr lang="es-EC" dirty="0"/>
-              <a:t>Es un </a:t>
-            </a:r>
-            <a:r>
-              <a:rPr lang="es-EC" dirty="0" err="1"/>
-              <a:t>lenaguje</a:t>
-            </a:r>
-            <a:r>
-              <a:rPr lang="es-EC" dirty="0"/>
-              <a:t> usado para dar estilos a documentos de HTML</a:t>
-            </a:r>
-          </a:p>
-        </p:txBody>
-      </p:sp>
-    </p:spTree>
-    <p:extLst>
-      <p:ext uri="{BB962C8B-B14F-4D97-AF65-F5344CB8AC3E}">
-        <p14:creationId xmlns:p14="http://schemas.microsoft.com/office/powerpoint/2010/main" val="965286506"/>
-      </p:ext>
-    </p:extLst>
-  </p:cSld>
-  <p:clrMapOvr>
-    <a:masterClrMapping/>
-  </p:clrMapOvr>
-</p:sld>
-</file>
-
-<file path=ppt/slides/slide20.xml><?xml version="1.0" encoding="utf-8"?>
+<file path=ppt/slides/slide12.xml><?xml version="1.0" encoding="utf-8"?>
 <p:sld xmlns:a="http://schemas.openxmlformats.org/drawingml/2006/main" xmlns:r="http://schemas.openxmlformats.org/officeDocument/2006/relationships" xmlns:p="http://schemas.openxmlformats.org/presentationml/2006/main">
   <p:cSld>
     <p:spTree>
@@ -5512,7 +4461,7 @@
 </p:sld>
 </file>
 
-<file path=ppt/slides/slide21.xml><?xml version="1.0" encoding="utf-8"?>
+<file path=ppt/slides/slide13.xml><?xml version="1.0" encoding="utf-8"?>
 <p:sld xmlns:a="http://schemas.openxmlformats.org/drawingml/2006/main" xmlns:r="http://schemas.openxmlformats.org/officeDocument/2006/relationships" xmlns:p="http://schemas.openxmlformats.org/presentationml/2006/main">
   <p:cSld>
     <p:spTree>
@@ -5639,7 +4588,132 @@
 </p:sld>
 </file>
 
-<file path=ppt/slides/slide3.xml><?xml version="1.0" encoding="utf-8"?>
+<file path=ppt/slides/slide14.xml><?xml version="1.0" encoding="utf-8"?>
+<p:sld xmlns:a="http://schemas.openxmlformats.org/drawingml/2006/main" xmlns:r="http://schemas.openxmlformats.org/officeDocument/2006/relationships" xmlns:p="http://schemas.openxmlformats.org/presentationml/2006/main">
+  <p:cSld>
+    <p:spTree>
+      <p:nvGrpSpPr>
+        <p:cNvPr id="1" name=""/>
+        <p:cNvGrpSpPr/>
+        <p:nvPr/>
+      </p:nvGrpSpPr>
+      <p:grpSpPr>
+        <a:xfrm>
+          <a:off x="0" y="0"/>
+          <a:ext cx="0" cy="0"/>
+          <a:chOff x="0" y="0"/>
+          <a:chExt cx="0" cy="0"/>
+        </a:xfrm>
+      </p:grpSpPr>
+    </p:spTree>
+    <p:extLst>
+      <p:ext uri="{BB962C8B-B14F-4D97-AF65-F5344CB8AC3E}">
+        <p14:creationId xmlns:p14="http://schemas.microsoft.com/office/powerpoint/2010/main" val="2770881863"/>
+      </p:ext>
+    </p:extLst>
+  </p:cSld>
+  <p:clrMapOvr>
+    <a:masterClrMapping/>
+  </p:clrMapOvr>
+</p:sld>
+</file>
+
+<file path=ppt/slides/slide15.xml><?xml version="1.0" encoding="utf-8"?>
+<p:sld xmlns:a="http://schemas.openxmlformats.org/drawingml/2006/main" xmlns:r="http://schemas.openxmlformats.org/officeDocument/2006/relationships" xmlns:p="http://schemas.openxmlformats.org/presentationml/2006/main">
+  <p:cSld>
+    <p:spTree>
+      <p:nvGrpSpPr>
+        <p:cNvPr id="1" name=""/>
+        <p:cNvGrpSpPr/>
+        <p:nvPr/>
+      </p:nvGrpSpPr>
+      <p:grpSpPr>
+        <a:xfrm>
+          <a:off x="0" y="0"/>
+          <a:ext cx="0" cy="0"/>
+          <a:chOff x="0" y="0"/>
+          <a:chExt cx="0" cy="0"/>
+        </a:xfrm>
+      </p:grpSpPr>
+      <p:sp>
+        <p:nvSpPr>
+          <p:cNvPr id="2" name="Title 1">
+            <a:extLst>
+              <a:ext uri="{FF2B5EF4-FFF2-40B4-BE49-F238E27FC236}">
+                <a16:creationId xmlns:a16="http://schemas.microsoft.com/office/drawing/2014/main" id="{E11580D9-0299-FCB7-5E55-2FF0B06D897C}"/>
+              </a:ext>
+            </a:extLst>
+          </p:cNvPr>
+          <p:cNvSpPr>
+            <a:spLocks noGrp="1"/>
+          </p:cNvSpPr>
+          <p:nvPr>
+            <p:ph type="title"/>
+          </p:nvPr>
+        </p:nvSpPr>
+        <p:spPr/>
+        <p:txBody>
+          <a:bodyPr/>
+          <a:lstStyle/>
+          <a:p>
+            <a:pPr algn="ctr"/>
+            <a:r>
+              <a:rPr lang="es-EC" dirty="0"/>
+              <a:t>¿Qué es CSS?</a:t>
+            </a:r>
+          </a:p>
+        </p:txBody>
+      </p:sp>
+      <p:sp>
+        <p:nvSpPr>
+          <p:cNvPr id="3" name="Text Placeholder 2">
+            <a:extLst>
+              <a:ext uri="{FF2B5EF4-FFF2-40B4-BE49-F238E27FC236}">
+                <a16:creationId xmlns:a16="http://schemas.microsoft.com/office/drawing/2014/main" id="{0454F8E8-380C-201F-431D-72FDF059208A}"/>
+              </a:ext>
+            </a:extLst>
+          </p:cNvPr>
+          <p:cNvSpPr>
+            <a:spLocks noGrp="1"/>
+          </p:cNvSpPr>
+          <p:nvPr>
+            <p:ph type="body" idx="1"/>
+          </p:nvPr>
+        </p:nvSpPr>
+        <p:spPr/>
+        <p:txBody>
+          <a:bodyPr/>
+          <a:lstStyle/>
+          <a:p>
+            <a:r>
+              <a:rPr lang="es-EC" dirty="0"/>
+              <a:t>Es un </a:t>
+            </a:r>
+            <a:r>
+              <a:rPr lang="es-EC" dirty="0" err="1"/>
+              <a:t>lenaguje</a:t>
+            </a:r>
+            <a:r>
+              <a:rPr lang="es-EC" dirty="0"/>
+              <a:t> usado para dar estilos a documentos de HTML</a:t>
+            </a:r>
+          </a:p>
+        </p:txBody>
+      </p:sp>
+    </p:spTree>
+    <p:extLst>
+      <p:ext uri="{BB962C8B-B14F-4D97-AF65-F5344CB8AC3E}">
+        <p14:creationId xmlns:p14="http://schemas.microsoft.com/office/powerpoint/2010/main" val="965286506"/>
+      </p:ext>
+    </p:extLst>
+  </p:cSld>
+  <p:clrMapOvr>
+    <a:masterClrMapping/>
+  </p:clrMapOvr>
+</p:sld>
+</file>
+
+<file path=ppt/slides/slide16.xml><?xml version="1.0" encoding="utf-8"?>
 <p:sld xmlns:a="http://schemas.openxmlformats.org/drawingml/2006/main" xmlns:r="http://schemas.openxmlformats.org/officeDocument/2006/relationships" xmlns:p="http://schemas.openxmlformats.org/presentationml/2006/main">
   <p:cSld>
     <p:spTree>
@@ -5744,7 +4818,7 @@
 </p:sld>
 </file>
 
-<file path=ppt/slides/slide4.xml><?xml version="1.0" encoding="utf-8"?>
+<file path=ppt/slides/slide17.xml><?xml version="1.0" encoding="utf-8"?>
 <p:sld xmlns:a="http://schemas.openxmlformats.org/drawingml/2006/main" xmlns:r="http://schemas.openxmlformats.org/officeDocument/2006/relationships" xmlns:p="http://schemas.openxmlformats.org/presentationml/2006/main">
   <p:cSld>
     <p:spTree>
@@ -5868,7 +4942,7 @@
 </p:sld>
 </file>
 
-<file path=ppt/slides/slide5.xml><?xml version="1.0" encoding="utf-8"?>
+<file path=ppt/slides/slide18.xml><?xml version="1.0" encoding="utf-8"?>
 <p:sld xmlns:a="http://schemas.openxmlformats.org/drawingml/2006/main" xmlns:r="http://schemas.openxmlformats.org/officeDocument/2006/relationships" xmlns:p="http://schemas.openxmlformats.org/presentationml/2006/main">
   <p:cSld>
     <p:bg>
@@ -6038,7 +5112,7 @@
 </p:sld>
 </file>
 
-<file path=ppt/slides/slide6.xml><?xml version="1.0" encoding="utf-8"?>
+<file path=ppt/slides/slide19.xml><?xml version="1.0" encoding="utf-8"?>
 <p:sld xmlns:a="http://schemas.openxmlformats.org/drawingml/2006/main" xmlns:r="http://schemas.openxmlformats.org/officeDocument/2006/relationships" xmlns:p="http://schemas.openxmlformats.org/presentationml/2006/main">
   <p:cSld>
     <p:bg>
@@ -6216,7 +5290,239 @@
 </p:sld>
 </file>
 
-<file path=ppt/slides/slide7.xml><?xml version="1.0" encoding="utf-8"?>
+<file path=ppt/slides/slide2.xml><?xml version="1.0" encoding="utf-8"?>
+<p:sld xmlns:a="http://schemas.openxmlformats.org/drawingml/2006/main" xmlns:r="http://schemas.openxmlformats.org/officeDocument/2006/relationships" xmlns:p="http://schemas.openxmlformats.org/presentationml/2006/main">
+  <p:cSld>
+    <p:bg>
+      <p:bgPr>
+        <a:solidFill>
+          <a:schemeClr val="bg1"/>
+        </a:solidFill>
+        <a:effectLst/>
+      </p:bgPr>
+    </p:bg>
+    <p:spTree>
+      <p:nvGrpSpPr>
+        <p:cNvPr id="1" name=""/>
+        <p:cNvGrpSpPr/>
+        <p:nvPr/>
+      </p:nvGrpSpPr>
+      <p:grpSpPr>
+        <a:xfrm>
+          <a:off x="0" y="0"/>
+          <a:ext cx="0" cy="0"/>
+          <a:chOff x="0" y="0"/>
+          <a:chExt cx="0" cy="0"/>
+        </a:xfrm>
+      </p:grpSpPr>
+      <p:sp useBgFill="1">
+        <p:nvSpPr>
+          <p:cNvPr id="2057" name="Rectangle 2056">
+            <a:extLst>
+              <a:ext uri="{FF2B5EF4-FFF2-40B4-BE49-F238E27FC236}">
+                <a16:creationId xmlns:a16="http://schemas.microsoft.com/office/drawing/2014/main" id="{99ED5833-B85B-4103-8A3B-CAB0308E6C15}"/>
+              </a:ext>
+              <a:ext uri="{C183D7F6-B498-43B3-948B-1728B52AA6E4}">
+                <adec:decorative xmlns:adec="http://schemas.microsoft.com/office/drawing/2017/decorative" val="1"/>
+              </a:ext>
+            </a:extLst>
+          </p:cNvPr>
+          <p:cNvSpPr>
+            <a:spLocks noGrp="1" noRot="1" noChangeAspect="1" noMove="1" noResize="1" noEditPoints="1" noAdjustHandles="1" noChangeArrowheads="1" noChangeShapeType="1" noTextEdit="1"/>
+          </p:cNvSpPr>
+          <p:nvPr>
+            <p:extLst>
+              <p:ext uri="{386F3935-93C4-4BCD-93E2-E3B085C9AB24}">
+                <p16:designElem xmlns:p16="http://schemas.microsoft.com/office/powerpoint/2015/main" val="1"/>
+              </p:ext>
+            </p:extLst>
+          </p:nvPr>
+        </p:nvSpPr>
+        <p:spPr>
+          <a:xfrm>
+            <a:off x="-1" y="0"/>
+            <a:ext cx="12188952" cy="6858000"/>
+          </a:xfrm>
+          <a:prstGeom prst="rect">
+            <a:avLst/>
+          </a:prstGeom>
+          <a:ln>
+            <a:noFill/>
+          </a:ln>
+        </p:spPr>
+        <p:style>
+          <a:lnRef idx="2">
+            <a:schemeClr val="accent1">
+              <a:shade val="50000"/>
+            </a:schemeClr>
+          </a:lnRef>
+          <a:fillRef idx="1">
+            <a:schemeClr val="accent1"/>
+          </a:fillRef>
+          <a:effectRef idx="0">
+            <a:schemeClr val="accent1"/>
+          </a:effectRef>
+          <a:fontRef idx="minor">
+            <a:schemeClr val="lt1"/>
+          </a:fontRef>
+        </p:style>
+        <p:txBody>
+          <a:bodyPr rtlCol="0" anchor="ctr"/>
+          <a:lstStyle/>
+          <a:p>
+            <a:pPr algn="ctr"/>
+            <a:endParaRPr lang="en-US"/>
+          </a:p>
+        </p:txBody>
+      </p:sp>
+      <p:sp>
+        <p:nvSpPr>
+          <p:cNvPr id="2" name="Title 1">
+            <a:extLst>
+              <a:ext uri="{FF2B5EF4-FFF2-40B4-BE49-F238E27FC236}">
+                <a16:creationId xmlns:a16="http://schemas.microsoft.com/office/drawing/2014/main" id="{26F204F4-9C43-4EF1-1ADA-822ACDC32689}"/>
+              </a:ext>
+            </a:extLst>
+          </p:cNvPr>
+          <p:cNvSpPr>
+            <a:spLocks noGrp="1"/>
+          </p:cNvSpPr>
+          <p:nvPr>
+            <p:ph type="title"/>
+          </p:nvPr>
+        </p:nvSpPr>
+        <p:spPr>
+          <a:xfrm>
+            <a:off x="838200" y="365125"/>
+            <a:ext cx="10515600" cy="1860400"/>
+          </a:xfrm>
+        </p:spPr>
+        <p:txBody>
+          <a:bodyPr vert="horz" lIns="91440" tIns="45720" rIns="91440" bIns="45720" rtlCol="0" anchor="ctr">
+            <a:normAutofit/>
+          </a:bodyPr>
+          <a:lstStyle/>
+          <a:p>
+            <a:r>
+              <a:rPr lang="en-US" sz="5200" kern="1200">
+                <a:solidFill>
+                  <a:schemeClr val="tx1"/>
+                </a:solidFill>
+                <a:latin typeface="+mj-lt"/>
+                <a:ea typeface="+mj-ea"/>
+                <a:cs typeface="+mj-cs"/>
+              </a:rPr>
+              <a:t>Librerías para estilos</a:t>
+            </a:r>
+          </a:p>
+        </p:txBody>
+      </p:sp>
+      <p:pic>
+        <p:nvPicPr>
+          <p:cNvPr id="2052" name="Picture 4" descr="GitHub - styled-components/styled-components: Visual primitives for the  component age. Use the best bits of ES6 and CSS to style your apps without  stress 💅">
+            <a:extLst>
+              <a:ext uri="{FF2B5EF4-FFF2-40B4-BE49-F238E27FC236}">
+                <a16:creationId xmlns:a16="http://schemas.microsoft.com/office/drawing/2014/main" id="{EF87B2C7-6222-2D1C-9CCB-1958FA04ACC7}"/>
+              </a:ext>
+            </a:extLst>
+          </p:cNvPr>
+          <p:cNvPicPr>
+            <a:picLocks noChangeAspect="1" noChangeArrowheads="1"/>
+          </p:cNvPicPr>
+          <p:nvPr/>
+        </p:nvPicPr>
+        <p:blipFill>
+          <a:blip r:embed="rId2">
+            <a:extLst>
+              <a:ext uri="{28A0092B-C50C-407E-A947-70E740481C1C}">
+                <a14:useLocalDpi xmlns:a14="http://schemas.microsoft.com/office/drawing/2010/main" val="0"/>
+              </a:ext>
+            </a:extLst>
+          </a:blip>
+          <a:stretch>
+            <a:fillRect/>
+          </a:stretch>
+        </p:blipFill>
+        <p:spPr bwMode="auto">
+          <a:xfrm>
+            <a:off x="1071741" y="2487832"/>
+            <a:ext cx="3380018" cy="3380018"/>
+          </a:xfrm>
+          <a:prstGeom prst="rect">
+            <a:avLst/>
+          </a:prstGeom>
+          <a:noFill/>
+          <a:extLst>
+            <a:ext uri="{909E8E84-426E-40DD-AFC4-6F175D3DCCD1}">
+              <a14:hiddenFill xmlns:a14="http://schemas.microsoft.com/office/drawing/2010/main">
+                <a:solidFill>
+                  <a:srgbClr val="FFFFFF"/>
+                </a:solidFill>
+              </a14:hiddenFill>
+            </a:ext>
+          </a:extLst>
+        </p:spPr>
+      </p:pic>
+      <p:pic>
+        <p:nvPicPr>
+          <p:cNvPr id="2050" name="Picture 2" descr="The first alpha of Tailwind CSS v3 is now released - Laravel News">
+            <a:extLst>
+              <a:ext uri="{FF2B5EF4-FFF2-40B4-BE49-F238E27FC236}">
+                <a16:creationId xmlns:a16="http://schemas.microsoft.com/office/drawing/2014/main" id="{BAD1FCD7-6593-1FCB-E1D6-E3E24D5C38D1}"/>
+              </a:ext>
+            </a:extLst>
+          </p:cNvPr>
+          <p:cNvPicPr>
+            <a:picLocks noChangeAspect="1" noChangeArrowheads="1"/>
+          </p:cNvPicPr>
+          <p:nvPr/>
+        </p:nvPicPr>
+        <p:blipFill>
+          <a:blip r:embed="rId3">
+            <a:extLst>
+              <a:ext uri="{28A0092B-C50C-407E-A947-70E740481C1C}">
+                <a14:useLocalDpi xmlns:a14="http://schemas.microsoft.com/office/drawing/2010/main" val="0"/>
+              </a:ext>
+            </a:extLst>
+          </a:blip>
+          <a:stretch>
+            <a:fillRect/>
+          </a:stretch>
+        </p:blipFill>
+        <p:spPr bwMode="auto">
+          <a:xfrm>
+            <a:off x="5246828" y="2487833"/>
+            <a:ext cx="6760036" cy="3380017"/>
+          </a:xfrm>
+          <a:prstGeom prst="rect">
+            <a:avLst/>
+          </a:prstGeom>
+          <a:noFill/>
+          <a:extLst>
+            <a:ext uri="{909E8E84-426E-40DD-AFC4-6F175D3DCCD1}">
+              <a14:hiddenFill xmlns:a14="http://schemas.microsoft.com/office/drawing/2010/main">
+                <a:solidFill>
+                  <a:srgbClr val="FFFFFF"/>
+                </a:solidFill>
+              </a14:hiddenFill>
+            </a:ext>
+          </a:extLst>
+        </p:spPr>
+      </p:pic>
+    </p:spTree>
+    <p:extLst>
+      <p:ext uri="{BB962C8B-B14F-4D97-AF65-F5344CB8AC3E}">
+        <p14:creationId xmlns:p14="http://schemas.microsoft.com/office/powerpoint/2010/main" val="1495541469"/>
+      </p:ext>
+    </p:extLst>
+  </p:cSld>
+  <p:clrMapOvr>
+    <a:masterClrMapping/>
+  </p:clrMapOvr>
+</p:sld>
+</file>
+
+<file path=ppt/slides/slide20.xml><?xml version="1.0" encoding="utf-8"?>
 <p:sld xmlns:a="http://schemas.openxmlformats.org/drawingml/2006/main" xmlns:r="http://schemas.openxmlformats.org/officeDocument/2006/relationships" xmlns:p="http://schemas.openxmlformats.org/presentationml/2006/main">
   <p:cSld>
     <p:spTree>
@@ -6356,7 +5662,7 @@
 </p:sld>
 </file>
 
-<file path=ppt/slides/slide8.xml><?xml version="1.0" encoding="utf-8"?>
+<file path=ppt/slides/slide21.xml><?xml version="1.0" encoding="utf-8"?>
 <p:sld xmlns:a="http://schemas.openxmlformats.org/drawingml/2006/main" xmlns:r="http://schemas.openxmlformats.org/officeDocument/2006/relationships" xmlns:p="http://schemas.openxmlformats.org/presentationml/2006/main">
   <p:cSld>
     <p:bg>
@@ -6606,7 +5912,7 @@
 </p:sld>
 </file>
 
-<file path=ppt/slides/slide9.xml><?xml version="1.0" encoding="utf-8"?>
+<file path=ppt/slides/slide22.xml><?xml version="1.0" encoding="utf-8"?>
 <p:sld xmlns:a="http://schemas.openxmlformats.org/drawingml/2006/main" xmlns:r="http://schemas.openxmlformats.org/officeDocument/2006/relationships" xmlns:p="http://schemas.openxmlformats.org/presentationml/2006/main">
   <p:cSld>
     <p:spTree>
@@ -6686,6 +5992,731 @@
     <p:extLst>
       <p:ext uri="{BB962C8B-B14F-4D97-AF65-F5344CB8AC3E}">
         <p14:creationId xmlns:p14="http://schemas.microsoft.com/office/powerpoint/2010/main" val="3539100743"/>
+      </p:ext>
+    </p:extLst>
+  </p:cSld>
+  <p:clrMapOvr>
+    <a:masterClrMapping/>
+  </p:clrMapOvr>
+</p:sld>
+</file>
+
+<file path=ppt/slides/slide3.xml><?xml version="1.0" encoding="utf-8"?>
+<p:sld xmlns:a="http://schemas.openxmlformats.org/drawingml/2006/main" xmlns:r="http://schemas.openxmlformats.org/officeDocument/2006/relationships" xmlns:p="http://schemas.openxmlformats.org/presentationml/2006/main">
+  <p:cSld>
+    <p:bg>
+      <p:bgPr>
+        <a:solidFill>
+          <a:schemeClr val="bg1"/>
+        </a:solidFill>
+        <a:effectLst/>
+      </p:bgPr>
+    </p:bg>
+    <p:spTree>
+      <p:nvGrpSpPr>
+        <p:cNvPr id="1" name=""/>
+        <p:cNvGrpSpPr/>
+        <p:nvPr/>
+      </p:nvGrpSpPr>
+      <p:grpSpPr>
+        <a:xfrm>
+          <a:off x="0" y="0"/>
+          <a:ext cx="0" cy="0"/>
+          <a:chOff x="0" y="0"/>
+          <a:chExt cx="0" cy="0"/>
+        </a:xfrm>
+      </p:grpSpPr>
+      <p:sp useBgFill="1">
+        <p:nvSpPr>
+          <p:cNvPr id="3079" name="Rectangle 3078">
+            <a:extLst>
+              <a:ext uri="{FF2B5EF4-FFF2-40B4-BE49-F238E27FC236}">
+                <a16:creationId xmlns:a16="http://schemas.microsoft.com/office/drawing/2014/main" id="{53F29798-D584-4792-9B62-3F5F5C36D619}"/>
+              </a:ext>
+              <a:ext uri="{C183D7F6-B498-43B3-948B-1728B52AA6E4}">
+                <adec:decorative xmlns:adec="http://schemas.microsoft.com/office/drawing/2017/decorative" val="1"/>
+              </a:ext>
+            </a:extLst>
+          </p:cNvPr>
+          <p:cNvSpPr>
+            <a:spLocks noGrp="1" noRot="1" noChangeAspect="1" noMove="1" noResize="1" noEditPoints="1" noAdjustHandles="1" noChangeArrowheads="1" noChangeShapeType="1" noTextEdit="1"/>
+          </p:cNvSpPr>
+          <p:nvPr>
+            <p:extLst>
+              <p:ext uri="{386F3935-93C4-4BCD-93E2-E3B085C9AB24}">
+                <p16:designElem xmlns:p16="http://schemas.microsoft.com/office/powerpoint/2015/main" val="1"/>
+              </p:ext>
+            </p:extLst>
+          </p:nvPr>
+        </p:nvSpPr>
+        <p:spPr>
+          <a:xfrm>
+            <a:off x="0" y="0"/>
+            <a:ext cx="12188952" cy="6858000"/>
+          </a:xfrm>
+          <a:prstGeom prst="rect">
+            <a:avLst/>
+          </a:prstGeom>
+          <a:ln>
+            <a:noFill/>
+          </a:ln>
+        </p:spPr>
+        <p:style>
+          <a:lnRef idx="2">
+            <a:schemeClr val="accent1">
+              <a:shade val="50000"/>
+            </a:schemeClr>
+          </a:lnRef>
+          <a:fillRef idx="1">
+            <a:schemeClr val="accent1"/>
+          </a:fillRef>
+          <a:effectRef idx="0">
+            <a:schemeClr val="accent1"/>
+          </a:effectRef>
+          <a:fontRef idx="minor">
+            <a:schemeClr val="lt1"/>
+          </a:fontRef>
+        </p:style>
+        <p:txBody>
+          <a:bodyPr rtlCol="0" anchor="ctr"/>
+          <a:lstStyle/>
+          <a:p>
+            <a:pPr algn="ctr"/>
+            <a:endParaRPr lang="en-US"/>
+          </a:p>
+        </p:txBody>
+      </p:sp>
+      <p:sp>
+        <p:nvSpPr>
+          <p:cNvPr id="2" name="Title 1">
+            <a:extLst>
+              <a:ext uri="{FF2B5EF4-FFF2-40B4-BE49-F238E27FC236}">
+                <a16:creationId xmlns:a16="http://schemas.microsoft.com/office/drawing/2014/main" id="{C86A6F26-DA81-878E-1E27-7D95B4E71107}"/>
+              </a:ext>
+            </a:extLst>
+          </p:cNvPr>
+          <p:cNvSpPr>
+            <a:spLocks noGrp="1"/>
+          </p:cNvSpPr>
+          <p:nvPr>
+            <p:ph type="ctrTitle"/>
+          </p:nvPr>
+        </p:nvSpPr>
+        <p:spPr>
+          <a:xfrm>
+            <a:off x="838200" y="184805"/>
+            <a:ext cx="10515600" cy="1505883"/>
+          </a:xfrm>
+        </p:spPr>
+        <p:txBody>
+          <a:bodyPr vert="horz" lIns="91440" tIns="45720" rIns="91440" bIns="45720" rtlCol="0" anchor="ctr">
+            <a:normAutofit/>
+          </a:bodyPr>
+          <a:lstStyle/>
+          <a:p>
+            <a:pPr algn="l"/>
+            <a:r>
+              <a:rPr lang="en-US" sz="5200" kern="1200">
+                <a:solidFill>
+                  <a:schemeClr val="tx1"/>
+                </a:solidFill>
+                <a:latin typeface="+mj-lt"/>
+                <a:ea typeface="+mj-ea"/>
+                <a:cs typeface="+mj-cs"/>
+              </a:rPr>
+              <a:t>https://flexboxfroggy.com</a:t>
+            </a:r>
+          </a:p>
+        </p:txBody>
+      </p:sp>
+      <p:pic>
+        <p:nvPicPr>
+          <p:cNvPr id="3074" name="Picture 2" descr="Flexbox Froggy">
+            <a:extLst>
+              <a:ext uri="{FF2B5EF4-FFF2-40B4-BE49-F238E27FC236}">
+                <a16:creationId xmlns:a16="http://schemas.microsoft.com/office/drawing/2014/main" id="{8A389D92-B60B-A27A-63AD-6E69F4C8660A}"/>
+              </a:ext>
+            </a:extLst>
+          </p:cNvPr>
+          <p:cNvPicPr>
+            <a:picLocks noChangeAspect="1" noChangeArrowheads="1"/>
+          </p:cNvPicPr>
+          <p:nvPr/>
+        </p:nvPicPr>
+        <p:blipFill>
+          <a:blip r:embed="rId2">
+            <a:extLst>
+              <a:ext uri="{28A0092B-C50C-407E-A947-70E740481C1C}">
+                <a14:useLocalDpi xmlns:a14="http://schemas.microsoft.com/office/drawing/2010/main" val="0"/>
+              </a:ext>
+            </a:extLst>
+          </a:blip>
+          <a:stretch>
+            <a:fillRect/>
+          </a:stretch>
+        </p:blipFill>
+        <p:spPr bwMode="auto">
+          <a:xfrm>
+            <a:off x="2138649" y="1845426"/>
+            <a:ext cx="7911649" cy="4450303"/>
+          </a:xfrm>
+          <a:prstGeom prst="rect">
+            <a:avLst/>
+          </a:prstGeom>
+          <a:noFill/>
+          <a:extLst>
+            <a:ext uri="{909E8E84-426E-40DD-AFC4-6F175D3DCCD1}">
+              <a14:hiddenFill xmlns:a14="http://schemas.microsoft.com/office/drawing/2010/main">
+                <a:solidFill>
+                  <a:srgbClr val="FFFFFF"/>
+                </a:solidFill>
+              </a14:hiddenFill>
+            </a:ext>
+          </a:extLst>
+        </p:spPr>
+      </p:pic>
+    </p:spTree>
+    <p:extLst>
+      <p:ext uri="{BB962C8B-B14F-4D97-AF65-F5344CB8AC3E}">
+        <p14:creationId xmlns:p14="http://schemas.microsoft.com/office/powerpoint/2010/main" val="4259059263"/>
+      </p:ext>
+    </p:extLst>
+  </p:cSld>
+  <p:clrMapOvr>
+    <a:masterClrMapping/>
+  </p:clrMapOvr>
+</p:sld>
+</file>
+
+<file path=ppt/slides/slide4.xml><?xml version="1.0" encoding="utf-8"?>
+<p:sld xmlns:a="http://schemas.openxmlformats.org/drawingml/2006/main" xmlns:r="http://schemas.openxmlformats.org/officeDocument/2006/relationships" xmlns:p="http://schemas.openxmlformats.org/presentationml/2006/main">
+  <p:cSld>
+    <p:spTree>
+      <p:nvGrpSpPr>
+        <p:cNvPr id="1" name=""/>
+        <p:cNvGrpSpPr/>
+        <p:nvPr/>
+      </p:nvGrpSpPr>
+      <p:grpSpPr>
+        <a:xfrm>
+          <a:off x="0" y="0"/>
+          <a:ext cx="0" cy="0"/>
+          <a:chOff x="0" y="0"/>
+          <a:chExt cx="0" cy="0"/>
+        </a:xfrm>
+      </p:grpSpPr>
+      <p:sp>
+        <p:nvSpPr>
+          <p:cNvPr id="2" name="Title 1">
+            <a:extLst>
+              <a:ext uri="{FF2B5EF4-FFF2-40B4-BE49-F238E27FC236}">
+                <a16:creationId xmlns:a16="http://schemas.microsoft.com/office/drawing/2014/main" id="{5D6A7798-64BC-E1E4-DC3A-060C6AE1AE9D}"/>
+              </a:ext>
+            </a:extLst>
+          </p:cNvPr>
+          <p:cNvSpPr>
+            <a:spLocks noGrp="1"/>
+          </p:cNvSpPr>
+          <p:nvPr>
+            <p:ph type="title"/>
+          </p:nvPr>
+        </p:nvSpPr>
+        <p:spPr/>
+        <p:txBody>
+          <a:bodyPr/>
+          <a:lstStyle/>
+          <a:p>
+            <a:r>
+              <a:rPr lang="es-EC"/>
+              <a:t>Tailwind en ReactJS (</a:t>
+            </a:r>
+            <a:r>
+              <a:rPr lang="es-EC" dirty="0" err="1"/>
+              <a:t>ViteJS</a:t>
+            </a:r>
+            <a:r>
+              <a:rPr lang="es-EC" dirty="0"/>
+              <a:t>)</a:t>
+            </a:r>
+          </a:p>
+        </p:txBody>
+      </p:sp>
+      <p:sp>
+        <p:nvSpPr>
+          <p:cNvPr id="3" name="Content Placeholder 2">
+            <a:extLst>
+              <a:ext uri="{FF2B5EF4-FFF2-40B4-BE49-F238E27FC236}">
+                <a16:creationId xmlns:a16="http://schemas.microsoft.com/office/drawing/2014/main" id="{219AB757-183B-BEC1-204F-D45B84CE4F3F}"/>
+              </a:ext>
+            </a:extLst>
+          </p:cNvPr>
+          <p:cNvSpPr>
+            <a:spLocks noGrp="1"/>
+          </p:cNvSpPr>
+          <p:nvPr>
+            <p:ph idx="1"/>
+          </p:nvPr>
+        </p:nvSpPr>
+        <p:spPr/>
+        <p:txBody>
+          <a:bodyPr/>
+          <a:lstStyle/>
+          <a:p>
+            <a:r>
+              <a:rPr lang="es-EC"/>
+              <a:t>Documentación </a:t>
+            </a:r>
+            <a:r>
+              <a:rPr lang="es-EC">
+                <a:hlinkClick r:id="rId2"/>
+              </a:rPr>
+              <a:t>https://tailwindcss.com/docs/guides/vite</a:t>
+            </a:r>
+            <a:endParaRPr lang="es-EC"/>
+          </a:p>
+          <a:p>
+            <a:endParaRPr lang="es-EC" dirty="0"/>
+          </a:p>
+        </p:txBody>
+      </p:sp>
+    </p:spTree>
+    <p:extLst>
+      <p:ext uri="{BB962C8B-B14F-4D97-AF65-F5344CB8AC3E}">
+        <p14:creationId xmlns:p14="http://schemas.microsoft.com/office/powerpoint/2010/main" val="3080613168"/>
+      </p:ext>
+    </p:extLst>
+  </p:cSld>
+  <p:clrMapOvr>
+    <a:masterClrMapping/>
+  </p:clrMapOvr>
+</p:sld>
+</file>
+
+<file path=ppt/slides/slide5.xml><?xml version="1.0" encoding="utf-8"?>
+<p:sld xmlns:a="http://schemas.openxmlformats.org/drawingml/2006/main" xmlns:r="http://schemas.openxmlformats.org/officeDocument/2006/relationships" xmlns:p="http://schemas.openxmlformats.org/presentationml/2006/main">
+  <p:cSld>
+    <p:bg>
+      <p:bgPr>
+        <a:solidFill>
+          <a:schemeClr val="bg1"/>
+        </a:solidFill>
+        <a:effectLst/>
+      </p:bgPr>
+    </p:bg>
+    <p:spTree>
+      <p:nvGrpSpPr>
+        <p:cNvPr id="1" name=""/>
+        <p:cNvGrpSpPr/>
+        <p:nvPr/>
+      </p:nvGrpSpPr>
+      <p:grpSpPr>
+        <a:xfrm>
+          <a:off x="0" y="0"/>
+          <a:ext cx="0" cy="0"/>
+          <a:chOff x="0" y="0"/>
+          <a:chExt cx="0" cy="0"/>
+        </a:xfrm>
+      </p:grpSpPr>
+      <p:pic>
+        <p:nvPicPr>
+          <p:cNvPr id="5" name="Picture 4" descr="A screenshot of a computer program&#10;&#10;Description automatically generated">
+            <a:extLst>
+              <a:ext uri="{FF2B5EF4-FFF2-40B4-BE49-F238E27FC236}">
+                <a16:creationId xmlns:a16="http://schemas.microsoft.com/office/drawing/2014/main" id="{643EC1A7-39C5-0CE2-BB02-1339A34F7B02}"/>
+              </a:ext>
+            </a:extLst>
+          </p:cNvPr>
+          <p:cNvPicPr>
+            <a:picLocks noChangeAspect="1"/>
+          </p:cNvPicPr>
+          <p:nvPr/>
+        </p:nvPicPr>
+        <p:blipFill>
+          <a:blip r:embed="rId2"/>
+          <a:stretch>
+            <a:fillRect/>
+          </a:stretch>
+        </p:blipFill>
+        <p:spPr>
+          <a:xfrm>
+            <a:off x="2739935" y="643466"/>
+            <a:ext cx="6712130" cy="5571067"/>
+          </a:xfrm>
+          <a:prstGeom prst="rect">
+            <a:avLst/>
+          </a:prstGeom>
+        </p:spPr>
+      </p:pic>
+    </p:spTree>
+    <p:extLst>
+      <p:ext uri="{BB962C8B-B14F-4D97-AF65-F5344CB8AC3E}">
+        <p14:creationId xmlns:p14="http://schemas.microsoft.com/office/powerpoint/2010/main" val="2468505468"/>
+      </p:ext>
+    </p:extLst>
+  </p:cSld>
+  <p:clrMapOvr>
+    <a:masterClrMapping/>
+  </p:clrMapOvr>
+</p:sld>
+</file>
+
+<file path=ppt/slides/slide6.xml><?xml version="1.0" encoding="utf-8"?>
+<p:sld xmlns:a="http://schemas.openxmlformats.org/drawingml/2006/main" xmlns:r="http://schemas.openxmlformats.org/officeDocument/2006/relationships" xmlns:p="http://schemas.openxmlformats.org/presentationml/2006/main">
+  <p:cSld>
+    <p:spTree>
+      <p:nvGrpSpPr>
+        <p:cNvPr id="1" name=""/>
+        <p:cNvGrpSpPr/>
+        <p:nvPr/>
+      </p:nvGrpSpPr>
+      <p:grpSpPr>
+        <a:xfrm>
+          <a:off x="0" y="0"/>
+          <a:ext cx="0" cy="0"/>
+          <a:chOff x="0" y="0"/>
+          <a:chExt cx="0" cy="0"/>
+        </a:xfrm>
+      </p:grpSpPr>
+      <p:pic>
+        <p:nvPicPr>
+          <p:cNvPr id="5" name="Picture 4">
+            <a:extLst>
+              <a:ext uri="{FF2B5EF4-FFF2-40B4-BE49-F238E27FC236}">
+                <a16:creationId xmlns:a16="http://schemas.microsoft.com/office/drawing/2014/main" id="{ED77698B-77AC-59B0-8E34-AD6947FB07CE}"/>
+              </a:ext>
+            </a:extLst>
+          </p:cNvPr>
+          <p:cNvPicPr>
+            <a:picLocks noChangeAspect="1"/>
+          </p:cNvPicPr>
+          <p:nvPr/>
+        </p:nvPicPr>
+        <p:blipFill>
+          <a:blip r:embed="rId3"/>
+          <a:stretch>
+            <a:fillRect/>
+          </a:stretch>
+        </p:blipFill>
+        <p:spPr>
+          <a:xfrm>
+            <a:off x="0" y="244161"/>
+            <a:ext cx="12192000" cy="6369678"/>
+          </a:xfrm>
+          <a:prstGeom prst="rect">
+            <a:avLst/>
+          </a:prstGeom>
+        </p:spPr>
+      </p:pic>
+      <p:sp>
+        <p:nvSpPr>
+          <p:cNvPr id="6" name="TextBox 5">
+            <a:extLst>
+              <a:ext uri="{FF2B5EF4-FFF2-40B4-BE49-F238E27FC236}">
+                <a16:creationId xmlns:a16="http://schemas.microsoft.com/office/drawing/2014/main" id="{8DF0DF28-BAF8-35BB-14EF-832E84DEF1B1}"/>
+              </a:ext>
+            </a:extLst>
+          </p:cNvPr>
+          <p:cNvSpPr txBox="1"/>
+          <p:nvPr/>
+        </p:nvSpPr>
+        <p:spPr>
+          <a:xfrm>
+            <a:off x="1498156" y="5552787"/>
+            <a:ext cx="9195688" cy="954107"/>
+          </a:xfrm>
+          <a:prstGeom prst="rect">
+            <a:avLst/>
+          </a:prstGeom>
+          <a:noFill/>
+        </p:spPr>
+        <p:txBody>
+          <a:bodyPr wrap="square" rtlCol="0">
+            <a:spAutoFit/>
+          </a:bodyPr>
+          <a:lstStyle/>
+          <a:p>
+            <a:r>
+              <a:rPr lang="es-EC" sz="2800" dirty="0"/>
+              <a:t>Documentación de Tailwind: </a:t>
+            </a:r>
+            <a:r>
+              <a:rPr lang="es-EC" sz="2800" dirty="0">
+                <a:hlinkClick r:id="rId4"/>
+              </a:rPr>
+              <a:t>https://tailwindcss.com/docs</a:t>
+            </a:r>
+            <a:endParaRPr lang="es-EC" sz="2800" dirty="0"/>
+          </a:p>
+          <a:p>
+            <a:endParaRPr lang="es-EC" sz="2800" dirty="0"/>
+          </a:p>
+        </p:txBody>
+      </p:sp>
+    </p:spTree>
+    <p:extLst>
+      <p:ext uri="{BB962C8B-B14F-4D97-AF65-F5344CB8AC3E}">
+        <p14:creationId xmlns:p14="http://schemas.microsoft.com/office/powerpoint/2010/main" val="126660915"/>
+      </p:ext>
+    </p:extLst>
+  </p:cSld>
+  <p:clrMapOvr>
+    <a:masterClrMapping/>
+  </p:clrMapOvr>
+</p:sld>
+</file>
+
+<file path=ppt/slides/slide7.xml><?xml version="1.0" encoding="utf-8"?>
+<p:sld xmlns:a="http://schemas.openxmlformats.org/drawingml/2006/main" xmlns:r="http://schemas.openxmlformats.org/officeDocument/2006/relationships" xmlns:p="http://schemas.openxmlformats.org/presentationml/2006/main">
+  <p:cSld>
+    <p:bg>
+      <p:bgPr>
+        <a:solidFill>
+          <a:schemeClr val="bg1"/>
+        </a:solidFill>
+        <a:effectLst/>
+      </p:bgPr>
+    </p:bg>
+    <p:spTree>
+      <p:nvGrpSpPr>
+        <p:cNvPr id="1" name=""/>
+        <p:cNvGrpSpPr/>
+        <p:nvPr/>
+      </p:nvGrpSpPr>
+      <p:grpSpPr>
+        <a:xfrm>
+          <a:off x="0" y="0"/>
+          <a:ext cx="0" cy="0"/>
+          <a:chOff x="0" y="0"/>
+          <a:chExt cx="0" cy="0"/>
+        </a:xfrm>
+      </p:grpSpPr>
+      <p:pic>
+        <p:nvPicPr>
+          <p:cNvPr id="3" name="Picture 2">
+            <a:extLst>
+              <a:ext uri="{FF2B5EF4-FFF2-40B4-BE49-F238E27FC236}">
+                <a16:creationId xmlns:a16="http://schemas.microsoft.com/office/drawing/2014/main" id="{FD2D010F-DDED-38C5-9648-51BA665ED29D}"/>
+              </a:ext>
+            </a:extLst>
+          </p:cNvPr>
+          <p:cNvPicPr>
+            <a:picLocks noChangeAspect="1"/>
+          </p:cNvPicPr>
+          <p:nvPr/>
+        </p:nvPicPr>
+        <p:blipFill>
+          <a:blip r:embed="rId2"/>
+          <a:stretch>
+            <a:fillRect/>
+          </a:stretch>
+        </p:blipFill>
+        <p:spPr>
+          <a:xfrm>
+            <a:off x="1414430" y="643466"/>
+            <a:ext cx="9363140" cy="5571067"/>
+          </a:xfrm>
+          <a:prstGeom prst="rect">
+            <a:avLst/>
+          </a:prstGeom>
+        </p:spPr>
+      </p:pic>
+    </p:spTree>
+    <p:extLst>
+      <p:ext uri="{BB962C8B-B14F-4D97-AF65-F5344CB8AC3E}">
+        <p14:creationId xmlns:p14="http://schemas.microsoft.com/office/powerpoint/2010/main" val="3112593157"/>
+      </p:ext>
+    </p:extLst>
+  </p:cSld>
+  <p:clrMapOvr>
+    <a:masterClrMapping/>
+  </p:clrMapOvr>
+</p:sld>
+</file>
+
+<file path=ppt/slides/slide8.xml><?xml version="1.0" encoding="utf-8"?>
+<p:sld xmlns:a="http://schemas.openxmlformats.org/drawingml/2006/main" xmlns:r="http://schemas.openxmlformats.org/officeDocument/2006/relationships" xmlns:p="http://schemas.openxmlformats.org/presentationml/2006/main">
+  <p:cSld>
+    <p:bg>
+      <p:bgPr>
+        <a:solidFill>
+          <a:schemeClr val="bg1"/>
+        </a:solidFill>
+        <a:effectLst/>
+      </p:bgPr>
+    </p:bg>
+    <p:spTree>
+      <p:nvGrpSpPr>
+        <p:cNvPr id="1" name=""/>
+        <p:cNvGrpSpPr/>
+        <p:nvPr/>
+      </p:nvGrpSpPr>
+      <p:grpSpPr>
+        <a:xfrm>
+          <a:off x="0" y="0"/>
+          <a:ext cx="0" cy="0"/>
+          <a:chOff x="0" y="0"/>
+          <a:chExt cx="0" cy="0"/>
+        </a:xfrm>
+      </p:grpSpPr>
+      <p:pic>
+        <p:nvPicPr>
+          <p:cNvPr id="3" name="Picture 2">
+            <a:extLst>
+              <a:ext uri="{FF2B5EF4-FFF2-40B4-BE49-F238E27FC236}">
+                <a16:creationId xmlns:a16="http://schemas.microsoft.com/office/drawing/2014/main" id="{95DC5071-E04A-E396-03D8-29EE30499AD8}"/>
+              </a:ext>
+            </a:extLst>
+          </p:cNvPr>
+          <p:cNvPicPr>
+            <a:picLocks noChangeAspect="1"/>
+          </p:cNvPicPr>
+          <p:nvPr/>
+        </p:nvPicPr>
+        <p:blipFill>
+          <a:blip r:embed="rId2"/>
+          <a:stretch>
+            <a:fillRect/>
+          </a:stretch>
+        </p:blipFill>
+        <p:spPr>
+          <a:xfrm>
+            <a:off x="643467" y="934466"/>
+            <a:ext cx="10905066" cy="4989066"/>
+          </a:xfrm>
+          <a:prstGeom prst="rect">
+            <a:avLst/>
+          </a:prstGeom>
+        </p:spPr>
+      </p:pic>
+    </p:spTree>
+    <p:extLst>
+      <p:ext uri="{BB962C8B-B14F-4D97-AF65-F5344CB8AC3E}">
+        <p14:creationId xmlns:p14="http://schemas.microsoft.com/office/powerpoint/2010/main" val="3948008719"/>
+      </p:ext>
+    </p:extLst>
+  </p:cSld>
+  <p:clrMapOvr>
+    <a:masterClrMapping/>
+  </p:clrMapOvr>
+</p:sld>
+</file>
+
+<file path=ppt/slides/slide9.xml><?xml version="1.0" encoding="utf-8"?>
+<p:sld xmlns:a="http://schemas.openxmlformats.org/drawingml/2006/main" xmlns:r="http://schemas.openxmlformats.org/officeDocument/2006/relationships" xmlns:p="http://schemas.openxmlformats.org/presentationml/2006/main">
+  <p:cSld>
+    <p:spTree>
+      <p:nvGrpSpPr>
+        <p:cNvPr id="1" name=""/>
+        <p:cNvGrpSpPr/>
+        <p:nvPr/>
+      </p:nvGrpSpPr>
+      <p:grpSpPr>
+        <a:xfrm>
+          <a:off x="0" y="0"/>
+          <a:ext cx="0" cy="0"/>
+          <a:chOff x="0" y="0"/>
+          <a:chExt cx="0" cy="0"/>
+        </a:xfrm>
+      </p:grpSpPr>
+      <p:sp>
+        <p:nvSpPr>
+          <p:cNvPr id="2" name="Title 1">
+            <a:extLst>
+              <a:ext uri="{FF2B5EF4-FFF2-40B4-BE49-F238E27FC236}">
+                <a16:creationId xmlns:a16="http://schemas.microsoft.com/office/drawing/2014/main" id="{9F6BC8C1-5490-4CA9-C80E-BC3F06C4BF8B}"/>
+              </a:ext>
+            </a:extLst>
+          </p:cNvPr>
+          <p:cNvSpPr>
+            <a:spLocks noGrp="1"/>
+          </p:cNvSpPr>
+          <p:nvPr>
+            <p:ph type="title"/>
+          </p:nvPr>
+        </p:nvSpPr>
+        <p:spPr/>
+        <p:txBody>
+          <a:bodyPr/>
+          <a:lstStyle/>
+          <a:p>
+            <a:r>
+              <a:rPr lang="en-US" dirty="0"/>
+              <a:t>Event handlers</a:t>
+            </a:r>
+            <a:endParaRPr lang="es-EC" dirty="0"/>
+          </a:p>
+        </p:txBody>
+      </p:sp>
+      <p:sp>
+        <p:nvSpPr>
+          <p:cNvPr id="3" name="Content Placeholder 2">
+            <a:extLst>
+              <a:ext uri="{FF2B5EF4-FFF2-40B4-BE49-F238E27FC236}">
+                <a16:creationId xmlns:a16="http://schemas.microsoft.com/office/drawing/2014/main" id="{2EEFC181-92D3-DEB3-7CFA-67387CFB7AF1}"/>
+              </a:ext>
+            </a:extLst>
+          </p:cNvPr>
+          <p:cNvSpPr>
+            <a:spLocks noGrp="1"/>
+          </p:cNvSpPr>
+          <p:nvPr>
+            <p:ph idx="1"/>
+          </p:nvPr>
+        </p:nvSpPr>
+        <p:spPr/>
+        <p:txBody>
+          <a:bodyPr/>
+          <a:lstStyle/>
+          <a:p>
+            <a:r>
+              <a:rPr lang="es-EC" dirty="0"/>
+              <a:t>Para cambiar el estado o comportamiento de nuestra aplicación, React permite el uso de </a:t>
+            </a:r>
+            <a:r>
+              <a:rPr lang="es-EC" dirty="0" err="1"/>
+              <a:t>event</a:t>
+            </a:r>
+            <a:r>
+              <a:rPr lang="es-EC" dirty="0"/>
+              <a:t> </a:t>
+            </a:r>
+            <a:r>
+              <a:rPr lang="es-EC" dirty="0" err="1"/>
+              <a:t>handlers</a:t>
+            </a:r>
+            <a:r>
+              <a:rPr lang="es-EC" dirty="0"/>
+              <a:t>.</a:t>
+            </a:r>
+          </a:p>
+          <a:p>
+            <a:r>
+              <a:rPr lang="es-EC" dirty="0"/>
+              <a:t>Estos </a:t>
+            </a:r>
+            <a:r>
+              <a:rPr lang="es-EC" dirty="0" err="1"/>
+              <a:t>event</a:t>
+            </a:r>
+            <a:r>
+              <a:rPr lang="es-EC" dirty="0"/>
+              <a:t> </a:t>
+            </a:r>
+            <a:r>
+              <a:rPr lang="es-EC" dirty="0" err="1"/>
+              <a:t>handlers</a:t>
+            </a:r>
+            <a:r>
+              <a:rPr lang="es-EC" dirty="0"/>
+              <a:t>  son funciones que se “disparan” en respuesta de alguna interacción del usuario con la UI. Puede ser desde un clic, escribir en un input, mover el mouse, etc.</a:t>
+            </a:r>
+          </a:p>
+        </p:txBody>
+      </p:sp>
+    </p:spTree>
+    <p:extLst>
+      <p:ext uri="{BB962C8B-B14F-4D97-AF65-F5344CB8AC3E}">
+        <p14:creationId xmlns:p14="http://schemas.microsoft.com/office/powerpoint/2010/main" val="2436362334"/>
       </p:ext>
     </p:extLst>
   </p:cSld>

</xml_diff>

<commit_message>
feat: add new changes
</commit_message>
<xml_diff>
--- a/Unidad_2/Presentación.pptx
+++ b/Unidad_2/Presentación.pptx
@@ -5,7 +5,7 @@
     <p:sldMasterId id="2147483648" r:id="rId4"/>
   </p:sldMasterIdLst>
   <p:notesMasterIdLst>
-    <p:notesMasterId r:id="rId27"/>
+    <p:notesMasterId r:id="rId18"/>
   </p:notesMasterIdLst>
   <p:sldIdLst>
     <p:sldId id="256" r:id="rId5"/>
@@ -21,15 +21,6 @@
     <p:sldId id="275" r:id="rId15"/>
     <p:sldId id="276" r:id="rId16"/>
     <p:sldId id="279" r:id="rId17"/>
-    <p:sldId id="280" r:id="rId18"/>
-    <p:sldId id="257" r:id="rId19"/>
-    <p:sldId id="258" r:id="rId20"/>
-    <p:sldId id="259" r:id="rId21"/>
-    <p:sldId id="260" r:id="rId22"/>
-    <p:sldId id="261" r:id="rId23"/>
-    <p:sldId id="262" r:id="rId24"/>
-    <p:sldId id="264" r:id="rId25"/>
-    <p:sldId id="263" r:id="rId26"/>
   </p:sldIdLst>
   <p:sldSz cx="12192000" cy="6858000"/>
   <p:notesSz cx="6858000" cy="9144000"/>
@@ -229,7 +220,7 @@
           <a:p>
             <a:fld id="{F29DC657-A5B9-41B4-AB57-79E3DB3481E8}" type="datetimeFigureOut">
               <a:rPr lang="en-US" smtClean="0"/>
-              <a:t>9/21/2024</a:t>
+              <a:t>11/5/2024</a:t>
             </a:fld>
             <a:endParaRPr lang="en-US"/>
           </a:p>
@@ -792,90 +783,6 @@
 </p:notes>
 </file>
 
-<file path=ppt/notesSlides/notesSlide3.xml><?xml version="1.0" encoding="utf-8"?>
-<p:notes xmlns:a="http://schemas.openxmlformats.org/drawingml/2006/main" xmlns:r="http://schemas.openxmlformats.org/officeDocument/2006/relationships" xmlns:p="http://schemas.openxmlformats.org/presentationml/2006/main">
-  <p:cSld>
-    <p:spTree>
-      <p:nvGrpSpPr>
-        <p:cNvPr id="1" name=""/>
-        <p:cNvGrpSpPr/>
-        <p:nvPr/>
-      </p:nvGrpSpPr>
-      <p:grpSpPr>
-        <a:xfrm>
-          <a:off x="0" y="0"/>
-          <a:ext cx="0" cy="0"/>
-          <a:chOff x="0" y="0"/>
-          <a:chExt cx="0" cy="0"/>
-        </a:xfrm>
-      </p:grpSpPr>
-      <p:sp>
-        <p:nvSpPr>
-          <p:cNvPr id="2" name="Slide Image Placeholder 1"/>
-          <p:cNvSpPr>
-            <a:spLocks noGrp="1" noRot="1" noChangeAspect="1"/>
-          </p:cNvSpPr>
-          <p:nvPr>
-            <p:ph type="sldImg"/>
-          </p:nvPr>
-        </p:nvSpPr>
-        <p:spPr/>
-      </p:sp>
-      <p:sp>
-        <p:nvSpPr>
-          <p:cNvPr id="3" name="Notes Placeholder 2"/>
-          <p:cNvSpPr>
-            <a:spLocks noGrp="1"/>
-          </p:cNvSpPr>
-          <p:nvPr>
-            <p:ph type="body" idx="1"/>
-          </p:nvPr>
-        </p:nvSpPr>
-        <p:spPr/>
-        <p:txBody>
-          <a:bodyPr/>
-          <a:lstStyle/>
-          <a:p>
-            <a:endParaRPr lang="es-EC" dirty="0"/>
-          </a:p>
-        </p:txBody>
-      </p:sp>
-      <p:sp>
-        <p:nvSpPr>
-          <p:cNvPr id="4" name="Slide Number Placeholder 3"/>
-          <p:cNvSpPr>
-            <a:spLocks noGrp="1"/>
-          </p:cNvSpPr>
-          <p:nvPr>
-            <p:ph type="sldNum" sz="quarter" idx="5"/>
-          </p:nvPr>
-        </p:nvSpPr>
-        <p:spPr/>
-        <p:txBody>
-          <a:bodyPr/>
-          <a:lstStyle/>
-          <a:p>
-            <a:fld id="{36CC9BE2-C275-426F-8D4D-ABF95C3D0034}" type="slidenum">
-              <a:rPr lang="en-US" smtClean="0"/>
-              <a:t>15</a:t>
-            </a:fld>
-            <a:endParaRPr lang="en-US"/>
-          </a:p>
-        </p:txBody>
-      </p:sp>
-    </p:spTree>
-    <p:extLst>
-      <p:ext uri="{BB962C8B-B14F-4D97-AF65-F5344CB8AC3E}">
-        <p14:creationId xmlns:p14="http://schemas.microsoft.com/office/powerpoint/2010/main" val="1202091023"/>
-      </p:ext>
-    </p:extLst>
-  </p:cSld>
-  <p:clrMapOvr>
-    <a:masterClrMapping/>
-  </p:clrMapOvr>
-</p:notes>
-</file>
-
 <file path=ppt/slideLayouts/slideLayout1.xml><?xml version="1.0" encoding="utf-8"?>
 <p:sldLayout xmlns:a="http://schemas.openxmlformats.org/drawingml/2006/main" xmlns:r="http://schemas.openxmlformats.org/officeDocument/2006/relationships" xmlns:p="http://schemas.openxmlformats.org/presentationml/2006/main" type="title" preserve="1">
   <p:cSld name="Title Slide">
@@ -1023,7 +930,7 @@
           <a:p>
             <a:fld id="{E0B89D21-97A6-4434-B3B1-BAF5738D61F3}" type="datetimeFigureOut">
               <a:rPr lang="en-US" smtClean="0"/>
-              <a:t>9/21/2024</a:t>
+              <a:t>11/5/2024</a:t>
             </a:fld>
             <a:endParaRPr lang="en-US"/>
           </a:p>
@@ -1221,7 +1128,7 @@
           <a:p>
             <a:fld id="{E0B89D21-97A6-4434-B3B1-BAF5738D61F3}" type="datetimeFigureOut">
               <a:rPr lang="en-US" smtClean="0"/>
-              <a:t>9/21/2024</a:t>
+              <a:t>11/5/2024</a:t>
             </a:fld>
             <a:endParaRPr lang="en-US"/>
           </a:p>
@@ -1429,7 +1336,7 @@
           <a:p>
             <a:fld id="{E0B89D21-97A6-4434-B3B1-BAF5738D61F3}" type="datetimeFigureOut">
               <a:rPr lang="en-US" smtClean="0"/>
-              <a:t>9/21/2024</a:t>
+              <a:t>11/5/2024</a:t>
             </a:fld>
             <a:endParaRPr lang="en-US"/>
           </a:p>
@@ -1696,7 +1603,7 @@
           <a:p>
             <a:fld id="{E0B89D21-97A6-4434-B3B1-BAF5738D61F3}" type="datetimeFigureOut">
               <a:rPr lang="en-US" smtClean="0"/>
-              <a:t>9/21/2024</a:t>
+              <a:t>11/5/2024</a:t>
             </a:fld>
             <a:endParaRPr lang="en-US"/>
           </a:p>
@@ -1971,7 +1878,7 @@
           <a:p>
             <a:fld id="{E0B89D21-97A6-4434-B3B1-BAF5738D61F3}" type="datetimeFigureOut">
               <a:rPr lang="en-US" smtClean="0"/>
-              <a:t>9/21/2024</a:t>
+              <a:t>11/5/2024</a:t>
             </a:fld>
             <a:endParaRPr lang="en-US"/>
           </a:p>
@@ -2236,7 +2143,7 @@
           <a:p>
             <a:fld id="{E0B89D21-97A6-4434-B3B1-BAF5738D61F3}" type="datetimeFigureOut">
               <a:rPr lang="en-US" smtClean="0"/>
-              <a:t>9/21/2024</a:t>
+              <a:t>11/5/2024</a:t>
             </a:fld>
             <a:endParaRPr lang="en-US"/>
           </a:p>
@@ -2648,7 +2555,7 @@
           <a:p>
             <a:fld id="{E0B89D21-97A6-4434-B3B1-BAF5738D61F3}" type="datetimeFigureOut">
               <a:rPr lang="en-US" smtClean="0"/>
-              <a:t>9/21/2024</a:t>
+              <a:t>11/5/2024</a:t>
             </a:fld>
             <a:endParaRPr lang="en-US"/>
           </a:p>
@@ -2789,7 +2696,7 @@
           <a:p>
             <a:fld id="{E0B89D21-97A6-4434-B3B1-BAF5738D61F3}" type="datetimeFigureOut">
               <a:rPr lang="en-US" smtClean="0"/>
-              <a:t>9/21/2024</a:t>
+              <a:t>11/5/2024</a:t>
             </a:fld>
             <a:endParaRPr lang="en-US"/>
           </a:p>
@@ -2902,7 +2809,7 @@
           <a:p>
             <a:fld id="{E0B89D21-97A6-4434-B3B1-BAF5738D61F3}" type="datetimeFigureOut">
               <a:rPr lang="en-US" smtClean="0"/>
-              <a:t>9/21/2024</a:t>
+              <a:t>11/5/2024</a:t>
             </a:fld>
             <a:endParaRPr lang="en-US"/>
           </a:p>
@@ -3213,7 +3120,7 @@
           <a:p>
             <a:fld id="{E0B89D21-97A6-4434-B3B1-BAF5738D61F3}" type="datetimeFigureOut">
               <a:rPr lang="en-US" smtClean="0"/>
-              <a:t>9/21/2024</a:t>
+              <a:t>11/5/2024</a:t>
             </a:fld>
             <a:endParaRPr lang="en-US"/>
           </a:p>
@@ -3501,7 +3408,7 @@
           <a:p>
             <a:fld id="{E0B89D21-97A6-4434-B3B1-BAF5738D61F3}" type="datetimeFigureOut">
               <a:rPr lang="en-US" smtClean="0"/>
-              <a:t>9/21/2024</a:t>
+              <a:t>11/5/2024</a:t>
             </a:fld>
             <a:endParaRPr lang="en-US"/>
           </a:p>
@@ -3742,7 +3649,7 @@
           <a:p>
             <a:fld id="{E0B89D21-97A6-4434-B3B1-BAF5738D61F3}" type="datetimeFigureOut">
               <a:rPr lang="en-US" smtClean="0"/>
-              <a:t>9/21/2024</a:t>
+              <a:t>11/5/2024</a:t>
             </a:fld>
             <a:endParaRPr lang="en-US"/>
           </a:p>
@@ -4588,708 +4495,6 @@
 </p:sld>
 </file>
 
-<file path=ppt/slides/slide14.xml><?xml version="1.0" encoding="utf-8"?>
-<p:sld xmlns:a="http://schemas.openxmlformats.org/drawingml/2006/main" xmlns:r="http://schemas.openxmlformats.org/officeDocument/2006/relationships" xmlns:p="http://schemas.openxmlformats.org/presentationml/2006/main">
-  <p:cSld>
-    <p:spTree>
-      <p:nvGrpSpPr>
-        <p:cNvPr id="1" name=""/>
-        <p:cNvGrpSpPr/>
-        <p:nvPr/>
-      </p:nvGrpSpPr>
-      <p:grpSpPr>
-        <a:xfrm>
-          <a:off x="0" y="0"/>
-          <a:ext cx="0" cy="0"/>
-          <a:chOff x="0" y="0"/>
-          <a:chExt cx="0" cy="0"/>
-        </a:xfrm>
-      </p:grpSpPr>
-    </p:spTree>
-    <p:extLst>
-      <p:ext uri="{BB962C8B-B14F-4D97-AF65-F5344CB8AC3E}">
-        <p14:creationId xmlns:p14="http://schemas.microsoft.com/office/powerpoint/2010/main" val="2770881863"/>
-      </p:ext>
-    </p:extLst>
-  </p:cSld>
-  <p:clrMapOvr>
-    <a:masterClrMapping/>
-  </p:clrMapOvr>
-</p:sld>
-</file>
-
-<file path=ppt/slides/slide15.xml><?xml version="1.0" encoding="utf-8"?>
-<p:sld xmlns:a="http://schemas.openxmlformats.org/drawingml/2006/main" xmlns:r="http://schemas.openxmlformats.org/officeDocument/2006/relationships" xmlns:p="http://schemas.openxmlformats.org/presentationml/2006/main">
-  <p:cSld>
-    <p:spTree>
-      <p:nvGrpSpPr>
-        <p:cNvPr id="1" name=""/>
-        <p:cNvGrpSpPr/>
-        <p:nvPr/>
-      </p:nvGrpSpPr>
-      <p:grpSpPr>
-        <a:xfrm>
-          <a:off x="0" y="0"/>
-          <a:ext cx="0" cy="0"/>
-          <a:chOff x="0" y="0"/>
-          <a:chExt cx="0" cy="0"/>
-        </a:xfrm>
-      </p:grpSpPr>
-      <p:sp>
-        <p:nvSpPr>
-          <p:cNvPr id="2" name="Title 1">
-            <a:extLst>
-              <a:ext uri="{FF2B5EF4-FFF2-40B4-BE49-F238E27FC236}">
-                <a16:creationId xmlns:a16="http://schemas.microsoft.com/office/drawing/2014/main" id="{E11580D9-0299-FCB7-5E55-2FF0B06D897C}"/>
-              </a:ext>
-            </a:extLst>
-          </p:cNvPr>
-          <p:cNvSpPr>
-            <a:spLocks noGrp="1"/>
-          </p:cNvSpPr>
-          <p:nvPr>
-            <p:ph type="title"/>
-          </p:nvPr>
-        </p:nvSpPr>
-        <p:spPr/>
-        <p:txBody>
-          <a:bodyPr/>
-          <a:lstStyle/>
-          <a:p>
-            <a:pPr algn="ctr"/>
-            <a:r>
-              <a:rPr lang="es-EC" dirty="0"/>
-              <a:t>¿Qué es CSS?</a:t>
-            </a:r>
-          </a:p>
-        </p:txBody>
-      </p:sp>
-      <p:sp>
-        <p:nvSpPr>
-          <p:cNvPr id="3" name="Text Placeholder 2">
-            <a:extLst>
-              <a:ext uri="{FF2B5EF4-FFF2-40B4-BE49-F238E27FC236}">
-                <a16:creationId xmlns:a16="http://schemas.microsoft.com/office/drawing/2014/main" id="{0454F8E8-380C-201F-431D-72FDF059208A}"/>
-              </a:ext>
-            </a:extLst>
-          </p:cNvPr>
-          <p:cNvSpPr>
-            <a:spLocks noGrp="1"/>
-          </p:cNvSpPr>
-          <p:nvPr>
-            <p:ph type="body" idx="1"/>
-          </p:nvPr>
-        </p:nvSpPr>
-        <p:spPr/>
-        <p:txBody>
-          <a:bodyPr/>
-          <a:lstStyle/>
-          <a:p>
-            <a:r>
-              <a:rPr lang="es-EC" dirty="0"/>
-              <a:t>Es un </a:t>
-            </a:r>
-            <a:r>
-              <a:rPr lang="es-EC" dirty="0" err="1"/>
-              <a:t>lenaguje</a:t>
-            </a:r>
-            <a:r>
-              <a:rPr lang="es-EC" dirty="0"/>
-              <a:t> usado para dar estilos a documentos de HTML</a:t>
-            </a:r>
-          </a:p>
-        </p:txBody>
-      </p:sp>
-    </p:spTree>
-    <p:extLst>
-      <p:ext uri="{BB962C8B-B14F-4D97-AF65-F5344CB8AC3E}">
-        <p14:creationId xmlns:p14="http://schemas.microsoft.com/office/powerpoint/2010/main" val="965286506"/>
-      </p:ext>
-    </p:extLst>
-  </p:cSld>
-  <p:clrMapOvr>
-    <a:masterClrMapping/>
-  </p:clrMapOvr>
-</p:sld>
-</file>
-
-<file path=ppt/slides/slide16.xml><?xml version="1.0" encoding="utf-8"?>
-<p:sld xmlns:a="http://schemas.openxmlformats.org/drawingml/2006/main" xmlns:r="http://schemas.openxmlformats.org/officeDocument/2006/relationships" xmlns:p="http://schemas.openxmlformats.org/presentationml/2006/main">
-  <p:cSld>
-    <p:spTree>
-      <p:nvGrpSpPr>
-        <p:cNvPr id="1" name=""/>
-        <p:cNvGrpSpPr/>
-        <p:nvPr/>
-      </p:nvGrpSpPr>
-      <p:grpSpPr>
-        <a:xfrm>
-          <a:off x="0" y="0"/>
-          <a:ext cx="0" cy="0"/>
-          <a:chOff x="0" y="0"/>
-          <a:chExt cx="0" cy="0"/>
-        </a:xfrm>
-      </p:grpSpPr>
-      <p:sp>
-        <p:nvSpPr>
-          <p:cNvPr id="2" name="Title 1">
-            <a:extLst>
-              <a:ext uri="{FF2B5EF4-FFF2-40B4-BE49-F238E27FC236}">
-                <a16:creationId xmlns:a16="http://schemas.microsoft.com/office/drawing/2014/main" id="{40974C57-912C-9001-4C91-999DB9E964D8}"/>
-              </a:ext>
-            </a:extLst>
-          </p:cNvPr>
-          <p:cNvSpPr>
-            <a:spLocks noGrp="1"/>
-          </p:cNvSpPr>
-          <p:nvPr>
-            <p:ph type="title"/>
-          </p:nvPr>
-        </p:nvSpPr>
-        <p:spPr/>
-        <p:txBody>
-          <a:bodyPr/>
-          <a:lstStyle/>
-          <a:p>
-            <a:r>
-              <a:rPr lang="es-EC" dirty="0"/>
-              <a:t>Sintaxis</a:t>
-            </a:r>
-          </a:p>
-        </p:txBody>
-      </p:sp>
-      <p:pic>
-        <p:nvPicPr>
-          <p:cNvPr id="4" name="Picture 2" descr="CSS Ruleset Terminology | CSS-Tricks">
-            <a:extLst>
-              <a:ext uri="{FF2B5EF4-FFF2-40B4-BE49-F238E27FC236}">
-                <a16:creationId xmlns:a16="http://schemas.microsoft.com/office/drawing/2014/main" id="{78CCE197-1519-BA15-E2CB-99962D1140C2}"/>
-              </a:ext>
-            </a:extLst>
-          </p:cNvPr>
-          <p:cNvPicPr>
-            <a:picLocks noChangeAspect="1" noChangeArrowheads="1"/>
-          </p:cNvPicPr>
-          <p:nvPr/>
-        </p:nvPicPr>
-        <p:blipFill>
-          <a:blip r:embed="rId2">
-            <a:extLst>
-              <a:ext uri="{28A0092B-C50C-407E-A947-70E740481C1C}">
-                <a14:useLocalDpi xmlns:a14="http://schemas.microsoft.com/office/drawing/2010/main" val="0"/>
-              </a:ext>
-            </a:extLst>
-          </a:blip>
-          <a:srcRect/>
-          <a:stretch>
-            <a:fillRect/>
-          </a:stretch>
-        </p:blipFill>
-        <p:spPr bwMode="auto">
-          <a:xfrm>
-            <a:off x="1682668" y="1872895"/>
-            <a:ext cx="8082745" cy="3685648"/>
-          </a:xfrm>
-          <a:prstGeom prst="rect">
-            <a:avLst/>
-          </a:prstGeom>
-          <a:noFill/>
-          <a:extLst>
-            <a:ext uri="{909E8E84-426E-40DD-AFC4-6F175D3DCCD1}">
-              <a14:hiddenFill xmlns:a14="http://schemas.microsoft.com/office/drawing/2010/main">
-                <a:solidFill>
-                  <a:srgbClr val="FFFFFF"/>
-                </a:solidFill>
-              </a14:hiddenFill>
-            </a:ext>
-          </a:extLst>
-        </p:spPr>
-      </p:pic>
-    </p:spTree>
-    <p:extLst>
-      <p:ext uri="{BB962C8B-B14F-4D97-AF65-F5344CB8AC3E}">
-        <p14:creationId xmlns:p14="http://schemas.microsoft.com/office/powerpoint/2010/main" val="2826459257"/>
-      </p:ext>
-    </p:extLst>
-  </p:cSld>
-  <p:clrMapOvr>
-    <a:masterClrMapping/>
-  </p:clrMapOvr>
-</p:sld>
-</file>
-
-<file path=ppt/slides/slide17.xml><?xml version="1.0" encoding="utf-8"?>
-<p:sld xmlns:a="http://schemas.openxmlformats.org/drawingml/2006/main" xmlns:r="http://schemas.openxmlformats.org/officeDocument/2006/relationships" xmlns:p="http://schemas.openxmlformats.org/presentationml/2006/main">
-  <p:cSld>
-    <p:spTree>
-      <p:nvGrpSpPr>
-        <p:cNvPr id="1" name=""/>
-        <p:cNvGrpSpPr/>
-        <p:nvPr/>
-      </p:nvGrpSpPr>
-      <p:grpSpPr>
-        <a:xfrm>
-          <a:off x="0" y="0"/>
-          <a:ext cx="0" cy="0"/>
-          <a:chOff x="0" y="0"/>
-          <a:chExt cx="0" cy="0"/>
-        </a:xfrm>
-      </p:grpSpPr>
-      <p:sp>
-        <p:nvSpPr>
-          <p:cNvPr id="2" name="Title 1">
-            <a:extLst>
-              <a:ext uri="{FF2B5EF4-FFF2-40B4-BE49-F238E27FC236}">
-                <a16:creationId xmlns:a16="http://schemas.microsoft.com/office/drawing/2014/main" id="{14046D58-81FA-046F-284D-F5D15E531CA2}"/>
-              </a:ext>
-            </a:extLst>
-          </p:cNvPr>
-          <p:cNvSpPr>
-            <a:spLocks noGrp="1"/>
-          </p:cNvSpPr>
-          <p:nvPr>
-            <p:ph type="title"/>
-          </p:nvPr>
-        </p:nvSpPr>
-        <p:spPr/>
-        <p:txBody>
-          <a:bodyPr/>
-          <a:lstStyle/>
-          <a:p>
-            <a:r>
-              <a:rPr lang="en-US" dirty="0" err="1"/>
-              <a:t>Selectores</a:t>
-            </a:r>
-            <a:endParaRPr lang="es-EC" dirty="0"/>
-          </a:p>
-        </p:txBody>
-      </p:sp>
-      <p:sp>
-        <p:nvSpPr>
-          <p:cNvPr id="3" name="Content Placeholder 2">
-            <a:extLst>
-              <a:ext uri="{FF2B5EF4-FFF2-40B4-BE49-F238E27FC236}">
-                <a16:creationId xmlns:a16="http://schemas.microsoft.com/office/drawing/2014/main" id="{DFDA2733-8E8D-074A-409E-EEF5E3824053}"/>
-              </a:ext>
-            </a:extLst>
-          </p:cNvPr>
-          <p:cNvSpPr>
-            <a:spLocks noGrp="1"/>
-          </p:cNvSpPr>
-          <p:nvPr>
-            <p:ph idx="1"/>
-          </p:nvPr>
-        </p:nvSpPr>
-        <p:spPr/>
-        <p:txBody>
-          <a:bodyPr/>
-          <a:lstStyle/>
-          <a:p>
-            <a:r>
-              <a:rPr lang="en-US" dirty="0"/>
-              <a:t>Simples (</a:t>
-            </a:r>
-            <a:r>
-              <a:rPr lang="en-US" dirty="0" err="1"/>
-              <a:t>clase</a:t>
-            </a:r>
-            <a:r>
-              <a:rPr lang="en-US" dirty="0"/>
-              <a:t>, </a:t>
-            </a:r>
-            <a:r>
-              <a:rPr lang="en-US" dirty="0" err="1"/>
-              <a:t>tipo</a:t>
-            </a:r>
-            <a:r>
-              <a:rPr lang="en-US" dirty="0"/>
-              <a:t> o ID)</a:t>
-            </a:r>
-          </a:p>
-          <a:p>
-            <a:r>
-              <a:rPr lang="en-US" dirty="0" err="1"/>
-              <a:t>Atributos</a:t>
-            </a:r>
-            <a:endParaRPr lang="en-US" dirty="0"/>
-          </a:p>
-          <a:p>
-            <a:r>
-              <a:rPr lang="en-US" dirty="0" err="1"/>
-              <a:t>Pseudoclases</a:t>
-            </a:r>
-            <a:endParaRPr lang="en-US" dirty="0"/>
-          </a:p>
-          <a:p>
-            <a:r>
-              <a:rPr lang="en-US" dirty="0" err="1"/>
-              <a:t>Combinadores</a:t>
-            </a:r>
-            <a:endParaRPr lang="es-EC" dirty="0"/>
-          </a:p>
-        </p:txBody>
-      </p:sp>
-    </p:spTree>
-    <p:extLst>
-      <p:ext uri="{BB962C8B-B14F-4D97-AF65-F5344CB8AC3E}">
-        <p14:creationId xmlns:p14="http://schemas.microsoft.com/office/powerpoint/2010/main" val="2739988269"/>
-      </p:ext>
-    </p:extLst>
-  </p:cSld>
-  <p:clrMapOvr>
-    <a:masterClrMapping/>
-  </p:clrMapOvr>
-</p:sld>
-</file>
-
-<file path=ppt/slides/slide18.xml><?xml version="1.0" encoding="utf-8"?>
-<p:sld xmlns:a="http://schemas.openxmlformats.org/drawingml/2006/main" xmlns:r="http://schemas.openxmlformats.org/officeDocument/2006/relationships" xmlns:p="http://schemas.openxmlformats.org/presentationml/2006/main">
-  <p:cSld>
-    <p:bg>
-      <p:bgPr>
-        <a:solidFill>
-          <a:schemeClr val="bg1"/>
-        </a:solidFill>
-        <a:effectLst/>
-      </p:bgPr>
-    </p:bg>
-    <p:spTree>
-      <p:nvGrpSpPr>
-        <p:cNvPr id="1" name=""/>
-        <p:cNvGrpSpPr/>
-        <p:nvPr/>
-      </p:nvGrpSpPr>
-      <p:grpSpPr>
-        <a:xfrm>
-          <a:off x="0" y="0"/>
-          <a:ext cx="0" cy="0"/>
-          <a:chOff x="0" y="0"/>
-          <a:chExt cx="0" cy="0"/>
-        </a:xfrm>
-      </p:grpSpPr>
-      <p:sp useBgFill="1">
-        <p:nvSpPr>
-          <p:cNvPr id="19" name="Rectangle 18">
-            <a:extLst>
-              <a:ext uri="{FF2B5EF4-FFF2-40B4-BE49-F238E27FC236}">
-                <a16:creationId xmlns:a16="http://schemas.microsoft.com/office/drawing/2014/main" id="{53F29798-D584-4792-9B62-3F5F5C36D619}"/>
-              </a:ext>
-              <a:ext uri="{C183D7F6-B498-43B3-948B-1728B52AA6E4}">
-                <adec:decorative xmlns:adec="http://schemas.microsoft.com/office/drawing/2017/decorative" val="1"/>
-              </a:ext>
-            </a:extLst>
-          </p:cNvPr>
-          <p:cNvSpPr>
-            <a:spLocks noGrp="1" noRot="1" noChangeAspect="1" noMove="1" noResize="1" noEditPoints="1" noAdjustHandles="1" noChangeArrowheads="1" noChangeShapeType="1" noTextEdit="1"/>
-          </p:cNvSpPr>
-          <p:nvPr>
-            <p:extLst>
-              <p:ext uri="{386F3935-93C4-4BCD-93E2-E3B085C9AB24}">
-                <p16:designElem xmlns:p16="http://schemas.microsoft.com/office/powerpoint/2015/main" val="1"/>
-              </p:ext>
-            </p:extLst>
-          </p:nvPr>
-        </p:nvSpPr>
-        <p:spPr>
-          <a:xfrm>
-            <a:off x="0" y="0"/>
-            <a:ext cx="12188952" cy="6858000"/>
-          </a:xfrm>
-          <a:prstGeom prst="rect">
-            <a:avLst/>
-          </a:prstGeom>
-          <a:ln>
-            <a:noFill/>
-          </a:ln>
-        </p:spPr>
-        <p:style>
-          <a:lnRef idx="2">
-            <a:schemeClr val="accent1">
-              <a:shade val="50000"/>
-            </a:schemeClr>
-          </a:lnRef>
-          <a:fillRef idx="1">
-            <a:schemeClr val="accent1"/>
-          </a:fillRef>
-          <a:effectRef idx="0">
-            <a:schemeClr val="accent1"/>
-          </a:effectRef>
-          <a:fontRef idx="minor">
-            <a:schemeClr val="lt1"/>
-          </a:fontRef>
-        </p:style>
-        <p:txBody>
-          <a:bodyPr rtlCol="0" anchor="ctr"/>
-          <a:lstStyle/>
-          <a:p>
-            <a:pPr algn="ctr"/>
-            <a:endParaRPr lang="en-US"/>
-          </a:p>
-        </p:txBody>
-      </p:sp>
-      <p:sp>
-        <p:nvSpPr>
-          <p:cNvPr id="2" name="Title 1">
-            <a:extLst>
-              <a:ext uri="{FF2B5EF4-FFF2-40B4-BE49-F238E27FC236}">
-                <a16:creationId xmlns:a16="http://schemas.microsoft.com/office/drawing/2014/main" id="{E889ECD1-DA6C-F055-B111-F83CD6D3B40C}"/>
-              </a:ext>
-            </a:extLst>
-          </p:cNvPr>
-          <p:cNvSpPr>
-            <a:spLocks noGrp="1"/>
-          </p:cNvSpPr>
-          <p:nvPr>
-            <p:ph type="title"/>
-          </p:nvPr>
-        </p:nvSpPr>
-        <p:spPr>
-          <a:xfrm>
-            <a:off x="838200" y="184805"/>
-            <a:ext cx="10515600" cy="1505883"/>
-          </a:xfrm>
-        </p:spPr>
-        <p:txBody>
-          <a:bodyPr vert="horz" lIns="91440" tIns="45720" rIns="91440" bIns="45720" rtlCol="0" anchor="ctr">
-            <a:normAutofit/>
-          </a:bodyPr>
-          <a:lstStyle/>
-          <a:p>
-            <a:r>
-              <a:rPr lang="en-US" sz="5200" kern="1200">
-                <a:solidFill>
-                  <a:schemeClr val="tx1"/>
-                </a:solidFill>
-                <a:latin typeface="+mj-lt"/>
-                <a:ea typeface="+mj-ea"/>
-                <a:cs typeface="+mj-cs"/>
-              </a:rPr>
-              <a:t>Simples</a:t>
-            </a:r>
-          </a:p>
-        </p:txBody>
-      </p:sp>
-      <p:pic>
-        <p:nvPicPr>
-          <p:cNvPr id="11" name="Picture 10">
-            <a:extLst>
-              <a:ext uri="{FF2B5EF4-FFF2-40B4-BE49-F238E27FC236}">
-                <a16:creationId xmlns:a16="http://schemas.microsoft.com/office/drawing/2014/main" id="{B16270CC-0C12-8232-6EC9-3A17D2C85F52}"/>
-              </a:ext>
-            </a:extLst>
-          </p:cNvPr>
-          <p:cNvPicPr>
-            <a:picLocks noChangeAspect="1"/>
-          </p:cNvPicPr>
-          <p:nvPr/>
-        </p:nvPicPr>
-        <p:blipFill>
-          <a:blip r:embed="rId2"/>
-          <a:stretch>
-            <a:fillRect/>
-          </a:stretch>
-        </p:blipFill>
-        <p:spPr>
-          <a:xfrm>
-            <a:off x="3637465" y="744718"/>
-            <a:ext cx="4783641" cy="6113282"/>
-          </a:xfrm>
-          <a:prstGeom prst="rect">
-            <a:avLst/>
-          </a:prstGeom>
-        </p:spPr>
-      </p:pic>
-    </p:spTree>
-    <p:extLst>
-      <p:ext uri="{BB962C8B-B14F-4D97-AF65-F5344CB8AC3E}">
-        <p14:creationId xmlns:p14="http://schemas.microsoft.com/office/powerpoint/2010/main" val="609588253"/>
-      </p:ext>
-    </p:extLst>
-  </p:cSld>
-  <p:clrMapOvr>
-    <a:masterClrMapping/>
-  </p:clrMapOvr>
-</p:sld>
-</file>
-
-<file path=ppt/slides/slide19.xml><?xml version="1.0" encoding="utf-8"?>
-<p:sld xmlns:a="http://schemas.openxmlformats.org/drawingml/2006/main" xmlns:r="http://schemas.openxmlformats.org/officeDocument/2006/relationships" xmlns:p="http://schemas.openxmlformats.org/presentationml/2006/main">
-  <p:cSld>
-    <p:bg>
-      <p:bgPr>
-        <a:solidFill>
-          <a:schemeClr val="bg1"/>
-        </a:solidFill>
-        <a:effectLst/>
-      </p:bgPr>
-    </p:bg>
-    <p:spTree>
-      <p:nvGrpSpPr>
-        <p:cNvPr id="1" name=""/>
-        <p:cNvGrpSpPr/>
-        <p:nvPr/>
-      </p:nvGrpSpPr>
-      <p:grpSpPr>
-        <a:xfrm>
-          <a:off x="0" y="0"/>
-          <a:ext cx="0" cy="0"/>
-          <a:chOff x="0" y="0"/>
-          <a:chExt cx="0" cy="0"/>
-        </a:xfrm>
-      </p:grpSpPr>
-      <p:sp useBgFill="1">
-        <p:nvSpPr>
-          <p:cNvPr id="21" name="Rectangle 20">
-            <a:extLst>
-              <a:ext uri="{FF2B5EF4-FFF2-40B4-BE49-F238E27FC236}">
-                <a16:creationId xmlns:a16="http://schemas.microsoft.com/office/drawing/2014/main" id="{53F29798-D584-4792-9B62-3F5F5C36D619}"/>
-              </a:ext>
-              <a:ext uri="{C183D7F6-B498-43B3-948B-1728B52AA6E4}">
-                <adec:decorative xmlns:adec="http://schemas.microsoft.com/office/drawing/2017/decorative" val="1"/>
-              </a:ext>
-            </a:extLst>
-          </p:cNvPr>
-          <p:cNvSpPr>
-            <a:spLocks noGrp="1" noRot="1" noChangeAspect="1" noMove="1" noResize="1" noEditPoints="1" noAdjustHandles="1" noChangeArrowheads="1" noChangeShapeType="1" noTextEdit="1"/>
-          </p:cNvSpPr>
-          <p:nvPr>
-            <p:extLst>
-              <p:ext uri="{386F3935-93C4-4BCD-93E2-E3B085C9AB24}">
-                <p16:designElem xmlns:p16="http://schemas.microsoft.com/office/powerpoint/2015/main" val="1"/>
-              </p:ext>
-            </p:extLst>
-          </p:nvPr>
-        </p:nvSpPr>
-        <p:spPr>
-          <a:xfrm>
-            <a:off x="0" y="0"/>
-            <a:ext cx="12188952" cy="6858000"/>
-          </a:xfrm>
-          <a:prstGeom prst="rect">
-            <a:avLst/>
-          </a:prstGeom>
-          <a:ln>
-            <a:noFill/>
-          </a:ln>
-        </p:spPr>
-        <p:style>
-          <a:lnRef idx="2">
-            <a:schemeClr val="accent1">
-              <a:shade val="50000"/>
-            </a:schemeClr>
-          </a:lnRef>
-          <a:fillRef idx="1">
-            <a:schemeClr val="accent1"/>
-          </a:fillRef>
-          <a:effectRef idx="0">
-            <a:schemeClr val="accent1"/>
-          </a:effectRef>
-          <a:fontRef idx="minor">
-            <a:schemeClr val="lt1"/>
-          </a:fontRef>
-        </p:style>
-        <p:txBody>
-          <a:bodyPr rtlCol="0" anchor="ctr"/>
-          <a:lstStyle/>
-          <a:p>
-            <a:pPr algn="ctr"/>
-            <a:endParaRPr lang="en-US"/>
-          </a:p>
-        </p:txBody>
-      </p:sp>
-      <p:sp>
-        <p:nvSpPr>
-          <p:cNvPr id="2" name="Title 1">
-            <a:extLst>
-              <a:ext uri="{FF2B5EF4-FFF2-40B4-BE49-F238E27FC236}">
-                <a16:creationId xmlns:a16="http://schemas.microsoft.com/office/drawing/2014/main" id="{E889ECD1-DA6C-F055-B111-F83CD6D3B40C}"/>
-              </a:ext>
-            </a:extLst>
-          </p:cNvPr>
-          <p:cNvSpPr>
-            <a:spLocks noGrp="1"/>
-          </p:cNvSpPr>
-          <p:nvPr>
-            <p:ph type="title"/>
-          </p:nvPr>
-        </p:nvSpPr>
-        <p:spPr>
-          <a:xfrm>
-            <a:off x="838200" y="184805"/>
-            <a:ext cx="10515600" cy="1505883"/>
-          </a:xfrm>
-        </p:spPr>
-        <p:txBody>
-          <a:bodyPr vert="horz" lIns="91440" tIns="45720" rIns="91440" bIns="45720" rtlCol="0" anchor="ctr">
-            <a:normAutofit/>
-          </a:bodyPr>
-          <a:lstStyle/>
-          <a:p>
-            <a:r>
-              <a:rPr lang="en-US" sz="5200" kern="1200">
-                <a:solidFill>
-                  <a:schemeClr val="tx1"/>
-                </a:solidFill>
-                <a:latin typeface="+mj-lt"/>
-                <a:ea typeface="+mj-ea"/>
-                <a:cs typeface="+mj-cs"/>
-              </a:rPr>
-              <a:t>Atributos</a:t>
-            </a:r>
-            <a:endParaRPr lang="en-US" sz="5200" kern="1200" dirty="0">
-              <a:solidFill>
-                <a:schemeClr val="tx1"/>
-              </a:solidFill>
-              <a:latin typeface="+mj-lt"/>
-              <a:ea typeface="+mj-ea"/>
-              <a:cs typeface="+mj-cs"/>
-            </a:endParaRPr>
-          </a:p>
-        </p:txBody>
-      </p:sp>
-      <p:pic>
-        <p:nvPicPr>
-          <p:cNvPr id="16" name="Picture 15">
-            <a:extLst>
-              <a:ext uri="{FF2B5EF4-FFF2-40B4-BE49-F238E27FC236}">
-                <a16:creationId xmlns:a16="http://schemas.microsoft.com/office/drawing/2014/main" id="{E93EDDE3-67D1-7715-6A4C-93A2CF80DDCA}"/>
-              </a:ext>
-            </a:extLst>
-          </p:cNvPr>
-          <p:cNvPicPr>
-            <a:picLocks noChangeAspect="1"/>
-          </p:cNvPicPr>
-          <p:nvPr/>
-        </p:nvPicPr>
-        <p:blipFill>
-          <a:blip r:embed="rId2"/>
-          <a:stretch>
-            <a:fillRect/>
-          </a:stretch>
-        </p:blipFill>
-        <p:spPr>
-          <a:xfrm>
-            <a:off x="2750329" y="1269938"/>
-            <a:ext cx="6691341" cy="5403257"/>
-          </a:xfrm>
-          <a:prstGeom prst="rect">
-            <a:avLst/>
-          </a:prstGeom>
-        </p:spPr>
-      </p:pic>
-    </p:spTree>
-    <p:extLst>
-      <p:ext uri="{BB962C8B-B14F-4D97-AF65-F5344CB8AC3E}">
-        <p14:creationId xmlns:p14="http://schemas.microsoft.com/office/powerpoint/2010/main" val="3660773295"/>
-      </p:ext>
-    </p:extLst>
-  </p:cSld>
-  <p:clrMapOvr>
-    <a:masterClrMapping/>
-  </p:clrMapOvr>
-</p:sld>
-</file>
-
 <file path=ppt/slides/slide2.xml><?xml version="1.0" encoding="utf-8"?>
 <p:sld xmlns:a="http://schemas.openxmlformats.org/drawingml/2006/main" xmlns:r="http://schemas.openxmlformats.org/officeDocument/2006/relationships" xmlns:p="http://schemas.openxmlformats.org/presentationml/2006/main">
   <p:cSld>
@@ -5513,485 +4718,6 @@
     <p:extLst>
       <p:ext uri="{BB962C8B-B14F-4D97-AF65-F5344CB8AC3E}">
         <p14:creationId xmlns:p14="http://schemas.microsoft.com/office/powerpoint/2010/main" val="1495541469"/>
-      </p:ext>
-    </p:extLst>
-  </p:cSld>
-  <p:clrMapOvr>
-    <a:masterClrMapping/>
-  </p:clrMapOvr>
-</p:sld>
-</file>
-
-<file path=ppt/slides/slide20.xml><?xml version="1.0" encoding="utf-8"?>
-<p:sld xmlns:a="http://schemas.openxmlformats.org/drawingml/2006/main" xmlns:r="http://schemas.openxmlformats.org/officeDocument/2006/relationships" xmlns:p="http://schemas.openxmlformats.org/presentationml/2006/main">
-  <p:cSld>
-    <p:spTree>
-      <p:nvGrpSpPr>
-        <p:cNvPr id="1" name=""/>
-        <p:cNvGrpSpPr/>
-        <p:nvPr/>
-      </p:nvGrpSpPr>
-      <p:grpSpPr>
-        <a:xfrm>
-          <a:off x="0" y="0"/>
-          <a:ext cx="0" cy="0"/>
-          <a:chOff x="0" y="0"/>
-          <a:chExt cx="0" cy="0"/>
-        </a:xfrm>
-      </p:grpSpPr>
-      <p:sp>
-        <p:nvSpPr>
-          <p:cNvPr id="2" name="Title 1">
-            <a:extLst>
-              <a:ext uri="{FF2B5EF4-FFF2-40B4-BE49-F238E27FC236}">
-                <a16:creationId xmlns:a16="http://schemas.microsoft.com/office/drawing/2014/main" id="{E889ECD1-DA6C-F055-B111-F83CD6D3B40C}"/>
-              </a:ext>
-            </a:extLst>
-          </p:cNvPr>
-          <p:cNvSpPr>
-            <a:spLocks noGrp="1"/>
-          </p:cNvSpPr>
-          <p:nvPr>
-            <p:ph type="title"/>
-          </p:nvPr>
-        </p:nvSpPr>
-        <p:spPr>
-          <a:xfrm>
-            <a:off x="838200" y="184805"/>
-            <a:ext cx="10515600" cy="1505883"/>
-          </a:xfrm>
-        </p:spPr>
-        <p:txBody>
-          <a:bodyPr vert="horz" lIns="91440" tIns="45720" rIns="91440" bIns="45720" rtlCol="0" anchor="ctr">
-            <a:normAutofit/>
-          </a:bodyPr>
-          <a:lstStyle/>
-          <a:p>
-            <a:r>
-              <a:rPr lang="en-US" sz="5200" dirty="0" err="1"/>
-              <a:t>P</a:t>
-            </a:r>
-            <a:r>
-              <a:rPr lang="en-US" sz="5200" kern="1200" dirty="0" err="1">
-                <a:solidFill>
-                  <a:schemeClr val="tx1"/>
-                </a:solidFill>
-                <a:latin typeface="+mj-lt"/>
-                <a:ea typeface="+mj-ea"/>
-                <a:cs typeface="+mj-cs"/>
-              </a:rPr>
-              <a:t>seudoclase</a:t>
-            </a:r>
-            <a:r>
-              <a:rPr lang="en-US" sz="5200" kern="1200" dirty="0">
-                <a:solidFill>
-                  <a:schemeClr val="tx1"/>
-                </a:solidFill>
-                <a:latin typeface="+mj-lt"/>
-                <a:ea typeface="+mj-ea"/>
-                <a:cs typeface="+mj-cs"/>
-              </a:rPr>
-              <a:t> o </a:t>
-            </a:r>
-            <a:r>
-              <a:rPr lang="en-US" sz="5200" dirty="0" err="1"/>
-              <a:t>p</a:t>
-            </a:r>
-            <a:r>
-              <a:rPr lang="en-US" sz="5200" kern="1200" dirty="0" err="1">
-                <a:solidFill>
-                  <a:schemeClr val="tx1"/>
-                </a:solidFill>
-                <a:latin typeface="+mj-lt"/>
-                <a:ea typeface="+mj-ea"/>
-                <a:cs typeface="+mj-cs"/>
-              </a:rPr>
-              <a:t>seudoelementos</a:t>
-            </a:r>
-            <a:endParaRPr lang="en-US" sz="5200" kern="1200" dirty="0">
-              <a:solidFill>
-                <a:schemeClr val="tx1"/>
-              </a:solidFill>
-              <a:latin typeface="+mj-lt"/>
-              <a:ea typeface="+mj-ea"/>
-              <a:cs typeface="+mj-cs"/>
-            </a:endParaRPr>
-          </a:p>
-        </p:txBody>
-      </p:sp>
-      <p:pic>
-        <p:nvPicPr>
-          <p:cNvPr id="4" name="Picture 3">
-            <a:extLst>
-              <a:ext uri="{FF2B5EF4-FFF2-40B4-BE49-F238E27FC236}">
-                <a16:creationId xmlns:a16="http://schemas.microsoft.com/office/drawing/2014/main" id="{C4F0CA39-B559-3452-A1D3-B7CF7A8038C0}"/>
-              </a:ext>
-            </a:extLst>
-          </p:cNvPr>
-          <p:cNvPicPr>
-            <a:picLocks noChangeAspect="1"/>
-          </p:cNvPicPr>
-          <p:nvPr/>
-        </p:nvPicPr>
-        <p:blipFill>
-          <a:blip r:embed="rId2"/>
-          <a:stretch>
-            <a:fillRect/>
-          </a:stretch>
-        </p:blipFill>
-        <p:spPr>
-          <a:xfrm>
-            <a:off x="3286416" y="1225485"/>
-            <a:ext cx="5619168" cy="5632515"/>
-          </a:xfrm>
-          <a:prstGeom prst="rect">
-            <a:avLst/>
-          </a:prstGeom>
-        </p:spPr>
-      </p:pic>
-    </p:spTree>
-    <p:extLst>
-      <p:ext uri="{BB962C8B-B14F-4D97-AF65-F5344CB8AC3E}">
-        <p14:creationId xmlns:p14="http://schemas.microsoft.com/office/powerpoint/2010/main" val="1849558134"/>
-      </p:ext>
-    </p:extLst>
-  </p:cSld>
-  <p:clrMapOvr>
-    <a:masterClrMapping/>
-  </p:clrMapOvr>
-</p:sld>
-</file>
-
-<file path=ppt/slides/slide21.xml><?xml version="1.0" encoding="utf-8"?>
-<p:sld xmlns:a="http://schemas.openxmlformats.org/drawingml/2006/main" xmlns:r="http://schemas.openxmlformats.org/officeDocument/2006/relationships" xmlns:p="http://schemas.openxmlformats.org/presentationml/2006/main">
-  <p:cSld>
-    <p:bg>
-      <p:bgPr>
-        <a:solidFill>
-          <a:schemeClr val="bg1"/>
-        </a:solidFill>
-        <a:effectLst/>
-      </p:bgPr>
-    </p:bg>
-    <p:spTree>
-      <p:nvGrpSpPr>
-        <p:cNvPr id="1" name=""/>
-        <p:cNvGrpSpPr/>
-        <p:nvPr/>
-      </p:nvGrpSpPr>
-      <p:grpSpPr>
-        <a:xfrm>
-          <a:off x="0" y="0"/>
-          <a:ext cx="0" cy="0"/>
-          <a:chOff x="0" y="0"/>
-          <a:chExt cx="0" cy="0"/>
-        </a:xfrm>
-      </p:grpSpPr>
-      <p:sp useBgFill="1">
-        <p:nvSpPr>
-          <p:cNvPr id="10" name="Rectangle 9">
-            <a:extLst>
-              <a:ext uri="{FF2B5EF4-FFF2-40B4-BE49-F238E27FC236}">
-                <a16:creationId xmlns:a16="http://schemas.microsoft.com/office/drawing/2014/main" id="{BB7C0E06-6EE7-4DC1-8358-E6A2581DF358}"/>
-              </a:ext>
-              <a:ext uri="{C183D7F6-B498-43B3-948B-1728B52AA6E4}">
-                <adec:decorative xmlns:adec="http://schemas.microsoft.com/office/drawing/2017/decorative" val="1"/>
-              </a:ext>
-            </a:extLst>
-          </p:cNvPr>
-          <p:cNvSpPr>
-            <a:spLocks noGrp="1" noRot="1" noChangeAspect="1" noMove="1" noResize="1" noEditPoints="1" noAdjustHandles="1" noChangeArrowheads="1" noChangeShapeType="1" noTextEdit="1"/>
-          </p:cNvSpPr>
-          <p:nvPr>
-            <p:extLst>
-              <p:ext uri="{386F3935-93C4-4BCD-93E2-E3B085C9AB24}">
-                <p16:designElem xmlns:p16="http://schemas.microsoft.com/office/powerpoint/2015/main" val="1"/>
-              </p:ext>
-            </p:extLst>
-          </p:nvPr>
-        </p:nvSpPr>
-        <p:spPr bwMode="white">
-          <a:xfrm>
-            <a:off x="1524" y="0"/>
-            <a:ext cx="12188952" cy="6858000"/>
-          </a:xfrm>
-          <a:prstGeom prst="rect">
-            <a:avLst/>
-          </a:prstGeom>
-          <a:ln>
-            <a:noFill/>
-          </a:ln>
-        </p:spPr>
-        <p:style>
-          <a:lnRef idx="2">
-            <a:schemeClr val="accent1">
-              <a:shade val="50000"/>
-            </a:schemeClr>
-          </a:lnRef>
-          <a:fillRef idx="1">
-            <a:schemeClr val="accent1"/>
-          </a:fillRef>
-          <a:effectRef idx="0">
-            <a:schemeClr val="accent1"/>
-          </a:effectRef>
-          <a:fontRef idx="minor">
-            <a:schemeClr val="lt1"/>
-          </a:fontRef>
-        </p:style>
-        <p:txBody>
-          <a:bodyPr rtlCol="0" anchor="ctr"/>
-          <a:lstStyle>
-            <a:defPPr>
-              <a:defRPr lang="en-US"/>
-            </a:defPPr>
-            <a:lvl1pPr marL="0" algn="l" defTabSz="914400" rtl="0" eaLnBrk="1" latinLnBrk="0" hangingPunct="1">
-              <a:defRPr sz="1800" kern="1200">
-                <a:solidFill>
-                  <a:schemeClr val="lt1"/>
-                </a:solidFill>
-                <a:latin typeface="+mn-lt"/>
-                <a:ea typeface="+mn-ea"/>
-                <a:cs typeface="+mn-cs"/>
-              </a:defRPr>
-            </a:lvl1pPr>
-            <a:lvl2pPr marL="457200" algn="l" defTabSz="914400" rtl="0" eaLnBrk="1" latinLnBrk="0" hangingPunct="1">
-              <a:defRPr sz="1800" kern="1200">
-                <a:solidFill>
-                  <a:schemeClr val="lt1"/>
-                </a:solidFill>
-                <a:latin typeface="+mn-lt"/>
-                <a:ea typeface="+mn-ea"/>
-                <a:cs typeface="+mn-cs"/>
-              </a:defRPr>
-            </a:lvl2pPr>
-            <a:lvl3pPr marL="914400" algn="l" defTabSz="914400" rtl="0" eaLnBrk="1" latinLnBrk="0" hangingPunct="1">
-              <a:defRPr sz="1800" kern="1200">
-                <a:solidFill>
-                  <a:schemeClr val="lt1"/>
-                </a:solidFill>
-                <a:latin typeface="+mn-lt"/>
-                <a:ea typeface="+mn-ea"/>
-                <a:cs typeface="+mn-cs"/>
-              </a:defRPr>
-            </a:lvl3pPr>
-            <a:lvl4pPr marL="1371600" algn="l" defTabSz="914400" rtl="0" eaLnBrk="1" latinLnBrk="0" hangingPunct="1">
-              <a:defRPr sz="1800" kern="1200">
-                <a:solidFill>
-                  <a:schemeClr val="lt1"/>
-                </a:solidFill>
-                <a:latin typeface="+mn-lt"/>
-                <a:ea typeface="+mn-ea"/>
-                <a:cs typeface="+mn-cs"/>
-              </a:defRPr>
-            </a:lvl4pPr>
-            <a:lvl5pPr marL="1828800" algn="l" defTabSz="914400" rtl="0" eaLnBrk="1" latinLnBrk="0" hangingPunct="1">
-              <a:defRPr sz="1800" kern="1200">
-                <a:solidFill>
-                  <a:schemeClr val="lt1"/>
-                </a:solidFill>
-                <a:latin typeface="+mn-lt"/>
-                <a:ea typeface="+mn-ea"/>
-                <a:cs typeface="+mn-cs"/>
-              </a:defRPr>
-            </a:lvl5pPr>
-            <a:lvl6pPr marL="2286000" algn="l" defTabSz="914400" rtl="0" eaLnBrk="1" latinLnBrk="0" hangingPunct="1">
-              <a:defRPr sz="1800" kern="1200">
-                <a:solidFill>
-                  <a:schemeClr val="lt1"/>
-                </a:solidFill>
-                <a:latin typeface="+mn-lt"/>
-                <a:ea typeface="+mn-ea"/>
-                <a:cs typeface="+mn-cs"/>
-              </a:defRPr>
-            </a:lvl6pPr>
-            <a:lvl7pPr marL="2743200" algn="l" defTabSz="914400" rtl="0" eaLnBrk="1" latinLnBrk="0" hangingPunct="1">
-              <a:defRPr sz="1800" kern="1200">
-                <a:solidFill>
-                  <a:schemeClr val="lt1"/>
-                </a:solidFill>
-                <a:latin typeface="+mn-lt"/>
-                <a:ea typeface="+mn-ea"/>
-                <a:cs typeface="+mn-cs"/>
-              </a:defRPr>
-            </a:lvl7pPr>
-            <a:lvl8pPr marL="3200400" algn="l" defTabSz="914400" rtl="0" eaLnBrk="1" latinLnBrk="0" hangingPunct="1">
-              <a:defRPr sz="1800" kern="1200">
-                <a:solidFill>
-                  <a:schemeClr val="lt1"/>
-                </a:solidFill>
-                <a:latin typeface="+mn-lt"/>
-                <a:ea typeface="+mn-ea"/>
-                <a:cs typeface="+mn-cs"/>
-              </a:defRPr>
-            </a:lvl8pPr>
-            <a:lvl9pPr marL="3657600" algn="l" defTabSz="914400" rtl="0" eaLnBrk="1" latinLnBrk="0" hangingPunct="1">
-              <a:defRPr sz="1800" kern="1200">
-                <a:solidFill>
-                  <a:schemeClr val="lt1"/>
-                </a:solidFill>
-                <a:latin typeface="+mn-lt"/>
-                <a:ea typeface="+mn-ea"/>
-                <a:cs typeface="+mn-cs"/>
-              </a:defRPr>
-            </a:lvl9pPr>
-          </a:lstStyle>
-          <a:p>
-            <a:pPr algn="ctr"/>
-            <a:endParaRPr lang="en-US"/>
-          </a:p>
-        </p:txBody>
-      </p:sp>
-      <p:pic>
-        <p:nvPicPr>
-          <p:cNvPr id="3" name="Picture 2">
-            <a:extLst>
-              <a:ext uri="{FF2B5EF4-FFF2-40B4-BE49-F238E27FC236}">
-                <a16:creationId xmlns:a16="http://schemas.microsoft.com/office/drawing/2014/main" id="{8A4E6765-95C8-11C6-7CCD-DA0B9A48FDDB}"/>
-              </a:ext>
-            </a:extLst>
-          </p:cNvPr>
-          <p:cNvPicPr>
-            <a:picLocks noChangeAspect="1"/>
-          </p:cNvPicPr>
-          <p:nvPr/>
-        </p:nvPicPr>
-        <p:blipFill>
-          <a:blip r:embed="rId2"/>
-          <a:srcRect t="3464" r="2" b="2815"/>
-          <a:stretch/>
-        </p:blipFill>
-        <p:spPr>
-          <a:xfrm>
-            <a:off x="643467" y="557190"/>
-            <a:ext cx="5346948" cy="5743612"/>
-          </a:xfrm>
-          <a:prstGeom prst="rect">
-            <a:avLst/>
-          </a:prstGeom>
-        </p:spPr>
-      </p:pic>
-      <p:pic>
-        <p:nvPicPr>
-          <p:cNvPr id="5" name="Picture 4">
-            <a:extLst>
-              <a:ext uri="{FF2B5EF4-FFF2-40B4-BE49-F238E27FC236}">
-                <a16:creationId xmlns:a16="http://schemas.microsoft.com/office/drawing/2014/main" id="{70F5A943-9BE2-FAC2-BEE2-DA369B67E2DE}"/>
-              </a:ext>
-            </a:extLst>
-          </p:cNvPr>
-          <p:cNvPicPr>
-            <a:picLocks noChangeAspect="1"/>
-          </p:cNvPicPr>
-          <p:nvPr/>
-        </p:nvPicPr>
-        <p:blipFill>
-          <a:blip r:embed="rId3"/>
-          <a:srcRect l="9123" r="10070"/>
-          <a:stretch/>
-        </p:blipFill>
-        <p:spPr>
-          <a:xfrm>
-            <a:off x="6182942" y="557190"/>
-            <a:ext cx="5365590" cy="5743612"/>
-          </a:xfrm>
-          <a:prstGeom prst="rect">
-            <a:avLst/>
-          </a:prstGeom>
-        </p:spPr>
-      </p:pic>
-    </p:spTree>
-    <p:extLst>
-      <p:ext uri="{BB962C8B-B14F-4D97-AF65-F5344CB8AC3E}">
-        <p14:creationId xmlns:p14="http://schemas.microsoft.com/office/powerpoint/2010/main" val="3627969445"/>
-      </p:ext>
-    </p:extLst>
-  </p:cSld>
-  <p:clrMapOvr>
-    <a:masterClrMapping/>
-  </p:clrMapOvr>
-</p:sld>
-</file>
-
-<file path=ppt/slides/slide22.xml><?xml version="1.0" encoding="utf-8"?>
-<p:sld xmlns:a="http://schemas.openxmlformats.org/drawingml/2006/main" xmlns:r="http://schemas.openxmlformats.org/officeDocument/2006/relationships" xmlns:p="http://schemas.openxmlformats.org/presentationml/2006/main">
-  <p:cSld>
-    <p:spTree>
-      <p:nvGrpSpPr>
-        <p:cNvPr id="1" name=""/>
-        <p:cNvGrpSpPr/>
-        <p:nvPr/>
-      </p:nvGrpSpPr>
-      <p:grpSpPr>
-        <a:xfrm>
-          <a:off x="0" y="0"/>
-          <a:ext cx="0" cy="0"/>
-          <a:chOff x="0" y="0"/>
-          <a:chExt cx="0" cy="0"/>
-        </a:xfrm>
-      </p:grpSpPr>
-      <p:sp>
-        <p:nvSpPr>
-          <p:cNvPr id="2" name="Title 1">
-            <a:extLst>
-              <a:ext uri="{FF2B5EF4-FFF2-40B4-BE49-F238E27FC236}">
-                <a16:creationId xmlns:a16="http://schemas.microsoft.com/office/drawing/2014/main" id="{C17A3EC6-7C9C-F81D-F93E-5001ED69EAFE}"/>
-              </a:ext>
-            </a:extLst>
-          </p:cNvPr>
-          <p:cNvSpPr>
-            <a:spLocks noGrp="1"/>
-          </p:cNvSpPr>
-          <p:nvPr>
-            <p:ph type="title"/>
-          </p:nvPr>
-        </p:nvSpPr>
-        <p:spPr/>
-        <p:txBody>
-          <a:bodyPr/>
-          <a:lstStyle/>
-          <a:p>
-            <a:r>
-              <a:rPr lang="en-US" dirty="0"/>
-              <a:t>Combinatorios</a:t>
-            </a:r>
-            <a:endParaRPr lang="es-EC" dirty="0"/>
-          </a:p>
-        </p:txBody>
-      </p:sp>
-      <p:pic>
-        <p:nvPicPr>
-          <p:cNvPr id="12" name="Picture 11">
-            <a:extLst>
-              <a:ext uri="{FF2B5EF4-FFF2-40B4-BE49-F238E27FC236}">
-                <a16:creationId xmlns:a16="http://schemas.microsoft.com/office/drawing/2014/main" id="{3192A3F5-3013-CA64-5453-7A36A95FE35C}"/>
-              </a:ext>
-            </a:extLst>
-          </p:cNvPr>
-          <p:cNvPicPr>
-            <a:picLocks noChangeAspect="1"/>
-          </p:cNvPicPr>
-          <p:nvPr/>
-        </p:nvPicPr>
-        <p:blipFill>
-          <a:blip r:embed="rId2"/>
-          <a:stretch>
-            <a:fillRect/>
-          </a:stretch>
-        </p:blipFill>
-        <p:spPr>
-          <a:xfrm>
-            <a:off x="3657875" y="1216058"/>
-            <a:ext cx="4876249" cy="5641942"/>
-          </a:xfrm>
-          <a:prstGeom prst="rect">
-            <a:avLst/>
-          </a:prstGeom>
-        </p:spPr>
-      </p:pic>
-    </p:spTree>
-    <p:extLst>
-      <p:ext uri="{BB962C8B-B14F-4D97-AF65-F5344CB8AC3E}">
-        <p14:creationId xmlns:p14="http://schemas.microsoft.com/office/powerpoint/2010/main" val="3539100743"/>
       </p:ext>
     </p:extLst>
   </p:cSld>
@@ -7357,6 +6083,14 @@
 </file>
 
 <file path=customXml/item1.xml><?xml version="1.0" encoding="utf-8"?>
+<p:properties xmlns:p="http://schemas.microsoft.com/office/2006/metadata/properties" xmlns:xsi="http://www.w3.org/2001/XMLSchema-instance" xmlns:pc="http://schemas.microsoft.com/office/infopath/2007/PartnerControls">
+  <documentManagement>
+    <_activity xmlns="98b3f1ad-107c-497c-bb15-64aaebc89f52" xsi:nil="true"/>
+  </documentManagement>
+</p:properties>
+</file>
+
+<file path=customXml/item2.xml><?xml version="1.0" encoding="utf-8"?>
 <ct:contentTypeSchema xmlns:ct="http://schemas.microsoft.com/office/2006/metadata/contentType" xmlns:ma="http://schemas.microsoft.com/office/2006/metadata/properties/metaAttributes" ct:_="" ma:_="" ma:contentTypeName="Documento" ma:contentTypeID="0x0101000ABC46EDA268834388609BD5B286F917" ma:contentTypeVersion="17" ma:contentTypeDescription="Crear nuevo documento." ma:contentTypeScope="" ma:versionID="b8ef759d716670bba47381dcbb7cab08">
   <xsd:schema xmlns:xsd="http://www.w3.org/2001/XMLSchema" xmlns:xs="http://www.w3.org/2001/XMLSchema" xmlns:p="http://schemas.microsoft.com/office/2006/metadata/properties" xmlns:ns3="98b3f1ad-107c-497c-bb15-64aaebc89f52" xmlns:ns4="a0690ee9-4047-4223-84b2-6b02f926f5d8" targetNamespace="http://schemas.microsoft.com/office/2006/metadata/properties" ma:root="true" ma:fieldsID="f0548e293e02a81e2d97140f47270d75" ns3:_="" ns4:_="">
     <xsd:import namespace="98b3f1ad-107c-497c-bb15-64aaebc89f52"/>
@@ -7603,14 +6337,6 @@
 </ct:contentTypeSchema>
 </file>
 
-<file path=customXml/item2.xml><?xml version="1.0" encoding="utf-8"?>
-<p:properties xmlns:p="http://schemas.microsoft.com/office/2006/metadata/properties" xmlns:xsi="http://www.w3.org/2001/XMLSchema-instance" xmlns:pc="http://schemas.microsoft.com/office/infopath/2007/PartnerControls">
-  <documentManagement>
-    <_activity xmlns="98b3f1ad-107c-497c-bb15-64aaebc89f52" xsi:nil="true"/>
-  </documentManagement>
-</p:properties>
-</file>
-
 <file path=customXml/item3.xml><?xml version="1.0" encoding="utf-8"?>
 <?mso-contentType ?>
 <FormTemplates xmlns="http://schemas.microsoft.com/sharepoint/v3/contenttype/forms">
@@ -7621,6 +6347,23 @@
 </file>
 
 <file path=customXml/itemProps1.xml><?xml version="1.0" encoding="utf-8"?>
+<ds:datastoreItem xmlns:ds="http://schemas.openxmlformats.org/officeDocument/2006/customXml" ds:itemID="{EEC6291A-1BB8-4D31-80EF-6AAECF11ECF7}">
+  <ds:schemaRefs>
+    <ds:schemaRef ds:uri="a0690ee9-4047-4223-84b2-6b02f926f5d8"/>
+    <ds:schemaRef ds:uri="http://www.w3.org/XML/1998/namespace"/>
+    <ds:schemaRef ds:uri="http://schemas.microsoft.com/office/2006/metadata/properties"/>
+    <ds:schemaRef ds:uri="http://schemas.microsoft.com/office/2006/documentManagement/types"/>
+    <ds:schemaRef ds:uri="98b3f1ad-107c-497c-bb15-64aaebc89f52"/>
+    <ds:schemaRef ds:uri="http://purl.org/dc/elements/1.1/"/>
+    <ds:schemaRef ds:uri="http://purl.org/dc/dcmitype/"/>
+    <ds:schemaRef ds:uri="http://purl.org/dc/terms/"/>
+    <ds:schemaRef ds:uri="http://schemas.microsoft.com/office/infopath/2007/PartnerControls"/>
+    <ds:schemaRef ds:uri="http://schemas.openxmlformats.org/package/2006/metadata/core-properties"/>
+  </ds:schemaRefs>
+</ds:datastoreItem>
+</file>
+
+<file path=customXml/itemProps2.xml><?xml version="1.0" encoding="utf-8"?>
 <ds:datastoreItem xmlns:ds="http://schemas.openxmlformats.org/officeDocument/2006/customXml" ds:itemID="{3FCEF456-3233-44D6-BC5A-12E8FD4D2764}">
   <ds:schemaRefs>
     <ds:schemaRef ds:uri="http://schemas.microsoft.com/office/2006/metadata/contentType"/>
@@ -7639,23 +6382,6 @@
 </ds:datastoreItem>
 </file>
 
-<file path=customXml/itemProps2.xml><?xml version="1.0" encoding="utf-8"?>
-<ds:datastoreItem xmlns:ds="http://schemas.openxmlformats.org/officeDocument/2006/customXml" ds:itemID="{EEC6291A-1BB8-4D31-80EF-6AAECF11ECF7}">
-  <ds:schemaRefs>
-    <ds:schemaRef ds:uri="a0690ee9-4047-4223-84b2-6b02f926f5d8"/>
-    <ds:schemaRef ds:uri="http://www.w3.org/XML/1998/namespace"/>
-    <ds:schemaRef ds:uri="http://schemas.microsoft.com/office/2006/metadata/properties"/>
-    <ds:schemaRef ds:uri="http://schemas.microsoft.com/office/2006/documentManagement/types"/>
-    <ds:schemaRef ds:uri="98b3f1ad-107c-497c-bb15-64aaebc89f52"/>
-    <ds:schemaRef ds:uri="http://purl.org/dc/elements/1.1/"/>
-    <ds:schemaRef ds:uri="http://purl.org/dc/dcmitype/"/>
-    <ds:schemaRef ds:uri="http://purl.org/dc/terms/"/>
-    <ds:schemaRef ds:uri="http://schemas.microsoft.com/office/infopath/2007/PartnerControls"/>
-    <ds:schemaRef ds:uri="http://schemas.openxmlformats.org/package/2006/metadata/core-properties"/>
-  </ds:schemaRefs>
-</ds:datastoreItem>
-</file>
-
 <file path=customXml/itemProps3.xml><?xml version="1.0" encoding="utf-8"?>
 <ds:datastoreItem xmlns:ds="http://schemas.openxmlformats.org/officeDocument/2006/customXml" ds:itemID="{F5C501D5-0101-419A-AFBB-D8F04111C142}">
   <ds:schemaRefs>

</xml_diff>

<commit_message>
feat: add README for unidad 1 and 2
</commit_message>
<xml_diff>
--- a/Unidad_2/Presentación.pptx
+++ b/Unidad_2/Presentación.pptx
@@ -220,7 +220,7 @@
           <a:p>
             <a:fld id="{F29DC657-A5B9-41B4-AB57-79E3DB3481E8}" type="datetimeFigureOut">
               <a:rPr lang="en-US" smtClean="0"/>
-              <a:t>11/5/2024</a:t>
+              <a:t>11/29/24</a:t>
             </a:fld>
             <a:endParaRPr lang="en-US"/>
           </a:p>
@@ -930,7 +930,7 @@
           <a:p>
             <a:fld id="{E0B89D21-97A6-4434-B3B1-BAF5738D61F3}" type="datetimeFigureOut">
               <a:rPr lang="en-US" smtClean="0"/>
-              <a:t>11/5/2024</a:t>
+              <a:t>11/29/24</a:t>
             </a:fld>
             <a:endParaRPr lang="en-US"/>
           </a:p>
@@ -1128,7 +1128,7 @@
           <a:p>
             <a:fld id="{E0B89D21-97A6-4434-B3B1-BAF5738D61F3}" type="datetimeFigureOut">
               <a:rPr lang="en-US" smtClean="0"/>
-              <a:t>11/5/2024</a:t>
+              <a:t>11/29/24</a:t>
             </a:fld>
             <a:endParaRPr lang="en-US"/>
           </a:p>
@@ -1336,7 +1336,7 @@
           <a:p>
             <a:fld id="{E0B89D21-97A6-4434-B3B1-BAF5738D61F3}" type="datetimeFigureOut">
               <a:rPr lang="en-US" smtClean="0"/>
-              <a:t>11/5/2024</a:t>
+              <a:t>11/29/24</a:t>
             </a:fld>
             <a:endParaRPr lang="en-US"/>
           </a:p>
@@ -1603,7 +1603,7 @@
           <a:p>
             <a:fld id="{E0B89D21-97A6-4434-B3B1-BAF5738D61F3}" type="datetimeFigureOut">
               <a:rPr lang="en-US" smtClean="0"/>
-              <a:t>11/5/2024</a:t>
+              <a:t>11/29/24</a:t>
             </a:fld>
             <a:endParaRPr lang="en-US"/>
           </a:p>
@@ -1878,7 +1878,7 @@
           <a:p>
             <a:fld id="{E0B89D21-97A6-4434-B3B1-BAF5738D61F3}" type="datetimeFigureOut">
               <a:rPr lang="en-US" smtClean="0"/>
-              <a:t>11/5/2024</a:t>
+              <a:t>11/29/24</a:t>
             </a:fld>
             <a:endParaRPr lang="en-US"/>
           </a:p>
@@ -2143,7 +2143,7 @@
           <a:p>
             <a:fld id="{E0B89D21-97A6-4434-B3B1-BAF5738D61F3}" type="datetimeFigureOut">
               <a:rPr lang="en-US" smtClean="0"/>
-              <a:t>11/5/2024</a:t>
+              <a:t>11/29/24</a:t>
             </a:fld>
             <a:endParaRPr lang="en-US"/>
           </a:p>
@@ -2555,7 +2555,7 @@
           <a:p>
             <a:fld id="{E0B89D21-97A6-4434-B3B1-BAF5738D61F3}" type="datetimeFigureOut">
               <a:rPr lang="en-US" smtClean="0"/>
-              <a:t>11/5/2024</a:t>
+              <a:t>11/29/24</a:t>
             </a:fld>
             <a:endParaRPr lang="en-US"/>
           </a:p>
@@ -2696,7 +2696,7 @@
           <a:p>
             <a:fld id="{E0B89D21-97A6-4434-B3B1-BAF5738D61F3}" type="datetimeFigureOut">
               <a:rPr lang="en-US" smtClean="0"/>
-              <a:t>11/5/2024</a:t>
+              <a:t>11/29/24</a:t>
             </a:fld>
             <a:endParaRPr lang="en-US"/>
           </a:p>
@@ -2809,7 +2809,7 @@
           <a:p>
             <a:fld id="{E0B89D21-97A6-4434-B3B1-BAF5738D61F3}" type="datetimeFigureOut">
               <a:rPr lang="en-US" smtClean="0"/>
-              <a:t>11/5/2024</a:t>
+              <a:t>11/29/24</a:t>
             </a:fld>
             <a:endParaRPr lang="en-US"/>
           </a:p>
@@ -3120,7 +3120,7 @@
           <a:p>
             <a:fld id="{E0B89D21-97A6-4434-B3B1-BAF5738D61F3}" type="datetimeFigureOut">
               <a:rPr lang="en-US" smtClean="0"/>
-              <a:t>11/5/2024</a:t>
+              <a:t>11/29/24</a:t>
             </a:fld>
             <a:endParaRPr lang="en-US"/>
           </a:p>
@@ -3408,7 +3408,7 @@
           <a:p>
             <a:fld id="{E0B89D21-97A6-4434-B3B1-BAF5738D61F3}" type="datetimeFigureOut">
               <a:rPr lang="en-US" smtClean="0"/>
-              <a:t>11/5/2024</a:t>
+              <a:t>11/29/24</a:t>
             </a:fld>
             <a:endParaRPr lang="en-US"/>
           </a:p>
@@ -3649,7 +3649,7 @@
           <a:p>
             <a:fld id="{E0B89D21-97A6-4434-B3B1-BAF5738D61F3}" type="datetimeFigureOut">
               <a:rPr lang="en-US" smtClean="0"/>
-              <a:t>11/5/2024</a:t>
+              <a:t>11/29/24</a:t>
             </a:fld>
             <a:endParaRPr lang="en-US"/>
           </a:p>
@@ -6091,6 +6091,15 @@
 </file>
 
 <file path=customXml/item2.xml><?xml version="1.0" encoding="utf-8"?>
+<?mso-contentType ?>
+<FormTemplates xmlns="http://schemas.microsoft.com/sharepoint/v3/contenttype/forms">
+  <Display>DocumentLibraryForm</Display>
+  <Edit>DocumentLibraryForm</Edit>
+  <New>DocumentLibraryForm</New>
+</FormTemplates>
+</file>
+
+<file path=customXml/item3.xml><?xml version="1.0" encoding="utf-8"?>
 <ct:contentTypeSchema xmlns:ct="http://schemas.microsoft.com/office/2006/metadata/contentType" xmlns:ma="http://schemas.microsoft.com/office/2006/metadata/properties/metaAttributes" ct:_="" ma:_="" ma:contentTypeName="Documento" ma:contentTypeID="0x0101000ABC46EDA268834388609BD5B286F917" ma:contentTypeVersion="17" ma:contentTypeDescription="Crear nuevo documento." ma:contentTypeScope="" ma:versionID="b8ef759d716670bba47381dcbb7cab08">
   <xsd:schema xmlns:xsd="http://www.w3.org/2001/XMLSchema" xmlns:xs="http://www.w3.org/2001/XMLSchema" xmlns:p="http://schemas.microsoft.com/office/2006/metadata/properties" xmlns:ns3="98b3f1ad-107c-497c-bb15-64aaebc89f52" xmlns:ns4="a0690ee9-4047-4223-84b2-6b02f926f5d8" targetNamespace="http://schemas.microsoft.com/office/2006/metadata/properties" ma:root="true" ma:fieldsID="f0548e293e02a81e2d97140f47270d75" ns3:_="" ns4:_="">
     <xsd:import namespace="98b3f1ad-107c-497c-bb15-64aaebc89f52"/>
@@ -6337,15 +6346,6 @@
 </ct:contentTypeSchema>
 </file>
 
-<file path=customXml/item3.xml><?xml version="1.0" encoding="utf-8"?>
-<?mso-contentType ?>
-<FormTemplates xmlns="http://schemas.microsoft.com/sharepoint/v3/contenttype/forms">
-  <Display>DocumentLibraryForm</Display>
-  <Edit>DocumentLibraryForm</Edit>
-  <New>DocumentLibraryForm</New>
-</FormTemplates>
-</file>
-
 <file path=customXml/itemProps1.xml><?xml version="1.0" encoding="utf-8"?>
 <ds:datastoreItem xmlns:ds="http://schemas.openxmlformats.org/officeDocument/2006/customXml" ds:itemID="{EEC6291A-1BB8-4D31-80EF-6AAECF11ECF7}">
   <ds:schemaRefs>
@@ -6364,6 +6364,14 @@
 </file>
 
 <file path=customXml/itemProps2.xml><?xml version="1.0" encoding="utf-8"?>
+<ds:datastoreItem xmlns:ds="http://schemas.openxmlformats.org/officeDocument/2006/customXml" ds:itemID="{F5C501D5-0101-419A-AFBB-D8F04111C142}">
+  <ds:schemaRefs>
+    <ds:schemaRef ds:uri="http://schemas.microsoft.com/sharepoint/v3/contenttype/forms"/>
+  </ds:schemaRefs>
+</ds:datastoreItem>
+</file>
+
+<file path=customXml/itemProps3.xml><?xml version="1.0" encoding="utf-8"?>
 <ds:datastoreItem xmlns:ds="http://schemas.openxmlformats.org/officeDocument/2006/customXml" ds:itemID="{3FCEF456-3233-44D6-BC5A-12E8FD4D2764}">
   <ds:schemaRefs>
     <ds:schemaRef ds:uri="http://schemas.microsoft.com/office/2006/metadata/contentType"/>
@@ -6380,12 +6388,4 @@
     <ds:schemaRef ds:uri="http://schemas.microsoft.com/internal/obd"/>
   </ds:schemaRefs>
 </ds:datastoreItem>
-</file>
-
-<file path=customXml/itemProps3.xml><?xml version="1.0" encoding="utf-8"?>
-<ds:datastoreItem xmlns:ds="http://schemas.openxmlformats.org/officeDocument/2006/customXml" ds:itemID="{F5C501D5-0101-419A-AFBB-D8F04111C142}">
-  <ds:schemaRefs>
-    <ds:schemaRef ds:uri="http://schemas.microsoft.com/sharepoint/v3/contenttype/forms"/>
-  </ds:schemaRefs>
-</ds:datastoreItem>
 </file>
</xml_diff>